<commit_message>
Corrected Title of Some Pages
</commit_message>
<xml_diff>
--- a/Documentation/Front_End_Designs.pptx
+++ b/Documentation/Front_End_Designs.pptx
@@ -152,987 +152,12 @@
 <p1510:revInfo xmlns:a="http://schemas.openxmlformats.org/drawingml/2006/main" xmlns:r="http://schemas.openxmlformats.org/officeDocument/2006/relationships" xmlns:p1510="http://schemas.microsoft.com/office/powerpoint/2015/10/main">
   <p1510:revLst>
     <p1510:client id="{1B802794-2BA0-4A94-BD26-1716E606C6DB}" v="3953" dt="2021-02-25T15:31:49.392"/>
-    <p1510:client id="{5B883DA1-DD95-4CDE-95DD-51AE6D9D97DF}" v="2142" dt="2021-02-25T15:25:34.337"/>
   </p1510:revLst>
 </p1510:revInfo>
 </file>
 
 <file path=ppt/changesInfos/changesInfo1.xml><?xml version="1.0" encoding="utf-8"?>
 <pc:chgInfo xmlns:a="http://schemas.openxmlformats.org/drawingml/2006/main" xmlns:r="http://schemas.openxmlformats.org/officeDocument/2006/relationships" xmlns:ac="http://schemas.microsoft.com/office/drawing/2013/main/command" xmlns:pc="http://schemas.microsoft.com/office/powerpoint/2013/main/command">
-  <pc:docChgLst>
-    <pc:chgData name="Cosmin Covrig" userId="8dcd05c6-e7ae-4cf1-8843-fa63bee14fde" providerId="ADAL" clId="{5B883DA1-DD95-4CDE-95DD-51AE6D9D97DF}"/>
-    <pc:docChg chg="undo custSel addSld delSld modSld sldOrd">
-      <pc:chgData name="Cosmin Covrig" userId="8dcd05c6-e7ae-4cf1-8843-fa63bee14fde" providerId="ADAL" clId="{5B883DA1-DD95-4CDE-95DD-51AE6D9D97DF}" dt="2021-02-25T15:25:34.337" v="2142" actId="1076"/>
-      <pc:docMkLst>
-        <pc:docMk/>
-      </pc:docMkLst>
-      <pc:sldChg chg="addSp delSp modSp mod setBg">
-        <pc:chgData name="Cosmin Covrig" userId="8dcd05c6-e7ae-4cf1-8843-fa63bee14fde" providerId="ADAL" clId="{5B883DA1-DD95-4CDE-95DD-51AE6D9D97DF}" dt="2021-02-25T15:14:21.185" v="1800" actId="1076"/>
-        <pc:sldMkLst>
-          <pc:docMk/>
-          <pc:sldMk cId="2926508388" sldId="257"/>
-        </pc:sldMkLst>
-        <pc:spChg chg="mod">
-          <ac:chgData name="Cosmin Covrig" userId="8dcd05c6-e7ae-4cf1-8843-fa63bee14fde" providerId="ADAL" clId="{5B883DA1-DD95-4CDE-95DD-51AE6D9D97DF}" dt="2021-02-23T15:26:31.105" v="195" actId="20577"/>
-          <ac:spMkLst>
-            <pc:docMk/>
-            <pc:sldMk cId="2926508388" sldId="257"/>
-            <ac:spMk id="12" creationId="{11E2038B-85E5-4526-867C-63B2C9A208AE}"/>
-          </ac:spMkLst>
-        </pc:spChg>
-        <pc:spChg chg="add mod">
-          <ac:chgData name="Cosmin Covrig" userId="8dcd05c6-e7ae-4cf1-8843-fa63bee14fde" providerId="ADAL" clId="{5B883DA1-DD95-4CDE-95DD-51AE6D9D97DF}" dt="2021-02-25T15:09:54.149" v="1745" actId="1076"/>
-          <ac:spMkLst>
-            <pc:docMk/>
-            <pc:sldMk cId="2926508388" sldId="257"/>
-            <ac:spMk id="17" creationId="{CDE03E53-08BD-416B-983A-DE440D2F972E}"/>
-          </ac:spMkLst>
-        </pc:spChg>
-        <pc:spChg chg="add mod">
-          <ac:chgData name="Cosmin Covrig" userId="8dcd05c6-e7ae-4cf1-8843-fa63bee14fde" providerId="ADAL" clId="{5B883DA1-DD95-4CDE-95DD-51AE6D9D97DF}" dt="2021-02-25T15:14:21.185" v="1800" actId="1076"/>
-          <ac:spMkLst>
-            <pc:docMk/>
-            <pc:sldMk cId="2926508388" sldId="257"/>
-            <ac:spMk id="21" creationId="{65096748-2001-4688-B874-8C35F86AC736}"/>
-          </ac:spMkLst>
-        </pc:spChg>
-        <pc:grpChg chg="mod">
-          <ac:chgData name="Cosmin Covrig" userId="8dcd05c6-e7ae-4cf1-8843-fa63bee14fde" providerId="ADAL" clId="{5B883DA1-DD95-4CDE-95DD-51AE6D9D97DF}" dt="2021-02-23T15:22:36.154" v="125" actId="14100"/>
-          <ac:grpSpMkLst>
-            <pc:docMk/>
-            <pc:sldMk cId="2926508388" sldId="257"/>
-            <ac:grpSpMk id="10" creationId="{5100E35E-EDE7-4F88-97E8-9241A4D36214}"/>
-          </ac:grpSpMkLst>
-        </pc:grpChg>
-        <pc:picChg chg="del mod">
-          <ac:chgData name="Cosmin Covrig" userId="8dcd05c6-e7ae-4cf1-8843-fa63bee14fde" providerId="ADAL" clId="{5B883DA1-DD95-4CDE-95DD-51AE6D9D97DF}" dt="2021-02-23T15:00:32.312" v="19" actId="478"/>
-          <ac:picMkLst>
-            <pc:docMk/>
-            <pc:sldMk cId="2926508388" sldId="257"/>
-            <ac:picMk id="9" creationId="{61CAF954-C830-4E27-962E-3AB12F7D9DA7}"/>
-          </ac:picMkLst>
-        </pc:picChg>
-        <pc:picChg chg="add del mod">
-          <ac:chgData name="Cosmin Covrig" userId="8dcd05c6-e7ae-4cf1-8843-fa63bee14fde" providerId="ADAL" clId="{5B883DA1-DD95-4CDE-95DD-51AE6D9D97DF}" dt="2021-02-23T15:01:57.268" v="56" actId="478"/>
-          <ac:picMkLst>
-            <pc:docMk/>
-            <pc:sldMk cId="2926508388" sldId="257"/>
-            <ac:picMk id="10" creationId="{677AF5EC-2D0E-497A-94EE-AAB97372079F}"/>
-          </ac:picMkLst>
-        </pc:picChg>
-        <pc:picChg chg="add del mod">
-          <ac:chgData name="Cosmin Covrig" userId="8dcd05c6-e7ae-4cf1-8843-fa63bee14fde" providerId="ADAL" clId="{5B883DA1-DD95-4CDE-95DD-51AE6D9D97DF}" dt="2021-02-23T15:00:47.855" v="29" actId="478"/>
-          <ac:picMkLst>
-            <pc:docMk/>
-            <pc:sldMk cId="2926508388" sldId="257"/>
-            <ac:picMk id="14" creationId="{4D2E85EE-93BE-430C-AF5A-0C65BCED094D}"/>
-          </ac:picMkLst>
-        </pc:picChg>
-        <pc:picChg chg="add del mod">
-          <ac:chgData name="Cosmin Covrig" userId="8dcd05c6-e7ae-4cf1-8843-fa63bee14fde" providerId="ADAL" clId="{5B883DA1-DD95-4CDE-95DD-51AE6D9D97DF}" dt="2021-02-23T15:02:02.391" v="62" actId="478"/>
-          <ac:picMkLst>
-            <pc:docMk/>
-            <pc:sldMk cId="2926508388" sldId="257"/>
-            <ac:picMk id="14" creationId="{9701F12F-3B76-47BA-A72E-16869C44F2AE}"/>
-          </ac:picMkLst>
-        </pc:picChg>
-        <pc:picChg chg="add del mod">
-          <ac:chgData name="Cosmin Covrig" userId="8dcd05c6-e7ae-4cf1-8843-fa63bee14fde" providerId="ADAL" clId="{5B883DA1-DD95-4CDE-95DD-51AE6D9D97DF}" dt="2021-02-23T15:02:03.763" v="64"/>
-          <ac:picMkLst>
-            <pc:docMk/>
-            <pc:sldMk cId="2926508388" sldId="257"/>
-            <ac:picMk id="15" creationId="{FD8A1D12-BF28-49B5-8897-132910F4A303}"/>
-          </ac:picMkLst>
-        </pc:picChg>
-        <pc:picChg chg="mod">
-          <ac:chgData name="Cosmin Covrig" userId="8dcd05c6-e7ae-4cf1-8843-fa63bee14fde" providerId="ADAL" clId="{5B883DA1-DD95-4CDE-95DD-51AE6D9D97DF}" dt="2021-02-23T15:13:17.423" v="76" actId="1076"/>
-          <ac:picMkLst>
-            <pc:docMk/>
-            <pc:sldMk cId="2926508388" sldId="257"/>
-            <ac:picMk id="18" creationId="{9152EB95-B04E-4F84-996F-8E3052E0BF23}"/>
-          </ac:picMkLst>
-        </pc:picChg>
-        <pc:picChg chg="add del mod">
-          <ac:chgData name="Cosmin Covrig" userId="8dcd05c6-e7ae-4cf1-8843-fa63bee14fde" providerId="ADAL" clId="{5B883DA1-DD95-4CDE-95DD-51AE6D9D97DF}" dt="2021-02-23T15:02:32.291" v="68" actId="478"/>
-          <ac:picMkLst>
-            <pc:docMk/>
-            <pc:sldMk cId="2926508388" sldId="257"/>
-            <ac:picMk id="1026" creationId="{F80D9CC4-2832-4DC3-964B-BBC24CB91816}"/>
-          </ac:picMkLst>
-        </pc:picChg>
-        <pc:picChg chg="add del mod">
-          <ac:chgData name="Cosmin Covrig" userId="8dcd05c6-e7ae-4cf1-8843-fa63bee14fde" providerId="ADAL" clId="{5B883DA1-DD95-4CDE-95DD-51AE6D9D97DF}" dt="2021-02-23T15:13:22.402" v="77" actId="478"/>
-          <ac:picMkLst>
-            <pc:docMk/>
-            <pc:sldMk cId="2926508388" sldId="257"/>
-            <ac:picMk id="2050" creationId="{C166D764-25BA-4472-A148-57F95EF3A2FD}"/>
-          </ac:picMkLst>
-        </pc:picChg>
-        <pc:cxnChg chg="add mod">
-          <ac:chgData name="Cosmin Covrig" userId="8dcd05c6-e7ae-4cf1-8843-fa63bee14fde" providerId="ADAL" clId="{5B883DA1-DD95-4CDE-95DD-51AE6D9D97DF}" dt="2021-02-25T15:09:56.660" v="1746" actId="1076"/>
-          <ac:cxnSpMkLst>
-            <pc:docMk/>
-            <pc:sldMk cId="2926508388" sldId="257"/>
-            <ac:cxnSpMk id="15" creationId="{43E32B53-0D15-4C96-A4AA-E16371E7C004}"/>
-          </ac:cxnSpMkLst>
-        </pc:cxnChg>
-        <pc:cxnChg chg="add">
-          <ac:chgData name="Cosmin Covrig" userId="8dcd05c6-e7ae-4cf1-8843-fa63bee14fde" providerId="ADAL" clId="{5B883DA1-DD95-4CDE-95DD-51AE6D9D97DF}" dt="2021-02-25T15:10:17.546" v="1747" actId="11529"/>
-          <ac:cxnSpMkLst>
-            <pc:docMk/>
-            <pc:sldMk cId="2926508388" sldId="257"/>
-            <ac:cxnSpMk id="20" creationId="{3FE86FA4-271B-45BA-9881-4D9E8479F15D}"/>
-          </ac:cxnSpMkLst>
-        </pc:cxnChg>
-      </pc:sldChg>
-      <pc:sldChg chg="addSp delSp modSp mod">
-        <pc:chgData name="Cosmin Covrig" userId="8dcd05c6-e7ae-4cf1-8843-fa63bee14fde" providerId="ADAL" clId="{5B883DA1-DD95-4CDE-95DD-51AE6D9D97DF}" dt="2021-02-25T15:15:49.621" v="1940" actId="1076"/>
-        <pc:sldMkLst>
-          <pc:docMk/>
-          <pc:sldMk cId="3269657135" sldId="258"/>
-        </pc:sldMkLst>
-        <pc:spChg chg="del">
-          <ac:chgData name="Cosmin Covrig" userId="8dcd05c6-e7ae-4cf1-8843-fa63bee14fde" providerId="ADAL" clId="{5B883DA1-DD95-4CDE-95DD-51AE6D9D97DF}" dt="2021-02-23T15:21:19.568" v="94" actId="478"/>
-          <ac:spMkLst>
-            <pc:docMk/>
-            <pc:sldMk cId="3269657135" sldId="258"/>
-            <ac:spMk id="3" creationId="{E5D4B336-56AE-4094-82B1-A11E9C41CC9E}"/>
-          </ac:spMkLst>
-        </pc:spChg>
-        <pc:spChg chg="add mod">
-          <ac:chgData name="Cosmin Covrig" userId="8dcd05c6-e7ae-4cf1-8843-fa63bee14fde" providerId="ADAL" clId="{5B883DA1-DD95-4CDE-95DD-51AE6D9D97DF}" dt="2021-02-25T15:15:49.621" v="1940" actId="1076"/>
-          <ac:spMkLst>
-            <pc:docMk/>
-            <pc:sldMk cId="3269657135" sldId="258"/>
-            <ac:spMk id="7" creationId="{EF3B6BD1-D879-494D-B30E-2033397FF820}"/>
-          </ac:spMkLst>
-        </pc:spChg>
-        <pc:spChg chg="mod">
-          <ac:chgData name="Cosmin Covrig" userId="8dcd05c6-e7ae-4cf1-8843-fa63bee14fde" providerId="ADAL" clId="{5B883DA1-DD95-4CDE-95DD-51AE6D9D97DF}" dt="2021-02-23T15:26:37.458" v="214" actId="20577"/>
-          <ac:spMkLst>
-            <pc:docMk/>
-            <pc:sldMk cId="3269657135" sldId="258"/>
-            <ac:spMk id="15" creationId="{728B1D49-F8FF-4B66-AC57-077B47C91408}"/>
-          </ac:spMkLst>
-        </pc:spChg>
-        <pc:spChg chg="add del mod">
-          <ac:chgData name="Cosmin Covrig" userId="8dcd05c6-e7ae-4cf1-8843-fa63bee14fde" providerId="ADAL" clId="{5B883DA1-DD95-4CDE-95DD-51AE6D9D97DF}" dt="2021-02-23T15:25:40.142" v="129"/>
-          <ac:spMkLst>
-            <pc:docMk/>
-            <pc:sldMk cId="3269657135" sldId="258"/>
-            <ac:spMk id="20" creationId="{ACD8BE7D-0ECF-4D10-8D07-A6F1B02FE8D1}"/>
-          </ac:spMkLst>
-        </pc:spChg>
-        <pc:spChg chg="add del mod">
-          <ac:chgData name="Cosmin Covrig" userId="8dcd05c6-e7ae-4cf1-8843-fa63bee14fde" providerId="ADAL" clId="{5B883DA1-DD95-4CDE-95DD-51AE6D9D97DF}" dt="2021-02-23T15:25:40.143" v="131"/>
-          <ac:spMkLst>
-            <pc:docMk/>
-            <pc:sldMk cId="3269657135" sldId="258"/>
-            <ac:spMk id="21" creationId="{FE03B5BD-5DD2-4D96-8807-321334D6BE5B}"/>
-          </ac:spMkLst>
-        </pc:spChg>
-        <pc:spChg chg="add mod">
-          <ac:chgData name="Cosmin Covrig" userId="8dcd05c6-e7ae-4cf1-8843-fa63bee14fde" providerId="ADAL" clId="{5B883DA1-DD95-4CDE-95DD-51AE6D9D97DF}" dt="2021-02-23T15:28:30.220" v="221" actId="1076"/>
-          <ac:spMkLst>
-            <pc:docMk/>
-            <pc:sldMk cId="3269657135" sldId="258"/>
-            <ac:spMk id="23" creationId="{DEDF5BF5-AEA5-4FD7-8A30-339616FE612D}"/>
-          </ac:spMkLst>
-        </pc:spChg>
-        <pc:spChg chg="add mod">
-          <ac:chgData name="Cosmin Covrig" userId="8dcd05c6-e7ae-4cf1-8843-fa63bee14fde" providerId="ADAL" clId="{5B883DA1-DD95-4CDE-95DD-51AE6D9D97DF}" dt="2021-02-23T15:28:34.141" v="223" actId="1076"/>
-          <ac:spMkLst>
-            <pc:docMk/>
-            <pc:sldMk cId="3269657135" sldId="258"/>
-            <ac:spMk id="24" creationId="{1547B4B7-7877-4EC9-A3CB-24AB2D10FEE1}"/>
-          </ac:spMkLst>
-        </pc:spChg>
-        <pc:spChg chg="add mod">
-          <ac:chgData name="Cosmin Covrig" userId="8dcd05c6-e7ae-4cf1-8843-fa63bee14fde" providerId="ADAL" clId="{5B883DA1-DD95-4CDE-95DD-51AE6D9D97DF}" dt="2021-02-23T15:28:38.017" v="225" actId="1076"/>
-          <ac:spMkLst>
-            <pc:docMk/>
-            <pc:sldMk cId="3269657135" sldId="258"/>
-            <ac:spMk id="25" creationId="{D283C36E-3692-4396-B211-11AE85B260A4}"/>
-          </ac:spMkLst>
-        </pc:spChg>
-        <pc:spChg chg="add mod">
-          <ac:chgData name="Cosmin Covrig" userId="8dcd05c6-e7ae-4cf1-8843-fa63bee14fde" providerId="ADAL" clId="{5B883DA1-DD95-4CDE-95DD-51AE6D9D97DF}" dt="2021-02-23T15:28:41.775" v="227" actId="1076"/>
-          <ac:spMkLst>
-            <pc:docMk/>
-            <pc:sldMk cId="3269657135" sldId="258"/>
-            <ac:spMk id="26" creationId="{23206CA7-DDA4-4F95-80F7-8E2976249C5D}"/>
-          </ac:spMkLst>
-        </pc:spChg>
-        <pc:spChg chg="add mod">
-          <ac:chgData name="Cosmin Covrig" userId="8dcd05c6-e7ae-4cf1-8843-fa63bee14fde" providerId="ADAL" clId="{5B883DA1-DD95-4CDE-95DD-51AE6D9D97DF}" dt="2021-02-23T15:28:45.352" v="229" actId="1076"/>
-          <ac:spMkLst>
-            <pc:docMk/>
-            <pc:sldMk cId="3269657135" sldId="258"/>
-            <ac:spMk id="27" creationId="{AC2C9EF4-5C0B-4CFA-89B4-9F63847341DC}"/>
-          </ac:spMkLst>
-        </pc:spChg>
-        <pc:spChg chg="add mod">
-          <ac:chgData name="Cosmin Covrig" userId="8dcd05c6-e7ae-4cf1-8843-fa63bee14fde" providerId="ADAL" clId="{5B883DA1-DD95-4CDE-95DD-51AE6D9D97DF}" dt="2021-02-23T15:28:52.487" v="231" actId="1076"/>
-          <ac:spMkLst>
-            <pc:docMk/>
-            <pc:sldMk cId="3269657135" sldId="258"/>
-            <ac:spMk id="28" creationId="{A1F7073E-702C-435F-BB5C-323607E4DDE8}"/>
-          </ac:spMkLst>
-        </pc:spChg>
-        <pc:graphicFrameChg chg="modGraphic">
-          <ac:chgData name="Cosmin Covrig" userId="8dcd05c6-e7ae-4cf1-8843-fa63bee14fde" providerId="ADAL" clId="{5B883DA1-DD95-4CDE-95DD-51AE6D9D97DF}" dt="2021-02-23T15:30:13" v="271" actId="20577"/>
-          <ac:graphicFrameMkLst>
-            <pc:docMk/>
-            <pc:sldMk cId="3269657135" sldId="258"/>
-            <ac:graphicFrameMk id="22" creationId="{DE57F998-0CA3-4E7C-9B3F-D7AC4976DE24}"/>
-          </ac:graphicFrameMkLst>
-        </pc:graphicFrameChg>
-        <pc:cxnChg chg="add mod">
-          <ac:chgData name="Cosmin Covrig" userId="8dcd05c6-e7ae-4cf1-8843-fa63bee14fde" providerId="ADAL" clId="{5B883DA1-DD95-4CDE-95DD-51AE6D9D97DF}" dt="2021-02-25T15:14:49.824" v="1803" actId="14100"/>
-          <ac:cxnSpMkLst>
-            <pc:docMk/>
-            <pc:sldMk cId="3269657135" sldId="258"/>
-            <ac:cxnSpMk id="3" creationId="{A7CB2E88-8743-4A12-92AF-2370F256BB5E}"/>
-          </ac:cxnSpMkLst>
-        </pc:cxnChg>
-      </pc:sldChg>
-      <pc:sldChg chg="addSp delSp modSp del mod">
-        <pc:chgData name="Cosmin Covrig" userId="8dcd05c6-e7ae-4cf1-8843-fa63bee14fde" providerId="ADAL" clId="{5B883DA1-DD95-4CDE-95DD-51AE6D9D97DF}" dt="2021-02-25T15:16:32.208" v="1941" actId="47"/>
-        <pc:sldMkLst>
-          <pc:docMk/>
-          <pc:sldMk cId="333425768" sldId="259"/>
-        </pc:sldMkLst>
-        <pc:spChg chg="add mod">
-          <ac:chgData name="Cosmin Covrig" userId="8dcd05c6-e7ae-4cf1-8843-fa63bee14fde" providerId="ADAL" clId="{5B883DA1-DD95-4CDE-95DD-51AE6D9D97DF}" dt="2021-02-23T15:34:56.820" v="316" actId="14100"/>
-          <ac:spMkLst>
-            <pc:docMk/>
-            <pc:sldMk cId="333425768" sldId="259"/>
-            <ac:spMk id="23" creationId="{39E84D1B-979C-419E-BFDB-2668C5D8AD61}"/>
-          </ac:spMkLst>
-        </pc:spChg>
-        <pc:spChg chg="del mod">
-          <ac:chgData name="Cosmin Covrig" userId="8dcd05c6-e7ae-4cf1-8843-fa63bee14fde" providerId="ADAL" clId="{5B883DA1-DD95-4CDE-95DD-51AE6D9D97DF}" dt="2021-02-23T15:39:33.781" v="377" actId="478"/>
-          <ac:spMkLst>
-            <pc:docMk/>
-            <pc:sldMk cId="333425768" sldId="259"/>
-            <ac:spMk id="25" creationId="{FFC5603C-4EC2-41D5-B8BD-F0FCE8AC5458}"/>
-          </ac:spMkLst>
-        </pc:spChg>
-        <pc:spChg chg="add mod">
-          <ac:chgData name="Cosmin Covrig" userId="8dcd05c6-e7ae-4cf1-8843-fa63bee14fde" providerId="ADAL" clId="{5B883DA1-DD95-4CDE-95DD-51AE6D9D97DF}" dt="2021-02-23T15:35:38.472" v="322" actId="20577"/>
-          <ac:spMkLst>
-            <pc:docMk/>
-            <pc:sldMk cId="333425768" sldId="259"/>
-            <ac:spMk id="28" creationId="{EB68B9D6-5720-4826-9BEC-EC9DB5B2A388}"/>
-          </ac:spMkLst>
-        </pc:spChg>
-        <pc:spChg chg="mod">
-          <ac:chgData name="Cosmin Covrig" userId="8dcd05c6-e7ae-4cf1-8843-fa63bee14fde" providerId="ADAL" clId="{5B883DA1-DD95-4CDE-95DD-51AE6D9D97DF}" dt="2021-02-23T15:37:20.952" v="337" actId="1076"/>
-          <ac:spMkLst>
-            <pc:docMk/>
-            <pc:sldMk cId="333425768" sldId="259"/>
-            <ac:spMk id="30" creationId="{5F809E13-2D41-45BB-905F-88EFB5C7FE72}"/>
-          </ac:spMkLst>
-        </pc:spChg>
-        <pc:spChg chg="mod">
-          <ac:chgData name="Cosmin Covrig" userId="8dcd05c6-e7ae-4cf1-8843-fa63bee14fde" providerId="ADAL" clId="{5B883DA1-DD95-4CDE-95DD-51AE6D9D97DF}" dt="2021-02-23T15:37:57.982" v="345" actId="1076"/>
-          <ac:spMkLst>
-            <pc:docMk/>
-            <pc:sldMk cId="333425768" sldId="259"/>
-            <ac:spMk id="31" creationId="{BEF45A2B-5801-411B-8109-29C4935431D5}"/>
-          </ac:spMkLst>
-        </pc:spChg>
-        <pc:spChg chg="add mod">
-          <ac:chgData name="Cosmin Covrig" userId="8dcd05c6-e7ae-4cf1-8843-fa63bee14fde" providerId="ADAL" clId="{5B883DA1-DD95-4CDE-95DD-51AE6D9D97DF}" dt="2021-02-23T15:39:02.750" v="371" actId="1076"/>
-          <ac:spMkLst>
-            <pc:docMk/>
-            <pc:sldMk cId="333425768" sldId="259"/>
-            <ac:spMk id="35" creationId="{8D8595B6-9168-45AF-BE74-499978608F49}"/>
-          </ac:spMkLst>
-        </pc:spChg>
-        <pc:picChg chg="add del mod">
-          <ac:chgData name="Cosmin Covrig" userId="8dcd05c6-e7ae-4cf1-8843-fa63bee14fde" providerId="ADAL" clId="{5B883DA1-DD95-4CDE-95DD-51AE6D9D97DF}" dt="2021-02-23T15:39:08.455" v="373" actId="478"/>
-          <ac:picMkLst>
-            <pc:docMk/>
-            <pc:sldMk cId="333425768" sldId="259"/>
-            <ac:picMk id="24" creationId="{B55E4A6B-B054-4FD5-9A20-20A4EE1D4539}"/>
-          </ac:picMkLst>
-        </pc:picChg>
-        <pc:picChg chg="add mod">
-          <ac:chgData name="Cosmin Covrig" userId="8dcd05c6-e7ae-4cf1-8843-fa63bee14fde" providerId="ADAL" clId="{5B883DA1-DD95-4CDE-95DD-51AE6D9D97DF}" dt="2021-02-23T15:39:42.292" v="380" actId="1076"/>
-          <ac:picMkLst>
-            <pc:docMk/>
-            <pc:sldMk cId="333425768" sldId="259"/>
-            <ac:picMk id="3074" creationId="{3D336115-E994-47F8-9252-63D00BC4E8FB}"/>
-          </ac:picMkLst>
-        </pc:picChg>
-        <pc:cxnChg chg="add">
-          <ac:chgData name="Cosmin Covrig" userId="8dcd05c6-e7ae-4cf1-8843-fa63bee14fde" providerId="ADAL" clId="{5B883DA1-DD95-4CDE-95DD-51AE6D9D97DF}" dt="2021-02-23T15:33:22.838" v="290" actId="11529"/>
-          <ac:cxnSpMkLst>
-            <pc:docMk/>
-            <pc:sldMk cId="333425768" sldId="259"/>
-            <ac:cxnSpMk id="3" creationId="{421514E2-9BFC-46B8-BB80-A3B40DBF8E45}"/>
-          </ac:cxnSpMkLst>
-        </pc:cxnChg>
-        <pc:cxnChg chg="add mod">
-          <ac:chgData name="Cosmin Covrig" userId="8dcd05c6-e7ae-4cf1-8843-fa63bee14fde" providerId="ADAL" clId="{5B883DA1-DD95-4CDE-95DD-51AE6D9D97DF}" dt="2021-02-23T15:34:34.661" v="300" actId="1076"/>
-          <ac:cxnSpMkLst>
-            <pc:docMk/>
-            <pc:sldMk cId="333425768" sldId="259"/>
-            <ac:cxnSpMk id="27" creationId="{20472A70-509E-4A10-8E69-30CCCD8FC894}"/>
-          </ac:cxnSpMkLst>
-        </pc:cxnChg>
-        <pc:cxnChg chg="add mod">
-          <ac:chgData name="Cosmin Covrig" userId="8dcd05c6-e7ae-4cf1-8843-fa63bee14fde" providerId="ADAL" clId="{5B883DA1-DD95-4CDE-95DD-51AE6D9D97DF}" dt="2021-02-23T15:35:12.924" v="320" actId="1076"/>
-          <ac:cxnSpMkLst>
-            <pc:docMk/>
-            <pc:sldMk cId="333425768" sldId="259"/>
-            <ac:cxnSpMk id="29" creationId="{6B053E72-64F1-4F5F-ACC0-2FDAE8185F19}"/>
-          </ac:cxnSpMkLst>
-        </pc:cxnChg>
-        <pc:cxnChg chg="add mod">
-          <ac:chgData name="Cosmin Covrig" userId="8dcd05c6-e7ae-4cf1-8843-fa63bee14fde" providerId="ADAL" clId="{5B883DA1-DD95-4CDE-95DD-51AE6D9D97DF}" dt="2021-02-23T15:37:17.986" v="336" actId="1076"/>
-          <ac:cxnSpMkLst>
-            <pc:docMk/>
-            <pc:sldMk cId="333425768" sldId="259"/>
-            <ac:cxnSpMk id="32" creationId="{C903200B-975F-4669-8FA8-BAEE42CB4C46}"/>
-          </ac:cxnSpMkLst>
-        </pc:cxnChg>
-        <pc:cxnChg chg="add mod">
-          <ac:chgData name="Cosmin Covrig" userId="8dcd05c6-e7ae-4cf1-8843-fa63bee14fde" providerId="ADAL" clId="{5B883DA1-DD95-4CDE-95DD-51AE6D9D97DF}" dt="2021-02-23T15:38:57.849" v="370" actId="1076"/>
-          <ac:cxnSpMkLst>
-            <pc:docMk/>
-            <pc:sldMk cId="333425768" sldId="259"/>
-            <ac:cxnSpMk id="33" creationId="{3E041508-8188-428D-B7C3-74E48D132B06}"/>
-          </ac:cxnSpMkLst>
-        </pc:cxnChg>
-        <pc:cxnChg chg="add del mod">
-          <ac:chgData name="Cosmin Covrig" userId="8dcd05c6-e7ae-4cf1-8843-fa63bee14fde" providerId="ADAL" clId="{5B883DA1-DD95-4CDE-95DD-51AE6D9D97DF}" dt="2021-02-23T15:38:00.349" v="346" actId="478"/>
-          <ac:cxnSpMkLst>
-            <pc:docMk/>
-            <pc:sldMk cId="333425768" sldId="259"/>
-            <ac:cxnSpMk id="34" creationId="{F48287DE-601B-407C-B264-960AA84371CD}"/>
-          </ac:cxnSpMkLst>
-        </pc:cxnChg>
-        <pc:cxnChg chg="add mod">
-          <ac:chgData name="Cosmin Covrig" userId="8dcd05c6-e7ae-4cf1-8843-fa63bee14fde" providerId="ADAL" clId="{5B883DA1-DD95-4CDE-95DD-51AE6D9D97DF}" dt="2021-02-23T15:39:05.811" v="372" actId="1076"/>
-          <ac:cxnSpMkLst>
-            <pc:docMk/>
-            <pc:sldMk cId="333425768" sldId="259"/>
-            <ac:cxnSpMk id="36" creationId="{6A8E7B63-A7E8-4333-BE03-5712DFB50650}"/>
-          </ac:cxnSpMkLst>
-        </pc:cxnChg>
-      </pc:sldChg>
-      <pc:sldChg chg="modSp mod">
-        <pc:chgData name="Cosmin Covrig" userId="8dcd05c6-e7ae-4cf1-8843-fa63bee14fde" providerId="ADAL" clId="{5B883DA1-DD95-4CDE-95DD-51AE6D9D97DF}" dt="2021-02-23T15:45:17.293" v="537" actId="20577"/>
-        <pc:sldMkLst>
-          <pc:docMk/>
-          <pc:sldMk cId="993698962" sldId="260"/>
-        </pc:sldMkLst>
-        <pc:graphicFrameChg chg="modGraphic">
-          <ac:chgData name="Cosmin Covrig" userId="8dcd05c6-e7ae-4cf1-8843-fa63bee14fde" providerId="ADAL" clId="{5B883DA1-DD95-4CDE-95DD-51AE6D9D97DF}" dt="2021-02-23T15:45:17.293" v="537" actId="20577"/>
-          <ac:graphicFrameMkLst>
-            <pc:docMk/>
-            <pc:sldMk cId="993698962" sldId="260"/>
-            <ac:graphicFrameMk id="16" creationId="{A0796847-9761-460A-A648-1AF901ED793F}"/>
-          </ac:graphicFrameMkLst>
-        </pc:graphicFrameChg>
-      </pc:sldChg>
-      <pc:sldChg chg="addSp delSp modSp mod addCm delCm">
-        <pc:chgData name="Cosmin Covrig" userId="8dcd05c6-e7ae-4cf1-8843-fa63bee14fde" providerId="ADAL" clId="{5B883DA1-DD95-4CDE-95DD-51AE6D9D97DF}" dt="2021-02-25T15:21:43.976" v="2140" actId="1076"/>
-        <pc:sldMkLst>
-          <pc:docMk/>
-          <pc:sldMk cId="1589364513" sldId="261"/>
-        </pc:sldMkLst>
-        <pc:spChg chg="mod">
-          <ac:chgData name="Cosmin Covrig" userId="8dcd05c6-e7ae-4cf1-8843-fa63bee14fde" providerId="ADAL" clId="{5B883DA1-DD95-4CDE-95DD-51AE6D9D97DF}" dt="2021-02-25T15:21:42.300" v="2139" actId="1076"/>
-          <ac:spMkLst>
-            <pc:docMk/>
-            <pc:sldMk cId="1589364513" sldId="261"/>
-            <ac:spMk id="15" creationId="{996901F8-D239-4FBE-BE12-BDF531202516}"/>
-          </ac:spMkLst>
-        </pc:spChg>
-        <pc:spChg chg="add mod">
-          <ac:chgData name="Cosmin Covrig" userId="8dcd05c6-e7ae-4cf1-8843-fa63bee14fde" providerId="ADAL" clId="{5B883DA1-DD95-4CDE-95DD-51AE6D9D97DF}" dt="2021-02-25T15:20:38.213" v="2067" actId="20577"/>
-          <ac:spMkLst>
-            <pc:docMk/>
-            <pc:sldMk cId="1589364513" sldId="261"/>
-            <ac:spMk id="17" creationId="{458AAD0D-FF1A-4FAA-8675-3C98E84EBA78}"/>
-          </ac:spMkLst>
-        </pc:spChg>
-        <pc:spChg chg="add mod">
-          <ac:chgData name="Cosmin Covrig" userId="8dcd05c6-e7ae-4cf1-8843-fa63bee14fde" providerId="ADAL" clId="{5B883DA1-DD95-4CDE-95DD-51AE6D9D97DF}" dt="2021-02-25T15:21:08.148" v="2108" actId="1076"/>
-          <ac:spMkLst>
-            <pc:docMk/>
-            <pc:sldMk cId="1589364513" sldId="261"/>
-            <ac:spMk id="21" creationId="{19F8C2F7-A96A-4235-9614-141D5E28E019}"/>
-          </ac:spMkLst>
-        </pc:spChg>
-        <pc:spChg chg="add mod">
-          <ac:chgData name="Cosmin Covrig" userId="8dcd05c6-e7ae-4cf1-8843-fa63bee14fde" providerId="ADAL" clId="{5B883DA1-DD95-4CDE-95DD-51AE6D9D97DF}" dt="2021-02-25T15:21:43.976" v="2140" actId="1076"/>
-          <ac:spMkLst>
-            <pc:docMk/>
-            <pc:sldMk cId="1589364513" sldId="261"/>
-            <ac:spMk id="24" creationId="{8B8F65C5-B19E-4063-B83C-C4E97229C42A}"/>
-          </ac:spMkLst>
-        </pc:spChg>
-        <pc:spChg chg="add mod">
-          <ac:chgData name="Cosmin Covrig" userId="8dcd05c6-e7ae-4cf1-8843-fa63bee14fde" providerId="ADAL" clId="{5B883DA1-DD95-4CDE-95DD-51AE6D9D97DF}" dt="2021-02-23T16:04:02.705" v="589" actId="1076"/>
-          <ac:spMkLst>
-            <pc:docMk/>
-            <pc:sldMk cId="1589364513" sldId="261"/>
-            <ac:spMk id="42" creationId="{8A8CE5DA-B8ED-477A-A1A3-8D22C7A3A270}"/>
-          </ac:spMkLst>
-        </pc:spChg>
-        <pc:spChg chg="add mod">
-          <ac:chgData name="Cosmin Covrig" userId="8dcd05c6-e7ae-4cf1-8843-fa63bee14fde" providerId="ADAL" clId="{5B883DA1-DD95-4CDE-95DD-51AE6D9D97DF}" dt="2021-02-23T16:03:50.813" v="576" actId="20577"/>
-          <ac:spMkLst>
-            <pc:docMk/>
-            <pc:sldMk cId="1589364513" sldId="261"/>
-            <ac:spMk id="44" creationId="{AE918D52-B0D3-43ED-975B-4AC8453E543A}"/>
-          </ac:spMkLst>
-        </pc:spChg>
-        <pc:spChg chg="add del mod">
-          <ac:chgData name="Cosmin Covrig" userId="8dcd05c6-e7ae-4cf1-8843-fa63bee14fde" providerId="ADAL" clId="{5B883DA1-DD95-4CDE-95DD-51AE6D9D97DF}" dt="2021-02-23T16:03:59.900" v="582"/>
-          <ac:spMkLst>
-            <pc:docMk/>
-            <pc:sldMk cId="1589364513" sldId="261"/>
-            <ac:spMk id="46" creationId="{19086F5B-698B-4A85-9760-45C5327EDC0D}"/>
-          </ac:spMkLst>
-        </pc:spChg>
-        <pc:spChg chg="add del mod">
-          <ac:chgData name="Cosmin Covrig" userId="8dcd05c6-e7ae-4cf1-8843-fa63bee14fde" providerId="ADAL" clId="{5B883DA1-DD95-4CDE-95DD-51AE6D9D97DF}" dt="2021-02-23T16:03:59.901" v="584"/>
-          <ac:spMkLst>
-            <pc:docMk/>
-            <pc:sldMk cId="1589364513" sldId="261"/>
-            <ac:spMk id="48" creationId="{C49D5298-CDEA-4863-B700-D153BA18D837}"/>
-          </ac:spMkLst>
-        </pc:spChg>
-        <pc:spChg chg="add del mod">
-          <ac:chgData name="Cosmin Covrig" userId="8dcd05c6-e7ae-4cf1-8843-fa63bee14fde" providerId="ADAL" clId="{5B883DA1-DD95-4CDE-95DD-51AE6D9D97DF}" dt="2021-02-23T16:03:59.901" v="586"/>
-          <ac:spMkLst>
-            <pc:docMk/>
-            <pc:sldMk cId="1589364513" sldId="261"/>
-            <ac:spMk id="49" creationId="{77A0A206-6593-4080-89B2-1BA4FB6F22FB}"/>
-          </ac:spMkLst>
-        </pc:spChg>
-        <pc:spChg chg="add del mod">
-          <ac:chgData name="Cosmin Covrig" userId="8dcd05c6-e7ae-4cf1-8843-fa63bee14fde" providerId="ADAL" clId="{5B883DA1-DD95-4CDE-95DD-51AE6D9D97DF}" dt="2021-02-23T16:03:59.902" v="588"/>
-          <ac:spMkLst>
-            <pc:docMk/>
-            <pc:sldMk cId="1589364513" sldId="261"/>
-            <ac:spMk id="52" creationId="{AB64E590-2961-4A24-A65E-C8FFBA267870}"/>
-          </ac:spMkLst>
-        </pc:spChg>
-        <pc:spChg chg="add del mod">
-          <ac:chgData name="Cosmin Covrig" userId="8dcd05c6-e7ae-4cf1-8843-fa63bee14fde" providerId="ADAL" clId="{5B883DA1-DD95-4CDE-95DD-51AE6D9D97DF}" dt="2021-02-23T16:04:06.653" v="591"/>
-          <ac:spMkLst>
-            <pc:docMk/>
-            <pc:sldMk cId="1589364513" sldId="261"/>
-            <ac:spMk id="54" creationId="{9FAF060E-0A3F-4FF2-AAF9-C23EB69B165B}"/>
-          </ac:spMkLst>
-        </pc:spChg>
-        <pc:spChg chg="add del mod">
-          <ac:chgData name="Cosmin Covrig" userId="8dcd05c6-e7ae-4cf1-8843-fa63bee14fde" providerId="ADAL" clId="{5B883DA1-DD95-4CDE-95DD-51AE6D9D97DF}" dt="2021-02-23T16:04:06.653" v="591"/>
-          <ac:spMkLst>
-            <pc:docMk/>
-            <pc:sldMk cId="1589364513" sldId="261"/>
-            <ac:spMk id="56" creationId="{64640B80-B86E-48F0-A863-6A9D463C8048}"/>
-          </ac:spMkLst>
-        </pc:spChg>
-        <pc:spChg chg="add del mod">
-          <ac:chgData name="Cosmin Covrig" userId="8dcd05c6-e7ae-4cf1-8843-fa63bee14fde" providerId="ADAL" clId="{5B883DA1-DD95-4CDE-95DD-51AE6D9D97DF}" dt="2021-02-23T16:04:06.653" v="591"/>
-          <ac:spMkLst>
-            <pc:docMk/>
-            <pc:sldMk cId="1589364513" sldId="261"/>
-            <ac:spMk id="58" creationId="{032590F7-413B-4D1E-B955-B84B56BA81B7}"/>
-          </ac:spMkLst>
-        </pc:spChg>
-        <pc:spChg chg="add del mod">
-          <ac:chgData name="Cosmin Covrig" userId="8dcd05c6-e7ae-4cf1-8843-fa63bee14fde" providerId="ADAL" clId="{5B883DA1-DD95-4CDE-95DD-51AE6D9D97DF}" dt="2021-02-23T16:04:06.653" v="591"/>
-          <ac:spMkLst>
-            <pc:docMk/>
-            <pc:sldMk cId="1589364513" sldId="261"/>
-            <ac:spMk id="60" creationId="{156BC95B-0DCF-49A7-81DC-9A7569EE7D1F}"/>
-          </ac:spMkLst>
-        </pc:spChg>
-        <pc:spChg chg="add del mod">
-          <ac:chgData name="Cosmin Covrig" userId="8dcd05c6-e7ae-4cf1-8843-fa63bee14fde" providerId="ADAL" clId="{5B883DA1-DD95-4CDE-95DD-51AE6D9D97DF}" dt="2021-02-23T16:04:06.653" v="591"/>
-          <ac:spMkLst>
-            <pc:docMk/>
-            <pc:sldMk cId="1589364513" sldId="261"/>
-            <ac:spMk id="61" creationId="{66D116B3-0B0D-400C-A968-38EAC961B23D}"/>
-          </ac:spMkLst>
-        </pc:spChg>
-        <pc:spChg chg="add del mod">
-          <ac:chgData name="Cosmin Covrig" userId="8dcd05c6-e7ae-4cf1-8843-fa63bee14fde" providerId="ADAL" clId="{5B883DA1-DD95-4CDE-95DD-51AE6D9D97DF}" dt="2021-02-23T16:04:06.653" v="591"/>
-          <ac:spMkLst>
-            <pc:docMk/>
-            <pc:sldMk cId="1589364513" sldId="261"/>
-            <ac:spMk id="64" creationId="{F64AD235-78AF-4470-B75A-D29530BEDC3C}"/>
-          </ac:spMkLst>
-        </pc:spChg>
-        <pc:spChg chg="add mod">
-          <ac:chgData name="Cosmin Covrig" userId="8dcd05c6-e7ae-4cf1-8843-fa63bee14fde" providerId="ADAL" clId="{5B883DA1-DD95-4CDE-95DD-51AE6D9D97DF}" dt="2021-02-23T16:04:25.926" v="599" actId="1076"/>
-          <ac:spMkLst>
-            <pc:docMk/>
-            <pc:sldMk cId="1589364513" sldId="261"/>
-            <ac:spMk id="66" creationId="{256824D0-4756-4F02-9C23-02371629FAB9}"/>
-          </ac:spMkLst>
-        </pc:spChg>
-        <pc:spChg chg="add mod">
-          <ac:chgData name="Cosmin Covrig" userId="8dcd05c6-e7ae-4cf1-8843-fa63bee14fde" providerId="ADAL" clId="{5B883DA1-DD95-4CDE-95DD-51AE6D9D97DF}" dt="2021-02-23T16:04:47.404" v="625" actId="20577"/>
-          <ac:spMkLst>
-            <pc:docMk/>
-            <pc:sldMk cId="1589364513" sldId="261"/>
-            <ac:spMk id="67" creationId="{301EE115-C734-4336-AFD2-E8D23D95071A}"/>
-          </ac:spMkLst>
-        </pc:spChg>
-        <pc:grpChg chg="mod">
-          <ac:chgData name="Cosmin Covrig" userId="8dcd05c6-e7ae-4cf1-8843-fa63bee14fde" providerId="ADAL" clId="{5B883DA1-DD95-4CDE-95DD-51AE6D9D97DF}" dt="2021-02-24T16:03:15.316" v="907" actId="1076"/>
-          <ac:grpSpMkLst>
-            <pc:docMk/>
-            <pc:sldMk cId="1589364513" sldId="261"/>
-            <ac:grpSpMk id="36" creationId="{6CA90000-77E0-4CAE-9225-FFB09472E6F5}"/>
-          </ac:grpSpMkLst>
-        </pc:grpChg>
-        <pc:graphicFrameChg chg="mod modGraphic">
-          <ac:chgData name="Cosmin Covrig" userId="8dcd05c6-e7ae-4cf1-8843-fa63bee14fde" providerId="ADAL" clId="{5B883DA1-DD95-4CDE-95DD-51AE6D9D97DF}" dt="2021-02-23T16:03:04.762" v="546"/>
-          <ac:graphicFrameMkLst>
-            <pc:docMk/>
-            <pc:sldMk cId="1589364513" sldId="261"/>
-            <ac:graphicFrameMk id="19" creationId="{41726E5D-D642-41C1-B509-5C2FB2519AD5}"/>
-          </ac:graphicFrameMkLst>
-        </pc:graphicFrameChg>
-        <pc:cxnChg chg="add">
-          <ac:chgData name="Cosmin Covrig" userId="8dcd05c6-e7ae-4cf1-8843-fa63bee14fde" providerId="ADAL" clId="{5B883DA1-DD95-4CDE-95DD-51AE6D9D97DF}" dt="2021-02-25T15:19:43.445" v="1993" actId="11529"/>
-          <ac:cxnSpMkLst>
-            <pc:docMk/>
-            <pc:sldMk cId="1589364513" sldId="261"/>
-            <ac:cxnSpMk id="3" creationId="{07D92036-193E-4816-B080-190908CB3B0C}"/>
-          </ac:cxnSpMkLst>
-        </pc:cxnChg>
-        <pc:cxnChg chg="add mod">
-          <ac:chgData name="Cosmin Covrig" userId="8dcd05c6-e7ae-4cf1-8843-fa63bee14fde" providerId="ADAL" clId="{5B883DA1-DD95-4CDE-95DD-51AE6D9D97DF}" dt="2021-02-25T15:20:50.236" v="2072" actId="14100"/>
-          <ac:cxnSpMkLst>
-            <pc:docMk/>
-            <pc:sldMk cId="1589364513" sldId="261"/>
-            <ac:cxnSpMk id="32" creationId="{328F02B4-924A-4BFA-9A87-73D7F29887A9}"/>
-          </ac:cxnSpMkLst>
-        </pc:cxnChg>
-        <pc:cxnChg chg="add mod">
-          <ac:chgData name="Cosmin Covrig" userId="8dcd05c6-e7ae-4cf1-8843-fa63bee14fde" providerId="ADAL" clId="{5B883DA1-DD95-4CDE-95DD-51AE6D9D97DF}" dt="2021-02-25T15:21:28.538" v="2114" actId="1076"/>
-          <ac:cxnSpMkLst>
-            <pc:docMk/>
-            <pc:sldMk cId="1589364513" sldId="261"/>
-            <ac:cxnSpMk id="37" creationId="{3C9362EB-4C0D-40E7-AA29-FCBED076BC2C}"/>
-          </ac:cxnSpMkLst>
-        </pc:cxnChg>
-        <pc:cxnChg chg="add mod">
-          <ac:chgData name="Cosmin Covrig" userId="8dcd05c6-e7ae-4cf1-8843-fa63bee14fde" providerId="ADAL" clId="{5B883DA1-DD95-4CDE-95DD-51AE6D9D97DF}" dt="2021-02-23T16:03:31.608" v="548" actId="1076"/>
-          <ac:cxnSpMkLst>
-            <pc:docMk/>
-            <pc:sldMk cId="1589364513" sldId="261"/>
-            <ac:cxnSpMk id="43" creationId="{D75AD146-6FA3-4C9F-8923-982A9D45E7F0}"/>
-          </ac:cxnSpMkLst>
-        </pc:cxnChg>
-        <pc:cxnChg chg="add mod">
-          <ac:chgData name="Cosmin Covrig" userId="8dcd05c6-e7ae-4cf1-8843-fa63bee14fde" providerId="ADAL" clId="{5B883DA1-DD95-4CDE-95DD-51AE6D9D97DF}" dt="2021-02-23T16:03:31.608" v="548" actId="1076"/>
-          <ac:cxnSpMkLst>
-            <pc:docMk/>
-            <pc:sldMk cId="1589364513" sldId="261"/>
-            <ac:cxnSpMk id="45" creationId="{391543EA-460E-4EA3-BA80-F6225A6C1593}"/>
-          </ac:cxnSpMkLst>
-        </pc:cxnChg>
-        <pc:cxnChg chg="add mod">
-          <ac:chgData name="Cosmin Covrig" userId="8dcd05c6-e7ae-4cf1-8843-fa63bee14fde" providerId="ADAL" clId="{5B883DA1-DD95-4CDE-95DD-51AE6D9D97DF}" dt="2021-02-23T16:03:31.608" v="548" actId="1076"/>
-          <ac:cxnSpMkLst>
-            <pc:docMk/>
-            <pc:sldMk cId="1589364513" sldId="261"/>
-            <ac:cxnSpMk id="47" creationId="{000C9A60-38C2-4494-98E5-35A87C0A5E02}"/>
-          </ac:cxnSpMkLst>
-        </pc:cxnChg>
-        <pc:cxnChg chg="add mod">
-          <ac:chgData name="Cosmin Covrig" userId="8dcd05c6-e7ae-4cf1-8843-fa63bee14fde" providerId="ADAL" clId="{5B883DA1-DD95-4CDE-95DD-51AE6D9D97DF}" dt="2021-02-23T16:03:31.608" v="548" actId="1076"/>
-          <ac:cxnSpMkLst>
-            <pc:docMk/>
-            <pc:sldMk cId="1589364513" sldId="261"/>
-            <ac:cxnSpMk id="50" creationId="{384AC024-BE20-44B9-85B2-DFA3D272CA6D}"/>
-          </ac:cxnSpMkLst>
-        </pc:cxnChg>
-        <pc:cxnChg chg="add mod">
-          <ac:chgData name="Cosmin Covrig" userId="8dcd05c6-e7ae-4cf1-8843-fa63bee14fde" providerId="ADAL" clId="{5B883DA1-DD95-4CDE-95DD-51AE6D9D97DF}" dt="2021-02-23T16:03:31.608" v="548" actId="1076"/>
-          <ac:cxnSpMkLst>
-            <pc:docMk/>
-            <pc:sldMk cId="1589364513" sldId="261"/>
-            <ac:cxnSpMk id="51" creationId="{1DB7AF3D-1843-449C-8EC4-C37BA6C0644D}"/>
-          </ac:cxnSpMkLst>
-        </pc:cxnChg>
-        <pc:cxnChg chg="add mod">
-          <ac:chgData name="Cosmin Covrig" userId="8dcd05c6-e7ae-4cf1-8843-fa63bee14fde" providerId="ADAL" clId="{5B883DA1-DD95-4CDE-95DD-51AE6D9D97DF}" dt="2021-02-23T16:05:36.990" v="627" actId="1076"/>
-          <ac:cxnSpMkLst>
-            <pc:docMk/>
-            <pc:sldMk cId="1589364513" sldId="261"/>
-            <ac:cxnSpMk id="53" creationId="{83C788E5-8096-4B8A-AE1F-B299DB9A5AEA}"/>
-          </ac:cxnSpMkLst>
-        </pc:cxnChg>
-        <pc:cxnChg chg="add del mod">
-          <ac:chgData name="Cosmin Covrig" userId="8dcd05c6-e7ae-4cf1-8843-fa63bee14fde" providerId="ADAL" clId="{5B883DA1-DD95-4CDE-95DD-51AE6D9D97DF}" dt="2021-02-23T16:04:06.653" v="591"/>
-          <ac:cxnSpMkLst>
-            <pc:docMk/>
-            <pc:sldMk cId="1589364513" sldId="261"/>
-            <ac:cxnSpMk id="55" creationId="{6845A2A6-E678-4F3D-AFBD-5B9446B7460B}"/>
-          </ac:cxnSpMkLst>
-        </pc:cxnChg>
-        <pc:cxnChg chg="add del mod">
-          <ac:chgData name="Cosmin Covrig" userId="8dcd05c6-e7ae-4cf1-8843-fa63bee14fde" providerId="ADAL" clId="{5B883DA1-DD95-4CDE-95DD-51AE6D9D97DF}" dt="2021-02-23T16:04:06.653" v="591"/>
-          <ac:cxnSpMkLst>
-            <pc:docMk/>
-            <pc:sldMk cId="1589364513" sldId="261"/>
-            <ac:cxnSpMk id="57" creationId="{AE3DFF05-37BB-4D1D-9F27-E60EBA5C6CB8}"/>
-          </ac:cxnSpMkLst>
-        </pc:cxnChg>
-        <pc:cxnChg chg="add del mod">
-          <ac:chgData name="Cosmin Covrig" userId="8dcd05c6-e7ae-4cf1-8843-fa63bee14fde" providerId="ADAL" clId="{5B883DA1-DD95-4CDE-95DD-51AE6D9D97DF}" dt="2021-02-23T16:04:06.653" v="591"/>
-          <ac:cxnSpMkLst>
-            <pc:docMk/>
-            <pc:sldMk cId="1589364513" sldId="261"/>
-            <ac:cxnSpMk id="59" creationId="{E7BCA47A-D9CF-4796-874F-7AE3F3DB1074}"/>
-          </ac:cxnSpMkLst>
-        </pc:cxnChg>
-        <pc:cxnChg chg="add del mod">
-          <ac:chgData name="Cosmin Covrig" userId="8dcd05c6-e7ae-4cf1-8843-fa63bee14fde" providerId="ADAL" clId="{5B883DA1-DD95-4CDE-95DD-51AE6D9D97DF}" dt="2021-02-23T16:04:06.653" v="591"/>
-          <ac:cxnSpMkLst>
-            <pc:docMk/>
-            <pc:sldMk cId="1589364513" sldId="261"/>
-            <ac:cxnSpMk id="62" creationId="{91930BE5-FAA3-4F4B-BE8B-04623F7026D8}"/>
-          </ac:cxnSpMkLst>
-        </pc:cxnChg>
-        <pc:cxnChg chg="add del mod">
-          <ac:chgData name="Cosmin Covrig" userId="8dcd05c6-e7ae-4cf1-8843-fa63bee14fde" providerId="ADAL" clId="{5B883DA1-DD95-4CDE-95DD-51AE6D9D97DF}" dt="2021-02-23T16:04:06.653" v="591"/>
-          <ac:cxnSpMkLst>
-            <pc:docMk/>
-            <pc:sldMk cId="1589364513" sldId="261"/>
-            <ac:cxnSpMk id="63" creationId="{03D851AE-DC78-4690-B170-F85D5327288F}"/>
-          </ac:cxnSpMkLst>
-        </pc:cxnChg>
-        <pc:cxnChg chg="add del mod">
-          <ac:chgData name="Cosmin Covrig" userId="8dcd05c6-e7ae-4cf1-8843-fa63bee14fde" providerId="ADAL" clId="{5B883DA1-DD95-4CDE-95DD-51AE6D9D97DF}" dt="2021-02-23T16:04:06.653" v="591"/>
-          <ac:cxnSpMkLst>
-            <pc:docMk/>
-            <pc:sldMk cId="1589364513" sldId="261"/>
-            <ac:cxnSpMk id="65" creationId="{55E91DB4-658D-45A2-A646-8AEE0B2BDC70}"/>
-          </ac:cxnSpMkLst>
-        </pc:cxnChg>
-      </pc:sldChg>
-      <pc:sldChg chg="addSp delSp modSp mod">
-        <pc:chgData name="Cosmin Covrig" userId="8dcd05c6-e7ae-4cf1-8843-fa63bee14fde" providerId="ADAL" clId="{5B883DA1-DD95-4CDE-95DD-51AE6D9D97DF}" dt="2021-02-24T15:19:08.109" v="676" actId="20577"/>
-        <pc:sldMkLst>
-          <pc:docMk/>
-          <pc:sldMk cId="394540411" sldId="262"/>
-        </pc:sldMkLst>
-        <pc:spChg chg="mod">
-          <ac:chgData name="Cosmin Covrig" userId="8dcd05c6-e7ae-4cf1-8843-fa63bee14fde" providerId="ADAL" clId="{5B883DA1-DD95-4CDE-95DD-51AE6D9D97DF}" dt="2021-02-24T15:16:52.536" v="655" actId="1076"/>
-          <ac:spMkLst>
-            <pc:docMk/>
-            <pc:sldMk cId="394540411" sldId="262"/>
-            <ac:spMk id="2" creationId="{8F7B72DB-088E-47AC-8C43-CBFE2A376B4F}"/>
-          </ac:spMkLst>
-        </pc:spChg>
-        <pc:spChg chg="del">
-          <ac:chgData name="Cosmin Covrig" userId="8dcd05c6-e7ae-4cf1-8843-fa63bee14fde" providerId="ADAL" clId="{5B883DA1-DD95-4CDE-95DD-51AE6D9D97DF}" dt="2021-02-24T15:12:40.876" v="628" actId="478"/>
-          <ac:spMkLst>
-            <pc:docMk/>
-            <pc:sldMk cId="394540411" sldId="262"/>
-            <ac:spMk id="3" creationId="{9430DC0F-5202-4925-85CA-CFB36A6F1941}"/>
-          </ac:spMkLst>
-        </pc:spChg>
-        <pc:spChg chg="mod">
-          <ac:chgData name="Cosmin Covrig" userId="8dcd05c6-e7ae-4cf1-8843-fa63bee14fde" providerId="ADAL" clId="{5B883DA1-DD95-4CDE-95DD-51AE6D9D97DF}" dt="2021-02-24T15:19:04.261" v="675" actId="20577"/>
-          <ac:spMkLst>
-            <pc:docMk/>
-            <pc:sldMk cId="394540411" sldId="262"/>
-            <ac:spMk id="4" creationId="{94955620-8AF1-4E36-A0FC-6CFA5A593F4F}"/>
-          </ac:spMkLst>
-        </pc:spChg>
-        <pc:spChg chg="mod">
-          <ac:chgData name="Cosmin Covrig" userId="8dcd05c6-e7ae-4cf1-8843-fa63bee14fde" providerId="ADAL" clId="{5B883DA1-DD95-4CDE-95DD-51AE6D9D97DF}" dt="2021-02-24T15:19:08.109" v="676" actId="20577"/>
-          <ac:spMkLst>
-            <pc:docMk/>
-            <pc:sldMk cId="394540411" sldId="262"/>
-            <ac:spMk id="6" creationId="{D4CE9785-FFE6-4446-B083-C47205E26F93}"/>
-          </ac:spMkLst>
-        </pc:spChg>
-        <pc:spChg chg="add mod">
-          <ac:chgData name="Cosmin Covrig" userId="8dcd05c6-e7ae-4cf1-8843-fa63bee14fde" providerId="ADAL" clId="{5B883DA1-DD95-4CDE-95DD-51AE6D9D97DF}" dt="2021-02-24T15:18:27.049" v="670" actId="1076"/>
-          <ac:spMkLst>
-            <pc:docMk/>
-            <pc:sldMk cId="394540411" sldId="262"/>
-            <ac:spMk id="10" creationId="{D02894A9-78A9-45D5-8D28-C5E990170819}"/>
-          </ac:spMkLst>
-        </pc:spChg>
-      </pc:sldChg>
-      <pc:sldChg chg="addSp delSp modSp mod">
-        <pc:chgData name="Cosmin Covrig" userId="8dcd05c6-e7ae-4cf1-8843-fa63bee14fde" providerId="ADAL" clId="{5B883DA1-DD95-4CDE-95DD-51AE6D9D97DF}" dt="2021-02-25T15:25:34.337" v="2142" actId="1076"/>
-        <pc:sldMkLst>
-          <pc:docMk/>
-          <pc:sldMk cId="1786802942" sldId="263"/>
-        </pc:sldMkLst>
-        <pc:spChg chg="mod">
-          <ac:chgData name="Cosmin Covrig" userId="8dcd05c6-e7ae-4cf1-8843-fa63bee14fde" providerId="ADAL" clId="{5B883DA1-DD95-4CDE-95DD-51AE6D9D97DF}" dt="2021-02-24T15:27:06.193" v="703" actId="20577"/>
-          <ac:spMkLst>
-            <pc:docMk/>
-            <pc:sldMk cId="1786802942" sldId="263"/>
-            <ac:spMk id="13" creationId="{1F69C2E9-5E22-4E69-A9FB-E9A9469E889A}"/>
-          </ac:spMkLst>
-        </pc:spChg>
-        <pc:spChg chg="add mod">
-          <ac:chgData name="Cosmin Covrig" userId="8dcd05c6-e7ae-4cf1-8843-fa63bee14fde" providerId="ADAL" clId="{5B883DA1-DD95-4CDE-95DD-51AE6D9D97DF}" dt="2021-02-25T15:25:34.337" v="2142" actId="1076"/>
-          <ac:spMkLst>
-            <pc:docMk/>
-            <pc:sldMk cId="1786802942" sldId="263"/>
-            <ac:spMk id="17" creationId="{0577128B-D284-4480-A772-46B30EB6E073}"/>
-          </ac:spMkLst>
-        </pc:spChg>
-        <pc:picChg chg="add del mod">
-          <ac:chgData name="Cosmin Covrig" userId="8dcd05c6-e7ae-4cf1-8843-fa63bee14fde" providerId="ADAL" clId="{5B883DA1-DD95-4CDE-95DD-51AE6D9D97DF}" dt="2021-02-24T15:56:17.746" v="771" actId="21"/>
-          <ac:picMkLst>
-            <pc:docMk/>
-            <pc:sldMk cId="1786802942" sldId="263"/>
-            <ac:picMk id="24" creationId="{2E53868D-9D10-49C6-B12A-72F0685FCD51}"/>
-          </ac:picMkLst>
-        </pc:picChg>
-      </pc:sldChg>
-      <pc:sldChg chg="addSp modSp mod ord">
-        <pc:chgData name="Cosmin Covrig" userId="8dcd05c6-e7ae-4cf1-8843-fa63bee14fde" providerId="ADAL" clId="{5B883DA1-DD95-4CDE-95DD-51AE6D9D97DF}" dt="2021-02-25T15:18:12.551" v="1992" actId="1076"/>
-        <pc:sldMkLst>
-          <pc:docMk/>
-          <pc:sldMk cId="3014927007" sldId="265"/>
-        </pc:sldMkLst>
-        <pc:spChg chg="mod">
-          <ac:chgData name="Cosmin Covrig" userId="8dcd05c6-e7ae-4cf1-8843-fa63bee14fde" providerId="ADAL" clId="{5B883DA1-DD95-4CDE-95DD-51AE6D9D97DF}" dt="2021-02-24T15:52:13.980" v="717" actId="20577"/>
-          <ac:spMkLst>
-            <pc:docMk/>
-            <pc:sldMk cId="3014927007" sldId="265"/>
-            <ac:spMk id="6" creationId="{DB47EDD5-893F-46D8-A3F8-85A9340714AD}"/>
-          </ac:spMkLst>
-        </pc:spChg>
-        <pc:spChg chg="mod">
-          <ac:chgData name="Cosmin Covrig" userId="8dcd05c6-e7ae-4cf1-8843-fa63bee14fde" providerId="ADAL" clId="{5B883DA1-DD95-4CDE-95DD-51AE6D9D97DF}" dt="2021-02-24T15:54:44.057" v="747" actId="20577"/>
-          <ac:spMkLst>
-            <pc:docMk/>
-            <pc:sldMk cId="3014927007" sldId="265"/>
-            <ac:spMk id="11" creationId="{AF6401E5-CC2A-483D-B1B3-7780B52F87C5}"/>
-          </ac:spMkLst>
-        </pc:spChg>
-        <pc:spChg chg="mod">
-          <ac:chgData name="Cosmin Covrig" userId="8dcd05c6-e7ae-4cf1-8843-fa63bee14fde" providerId="ADAL" clId="{5B883DA1-DD95-4CDE-95DD-51AE6D9D97DF}" dt="2021-02-25T15:16:52.152" v="1944" actId="1076"/>
-          <ac:spMkLst>
-            <pc:docMk/>
-            <pc:sldMk cId="3014927007" sldId="265"/>
-            <ac:spMk id="14" creationId="{448B21C1-E950-4667-9EF5-AABA97E9CD03}"/>
-          </ac:spMkLst>
-        </pc:spChg>
-        <pc:spChg chg="mod">
-          <ac:chgData name="Cosmin Covrig" userId="8dcd05c6-e7ae-4cf1-8843-fa63bee14fde" providerId="ADAL" clId="{5B883DA1-DD95-4CDE-95DD-51AE6D9D97DF}" dt="2021-02-24T15:55:23.147" v="760" actId="20577"/>
-          <ac:spMkLst>
-            <pc:docMk/>
-            <pc:sldMk cId="3014927007" sldId="265"/>
-            <ac:spMk id="25" creationId="{2DFD8665-C45E-4B46-95D6-F7A4EA50B05E}"/>
-          </ac:spMkLst>
-        </pc:spChg>
-        <pc:spChg chg="add mod">
-          <ac:chgData name="Cosmin Covrig" userId="8dcd05c6-e7ae-4cf1-8843-fa63bee14fde" providerId="ADAL" clId="{5B883DA1-DD95-4CDE-95DD-51AE6D9D97DF}" dt="2021-02-25T15:18:12.551" v="1992" actId="1076"/>
-          <ac:spMkLst>
-            <pc:docMk/>
-            <pc:sldMk cId="3014927007" sldId="265"/>
-            <ac:spMk id="28" creationId="{BF74927B-E42D-4492-8997-E8861B952E42}"/>
-          </ac:spMkLst>
-        </pc:spChg>
-        <pc:cxnChg chg="add">
-          <ac:chgData name="Cosmin Covrig" userId="8dcd05c6-e7ae-4cf1-8843-fa63bee14fde" providerId="ADAL" clId="{5B883DA1-DD95-4CDE-95DD-51AE6D9D97DF}" dt="2021-02-25T15:17:05.980" v="1945" actId="11529"/>
-          <ac:cxnSpMkLst>
-            <pc:docMk/>
-            <pc:sldMk cId="3014927007" sldId="265"/>
-            <ac:cxnSpMk id="3" creationId="{6E7616F9-5EA7-45D2-AE88-1BCC72472482}"/>
-          </ac:cxnSpMkLst>
-        </pc:cxnChg>
-      </pc:sldChg>
-      <pc:sldChg chg="addSp delSp modSp new mod">
-        <pc:chgData name="Cosmin Covrig" userId="8dcd05c6-e7ae-4cf1-8843-fa63bee14fde" providerId="ADAL" clId="{5B883DA1-DD95-4CDE-95DD-51AE6D9D97DF}" dt="2021-02-24T16:19:30.092" v="1691" actId="20577"/>
-        <pc:sldMkLst>
-          <pc:docMk/>
-          <pc:sldMk cId="2324497481" sldId="266"/>
-        </pc:sldMkLst>
-        <pc:spChg chg="del">
-          <ac:chgData name="Cosmin Covrig" userId="8dcd05c6-e7ae-4cf1-8843-fa63bee14fde" providerId="ADAL" clId="{5B883DA1-DD95-4CDE-95DD-51AE6D9D97DF}" dt="2021-02-24T15:56:21.593" v="772" actId="478"/>
-          <ac:spMkLst>
-            <pc:docMk/>
-            <pc:sldMk cId="2324497481" sldId="266"/>
-            <ac:spMk id="3" creationId="{C7A4C7F9-8108-4A00-9A34-50DF360FC17E}"/>
-          </ac:spMkLst>
-        </pc:spChg>
-        <pc:spChg chg="add mod">
-          <ac:chgData name="Cosmin Covrig" userId="8dcd05c6-e7ae-4cf1-8843-fa63bee14fde" providerId="ADAL" clId="{5B883DA1-DD95-4CDE-95DD-51AE6D9D97DF}" dt="2021-02-24T16:01:27.020" v="827" actId="1076"/>
-          <ac:spMkLst>
-            <pc:docMk/>
-            <pc:sldMk cId="2324497481" sldId="266"/>
-            <ac:spMk id="17" creationId="{B6331B00-7FEB-4227-873A-53203A7F85A3}"/>
-          </ac:spMkLst>
-        </pc:spChg>
-        <pc:spChg chg="add mod">
-          <ac:chgData name="Cosmin Covrig" userId="8dcd05c6-e7ae-4cf1-8843-fa63bee14fde" providerId="ADAL" clId="{5B883DA1-DD95-4CDE-95DD-51AE6D9D97DF}" dt="2021-02-24T16:01:37.964" v="842" actId="20577"/>
-          <ac:spMkLst>
-            <pc:docMk/>
-            <pc:sldMk cId="2324497481" sldId="266"/>
-            <ac:spMk id="18" creationId="{85DB8975-1F61-45C9-B0A3-063706E36F8B}"/>
-          </ac:spMkLst>
-        </pc:spChg>
-        <pc:spChg chg="add mod">
-          <ac:chgData name="Cosmin Covrig" userId="8dcd05c6-e7ae-4cf1-8843-fa63bee14fde" providerId="ADAL" clId="{5B883DA1-DD95-4CDE-95DD-51AE6D9D97DF}" dt="2021-02-24T16:02:40.579" v="860" actId="1076"/>
-          <ac:spMkLst>
-            <pc:docMk/>
-            <pc:sldMk cId="2324497481" sldId="266"/>
-            <ac:spMk id="19" creationId="{AE674722-9B95-49E8-918D-98F1AB38D4D4}"/>
-          </ac:spMkLst>
-        </pc:spChg>
-        <pc:spChg chg="add mod">
-          <ac:chgData name="Cosmin Covrig" userId="8dcd05c6-e7ae-4cf1-8843-fa63bee14fde" providerId="ADAL" clId="{5B883DA1-DD95-4CDE-95DD-51AE6D9D97DF}" dt="2021-02-24T16:02:12.958" v="853" actId="1076"/>
-          <ac:spMkLst>
-            <pc:docMk/>
-            <pc:sldMk cId="2324497481" sldId="266"/>
-            <ac:spMk id="20" creationId="{A2944EC3-30DC-4C52-B8FA-49908EB175E1}"/>
-          </ac:spMkLst>
-        </pc:spChg>
-        <pc:spChg chg="add mod">
-          <ac:chgData name="Cosmin Covrig" userId="8dcd05c6-e7ae-4cf1-8843-fa63bee14fde" providerId="ADAL" clId="{5B883DA1-DD95-4CDE-95DD-51AE6D9D97DF}" dt="2021-02-24T16:02:52.960" v="903" actId="20577"/>
-          <ac:spMkLst>
-            <pc:docMk/>
-            <pc:sldMk cId="2324497481" sldId="266"/>
-            <ac:spMk id="21" creationId="{CA0D1A06-D4D4-40F0-A643-459D89A6433B}"/>
-          </ac:spMkLst>
-        </pc:spChg>
-        <pc:spChg chg="mod">
-          <ac:chgData name="Cosmin Covrig" userId="8dcd05c6-e7ae-4cf1-8843-fa63bee14fde" providerId="ADAL" clId="{5B883DA1-DD95-4CDE-95DD-51AE6D9D97DF}" dt="2021-02-24T16:03:19.066" v="908"/>
-          <ac:spMkLst>
-            <pc:docMk/>
-            <pc:sldMk cId="2324497481" sldId="266"/>
-            <ac:spMk id="23" creationId="{3C1962F1-443B-4532-97AA-657ACEF8CB3E}"/>
-          </ac:spMkLst>
-        </pc:spChg>
-        <pc:spChg chg="mod">
-          <ac:chgData name="Cosmin Covrig" userId="8dcd05c6-e7ae-4cf1-8843-fa63bee14fde" providerId="ADAL" clId="{5B883DA1-DD95-4CDE-95DD-51AE6D9D97DF}" dt="2021-02-24T16:03:34.823" v="920" actId="404"/>
-          <ac:spMkLst>
-            <pc:docMk/>
-            <pc:sldMk cId="2324497481" sldId="266"/>
-            <ac:spMk id="24" creationId="{21F574AA-0D04-4E69-86FA-06FE4792AC4F}"/>
-          </ac:spMkLst>
-        </pc:spChg>
-        <pc:spChg chg="add mod">
-          <ac:chgData name="Cosmin Covrig" userId="8dcd05c6-e7ae-4cf1-8843-fa63bee14fde" providerId="ADAL" clId="{5B883DA1-DD95-4CDE-95DD-51AE6D9D97DF}" dt="2021-02-24T16:10:15.456" v="1220" actId="20577"/>
-          <ac:spMkLst>
-            <pc:docMk/>
-            <pc:sldMk cId="2324497481" sldId="266"/>
-            <ac:spMk id="27" creationId="{AC12C313-026D-45B4-94C1-6E80984EB425}"/>
-          </ac:spMkLst>
-        </pc:spChg>
-        <pc:spChg chg="add mod">
-          <ac:chgData name="Cosmin Covrig" userId="8dcd05c6-e7ae-4cf1-8843-fa63bee14fde" providerId="ADAL" clId="{5B883DA1-DD95-4CDE-95DD-51AE6D9D97DF}" dt="2021-02-24T16:15:58.063" v="1517" actId="20577"/>
-          <ac:spMkLst>
-            <pc:docMk/>
-            <pc:sldMk cId="2324497481" sldId="266"/>
-            <ac:spMk id="28" creationId="{30D9D0B0-45FA-434A-B1D2-AFB1ECE90E31}"/>
-          </ac:spMkLst>
-        </pc:spChg>
-        <pc:spChg chg="add mod">
-          <ac:chgData name="Cosmin Covrig" userId="8dcd05c6-e7ae-4cf1-8843-fa63bee14fde" providerId="ADAL" clId="{5B883DA1-DD95-4CDE-95DD-51AE6D9D97DF}" dt="2021-02-24T16:16:33.347" v="1559" actId="20577"/>
-          <ac:spMkLst>
-            <pc:docMk/>
-            <pc:sldMk cId="2324497481" sldId="266"/>
-            <ac:spMk id="29" creationId="{BA0F79BD-D5AE-4B2A-B84A-82CEEEFAA619}"/>
-          </ac:spMkLst>
-        </pc:spChg>
-        <pc:spChg chg="add mod">
-          <ac:chgData name="Cosmin Covrig" userId="8dcd05c6-e7ae-4cf1-8843-fa63bee14fde" providerId="ADAL" clId="{5B883DA1-DD95-4CDE-95DD-51AE6D9D97DF}" dt="2021-02-24T16:19:30.092" v="1691" actId="20577"/>
-          <ac:spMkLst>
-            <pc:docMk/>
-            <pc:sldMk cId="2324497481" sldId="266"/>
-            <ac:spMk id="30" creationId="{521879E8-0F8C-4E97-B175-151C277F7EC5}"/>
-          </ac:spMkLst>
-        </pc:spChg>
-        <pc:grpChg chg="add mod">
-          <ac:chgData name="Cosmin Covrig" userId="8dcd05c6-e7ae-4cf1-8843-fa63bee14fde" providerId="ADAL" clId="{5B883DA1-DD95-4CDE-95DD-51AE6D9D97DF}" dt="2021-02-24T16:03:48.183" v="923" actId="1076"/>
-          <ac:grpSpMkLst>
-            <pc:docMk/>
-            <pc:sldMk cId="2324497481" sldId="266"/>
-            <ac:grpSpMk id="22" creationId="{32FE173B-37C6-44AE-BB27-C58C1A5BC3E1}"/>
-          </ac:grpSpMkLst>
-        </pc:grpChg>
-        <pc:picChg chg="add del mod">
-          <ac:chgData name="Cosmin Covrig" userId="8dcd05c6-e7ae-4cf1-8843-fa63bee14fde" providerId="ADAL" clId="{5B883DA1-DD95-4CDE-95DD-51AE6D9D97DF}" dt="2021-02-24T16:04:13.007" v="932" actId="478"/>
-          <ac:picMkLst>
-            <pc:docMk/>
-            <pc:sldMk cId="2324497481" sldId="266"/>
-            <ac:picMk id="4" creationId="{F4D190AA-55A6-45F8-A6D4-FB7CFD8C6C37}"/>
-          </ac:picMkLst>
-        </pc:picChg>
-        <pc:cxnChg chg="add mod">
-          <ac:chgData name="Cosmin Covrig" userId="8dcd05c6-e7ae-4cf1-8843-fa63bee14fde" providerId="ADAL" clId="{5B883DA1-DD95-4CDE-95DD-51AE6D9D97DF}" dt="2021-02-24T16:01:03.305" v="806" actId="14100"/>
-          <ac:cxnSpMkLst>
-            <pc:docMk/>
-            <pc:sldMk cId="2324497481" sldId="266"/>
-            <ac:cxnSpMk id="15" creationId="{F178946D-1972-46F2-8813-DAB5C96ECBF4}"/>
-          </ac:cxnSpMkLst>
-        </pc:cxnChg>
-      </pc:sldChg>
-      <pc:sldChg chg="addSp delSp mod">
-        <pc:chgData name="Cosmin Covrig" userId="8dcd05c6-e7ae-4cf1-8843-fa63bee14fde" providerId="ADAL" clId="{5B883DA1-DD95-4CDE-95DD-51AE6D9D97DF}" dt="2021-02-25T15:07:29.591" v="1702" actId="478"/>
-        <pc:sldMkLst>
-          <pc:docMk/>
-          <pc:sldMk cId="3117809531" sldId="269"/>
-        </pc:sldMkLst>
-        <pc:spChg chg="add del">
-          <ac:chgData name="Cosmin Covrig" userId="8dcd05c6-e7ae-4cf1-8843-fa63bee14fde" providerId="ADAL" clId="{5B883DA1-DD95-4CDE-95DD-51AE6D9D97DF}" dt="2021-02-25T15:07:29.591" v="1702" actId="478"/>
-          <ac:spMkLst>
-            <pc:docMk/>
-            <pc:sldMk cId="3117809531" sldId="269"/>
-            <ac:spMk id="12" creationId="{F93313E5-301E-424B-8AF8-0605E8FF4AF0}"/>
-          </ac:spMkLst>
-        </pc:spChg>
-      </pc:sldChg>
-      <pc:sldChg chg="modSp mod">
-        <pc:chgData name="Cosmin Covrig" userId="8dcd05c6-e7ae-4cf1-8843-fa63bee14fde" providerId="ADAL" clId="{5B883DA1-DD95-4CDE-95DD-51AE6D9D97DF}" dt="2021-02-25T15:06:02.254" v="1700" actId="1076"/>
-        <pc:sldMkLst>
-          <pc:docMk/>
-          <pc:sldMk cId="4223315037" sldId="270"/>
-        </pc:sldMkLst>
-        <pc:spChg chg="mod">
-          <ac:chgData name="Cosmin Covrig" userId="8dcd05c6-e7ae-4cf1-8843-fa63bee14fde" providerId="ADAL" clId="{5B883DA1-DD95-4CDE-95DD-51AE6D9D97DF}" dt="2021-02-25T15:05:48.773" v="1696" actId="404"/>
-          <ac:spMkLst>
-            <pc:docMk/>
-            <pc:sldMk cId="4223315037" sldId="270"/>
-            <ac:spMk id="12" creationId="{0D98892E-E15C-40F3-9C07-F6CB17AC7EFA}"/>
-          </ac:spMkLst>
-        </pc:spChg>
-        <pc:grpChg chg="mod">
-          <ac:chgData name="Cosmin Covrig" userId="8dcd05c6-e7ae-4cf1-8843-fa63bee14fde" providerId="ADAL" clId="{5B883DA1-DD95-4CDE-95DD-51AE6D9D97DF}" dt="2021-02-25T15:06:02.254" v="1700" actId="1076"/>
-          <ac:grpSpMkLst>
-            <pc:docMk/>
-            <pc:sldMk cId="4223315037" sldId="270"/>
-            <ac:grpSpMk id="10" creationId="{139FAE9D-BC32-40B3-8279-7499EE484AAE}"/>
-          </ac:grpSpMkLst>
-        </pc:grpChg>
-        <pc:grpChg chg="mod">
-          <ac:chgData name="Cosmin Covrig" userId="8dcd05c6-e7ae-4cf1-8843-fa63bee14fde" providerId="ADAL" clId="{5B883DA1-DD95-4CDE-95DD-51AE6D9D97DF}" dt="2021-02-25T15:05:56.200" v="1699" actId="1076"/>
-          <ac:grpSpMkLst>
-            <pc:docMk/>
-            <pc:sldMk cId="4223315037" sldId="270"/>
-            <ac:grpSpMk id="18" creationId="{52DA999A-40E3-4DB9-8287-328DA7EB635A}"/>
-          </ac:grpSpMkLst>
-        </pc:grpChg>
-      </pc:sldChg>
-    </pc:docChg>
-  </pc:docChgLst>
   <pc:docChgLst>
     <pc:chgData name="Alex Dent" userId="S::100506322@unimail.derby.ac.uk::4d9ae5c4-03b0-4a4c-833c-428df8ac79a1" providerId="AD" clId="Web-{029DEA9D-38DA-3D54-DA2D-BED0612A7FB1}"/>
     <pc:docChg chg="modSld">
@@ -1262,33 +287,651 @@
     </pc:docChg>
   </pc:docChgLst>
   <pc:docChgLst>
-    <pc:chgData clId="Web-{029DEA9D-38DA-3D54-DA2D-BED0612A7FB1}"/>
-    <pc:docChg chg="modSld">
-      <pc:chgData name="" userId="" providerId="" clId="Web-{029DEA9D-38DA-3D54-DA2D-BED0612A7FB1}" dt="2021-02-23T14:51:43.627" v="0" actId="1076"/>
+    <pc:chgData name="Alex Dent" userId="S::100506322@unimail.derby.ac.uk::4d9ae5c4-03b0-4a4c-833c-428df8ac79a1" providerId="AD" clId="Web-{0E9030D5-4112-1BCC-7CBF-08F85C80D745}"/>
+    <pc:docChg chg="addSld delSld modSld">
+      <pc:chgData name="Alex Dent" userId="S::100506322@unimail.derby.ac.uk::4d9ae5c4-03b0-4a4c-833c-428df8ac79a1" providerId="AD" clId="Web-{0E9030D5-4112-1BCC-7CBF-08F85C80D745}" dt="2021-02-23T14:51:17.777" v="212"/>
       <pc:docMkLst>
         <pc:docMk/>
       </pc:docMkLst>
-      <pc:sldChg chg="modSp">
-        <pc:chgData name="" userId="" providerId="" clId="Web-{029DEA9D-38DA-3D54-DA2D-BED0612A7FB1}" dt="2021-02-23T14:51:43.627" v="0" actId="1076"/>
+      <pc:sldChg chg="addSp modSp">
+        <pc:chgData name="Alex Dent" userId="S::100506322@unimail.derby.ac.uk::4d9ae5c4-03b0-4a4c-833c-428df8ac79a1" providerId="AD" clId="Web-{0E9030D5-4112-1BCC-7CBF-08F85C80D745}" dt="2021-02-23T14:40:41.536" v="141" actId="1076"/>
+        <pc:sldMkLst>
+          <pc:docMk/>
+          <pc:sldMk cId="109857222" sldId="256"/>
+        </pc:sldMkLst>
+        <pc:spChg chg="mod">
+          <ac:chgData name="Alex Dent" userId="S::100506322@unimail.derby.ac.uk::4d9ae5c4-03b0-4a4c-833c-428df8ac79a1" providerId="AD" clId="Web-{0E9030D5-4112-1BCC-7CBF-08F85C80D745}" dt="2021-02-23T14:35:20.814" v="58" actId="20577"/>
+          <ac:spMkLst>
+            <pc:docMk/>
+            <pc:sldMk cId="109857222" sldId="256"/>
+            <ac:spMk id="2" creationId="{00000000-0000-0000-0000-000000000000}"/>
+          </ac:spMkLst>
+        </pc:spChg>
+        <pc:spChg chg="mod">
+          <ac:chgData name="Alex Dent" userId="S::100506322@unimail.derby.ac.uk::4d9ae5c4-03b0-4a4c-833c-428df8ac79a1" providerId="AD" clId="Web-{0E9030D5-4112-1BCC-7CBF-08F85C80D745}" dt="2021-02-23T14:37:34.972" v="95" actId="20577"/>
+          <ac:spMkLst>
+            <pc:docMk/>
+            <pc:sldMk cId="109857222" sldId="256"/>
+            <ac:spMk id="3" creationId="{00000000-0000-0000-0000-000000000000}"/>
+          </ac:spMkLst>
+        </pc:spChg>
+        <pc:spChg chg="add mod">
+          <ac:chgData name="Alex Dent" userId="S::100506322@unimail.derby.ac.uk::4d9ae5c4-03b0-4a4c-833c-428df8ac79a1" providerId="AD" clId="Web-{0E9030D5-4112-1BCC-7CBF-08F85C80D745}" dt="2021-02-23T14:38:47.004" v="108" actId="1076"/>
+          <ac:spMkLst>
+            <pc:docMk/>
+            <pc:sldMk cId="109857222" sldId="256"/>
+            <ac:spMk id="5" creationId="{F39E51F4-5EE1-40CC-B6DB-9A51D13E45E1}"/>
+          </ac:spMkLst>
+        </pc:spChg>
+        <pc:spChg chg="add mod">
+          <ac:chgData name="Alex Dent" userId="S::100506322@unimail.derby.ac.uk::4d9ae5c4-03b0-4a4c-833c-428df8ac79a1" providerId="AD" clId="Web-{0E9030D5-4112-1BCC-7CBF-08F85C80D745}" dt="2021-02-23T14:38:18.785" v="107" actId="20577"/>
+          <ac:spMkLst>
+            <pc:docMk/>
+            <pc:sldMk cId="109857222" sldId="256"/>
+            <ac:spMk id="8" creationId="{8CA9DDC5-9505-4974-8BD1-24DA27DBDB9B}"/>
+          </ac:spMkLst>
+        </pc:spChg>
+        <pc:spChg chg="mod">
+          <ac:chgData name="Alex Dent" userId="S::100506322@unimail.derby.ac.uk::4d9ae5c4-03b0-4a4c-833c-428df8ac79a1" providerId="AD" clId="Web-{0E9030D5-4112-1BCC-7CBF-08F85C80D745}" dt="2021-02-23T14:40:37.583" v="139" actId="1076"/>
+          <ac:spMkLst>
+            <pc:docMk/>
+            <pc:sldMk cId="109857222" sldId="256"/>
+            <ac:spMk id="9" creationId="{C256ADBA-0193-4154-A9EC-4DF0AE55BD82}"/>
+          </ac:spMkLst>
+        </pc:spChg>
+        <pc:spChg chg="add mod">
+          <ac:chgData name="Alex Dent" userId="S::100506322@unimail.derby.ac.uk::4d9ae5c4-03b0-4a4c-833c-428df8ac79a1" providerId="AD" clId="Web-{0E9030D5-4112-1BCC-7CBF-08F85C80D745}" dt="2021-02-23T14:38:14.769" v="106" actId="20577"/>
+          <ac:spMkLst>
+            <pc:docMk/>
+            <pc:sldMk cId="109857222" sldId="256"/>
+            <ac:spMk id="10" creationId="{3FD72FA5-F79E-4358-A434-0275E3DA9332}"/>
+          </ac:spMkLst>
+        </pc:spChg>
+        <pc:spChg chg="add mod">
+          <ac:chgData name="Alex Dent" userId="S::100506322@unimail.derby.ac.uk::4d9ae5c4-03b0-4a4c-833c-428df8ac79a1" providerId="AD" clId="Web-{0E9030D5-4112-1BCC-7CBF-08F85C80D745}" dt="2021-02-23T14:40:41.536" v="141" actId="1076"/>
+          <ac:spMkLst>
+            <pc:docMk/>
+            <pc:sldMk cId="109857222" sldId="256"/>
+            <ac:spMk id="11" creationId="{45DC4821-A6CB-4E64-A438-A5A25A1EF676}"/>
+          </ac:spMkLst>
+        </pc:spChg>
+        <pc:spChg chg="add mod">
+          <ac:chgData name="Alex Dent" userId="S::100506322@unimail.derby.ac.uk::4d9ae5c4-03b0-4a4c-833c-428df8ac79a1" providerId="AD" clId="Web-{0E9030D5-4112-1BCC-7CBF-08F85C80D745}" dt="2021-02-23T14:40:37.583" v="140" actId="1076"/>
+          <ac:spMkLst>
+            <pc:docMk/>
+            <pc:sldMk cId="109857222" sldId="256"/>
+            <ac:spMk id="12" creationId="{0AD72C76-B0FC-4E45-AAB2-876BA1ADC575}"/>
+          </ac:spMkLst>
+        </pc:spChg>
+      </pc:sldChg>
+      <pc:sldChg chg="add del replId">
+        <pc:chgData name="Alex Dent" userId="S::100506322@unimail.derby.ac.uk::4d9ae5c4-03b0-4a4c-833c-428df8ac79a1" providerId="AD" clId="Web-{0E9030D5-4112-1BCC-7CBF-08F85C80D745}" dt="2021-02-23T14:39:29.426" v="123"/>
+        <pc:sldMkLst>
+          <pc:docMk/>
+          <pc:sldMk cId="2544910636" sldId="257"/>
+        </pc:sldMkLst>
+      </pc:sldChg>
+      <pc:sldChg chg="addSp delSp modSp new">
+        <pc:chgData name="Alex Dent" userId="S::100506322@unimail.derby.ac.uk::4d9ae5c4-03b0-4a4c-833c-428df8ac79a1" providerId="AD" clId="Web-{0E9030D5-4112-1BCC-7CBF-08F85C80D745}" dt="2021-02-23T14:51:17.777" v="212"/>
         <pc:sldMkLst>
           <pc:docMk/>
           <pc:sldMk cId="2926508388" sldId="257"/>
         </pc:sldMkLst>
         <pc:spChg chg="mod">
-          <ac:chgData name="" userId="" providerId="" clId="Web-{029DEA9D-38DA-3D54-DA2D-BED0612A7FB1}" dt="2021-02-23T14:51:43.627" v="0" actId="1076"/>
+          <ac:chgData name="Alex Dent" userId="S::100506322@unimail.derby.ac.uk::4d9ae5c4-03b0-4a4c-833c-428df8ac79a1" providerId="AD" clId="Web-{0E9030D5-4112-1BCC-7CBF-08F85C80D745}" dt="2021-02-23T14:44:34.476" v="170" actId="1076"/>
+          <ac:spMkLst>
+            <pc:docMk/>
+            <pc:sldMk cId="2926508388" sldId="257"/>
+            <ac:spMk id="2" creationId="{6A2B298E-0391-482E-B01A-3C5C94A52F29}"/>
+          </ac:spMkLst>
+        </pc:spChg>
+        <pc:spChg chg="del">
+          <ac:chgData name="Alex Dent" userId="S::100506322@unimail.derby.ac.uk::4d9ae5c4-03b0-4a4c-833c-428df8ac79a1" providerId="AD" clId="Web-{0E9030D5-4112-1BCC-7CBF-08F85C80D745}" dt="2021-02-23T14:44:49.273" v="176"/>
+          <ac:spMkLst>
+            <pc:docMk/>
+            <pc:sldMk cId="2926508388" sldId="257"/>
+            <ac:spMk id="3" creationId="{4A5C7E49-028F-4D07-B7F0-60FA8D2C9756}"/>
+          </ac:spMkLst>
+        </pc:spChg>
+        <pc:spChg chg="add mod">
+          <ac:chgData name="Alex Dent" userId="S::100506322@unimail.derby.ac.uk::4d9ae5c4-03b0-4a4c-833c-428df8ac79a1" providerId="AD" clId="Web-{0E9030D5-4112-1BCC-7CBF-08F85C80D745}" dt="2021-02-23T14:48:06.119" v="196" actId="20577"/>
+          <ac:spMkLst>
+            <pc:docMk/>
+            <pc:sldMk cId="2926508388" sldId="257"/>
+            <ac:spMk id="5" creationId="{6AFB3809-FA0A-497E-87B5-5F086DE5CB61}"/>
+          </ac:spMkLst>
+        </pc:spChg>
+        <pc:spChg chg="add mod">
+          <ac:chgData name="Alex Dent" userId="S::100506322@unimail.derby.ac.uk::4d9ae5c4-03b0-4a4c-833c-428df8ac79a1" providerId="AD" clId="Web-{0E9030D5-4112-1BCC-7CBF-08F85C80D745}" dt="2021-02-23T14:47:58.369" v="192" actId="20577"/>
+          <ac:spMkLst>
+            <pc:docMk/>
+            <pc:sldMk cId="2926508388" sldId="257"/>
+            <ac:spMk id="6" creationId="{3D5D2E58-DE92-4291-9B36-376EFDC0F8EE}"/>
+          </ac:spMkLst>
+        </pc:spChg>
+        <pc:spChg chg="add mod">
+          <ac:chgData name="Alex Dent" userId="S::100506322@unimail.derby.ac.uk::4d9ae5c4-03b0-4a4c-833c-428df8ac79a1" providerId="AD" clId="Web-{0E9030D5-4112-1BCC-7CBF-08F85C80D745}" dt="2021-02-23T14:46:50.149" v="190" actId="20577"/>
+          <ac:spMkLst>
+            <pc:docMk/>
+            <pc:sldMk cId="2926508388" sldId="257"/>
+            <ac:spMk id="7" creationId="{7B120C33-0FA6-46AE-9455-0E159BC7993F}"/>
+          </ac:spMkLst>
+        </pc:spChg>
+        <pc:spChg chg="mod">
+          <ac:chgData name="Alex Dent" userId="S::100506322@unimail.derby.ac.uk::4d9ae5c4-03b0-4a4c-833c-428df8ac79a1" providerId="AD" clId="Web-{0E9030D5-4112-1BCC-7CBF-08F85C80D745}" dt="2021-02-23T14:48:01.666" v="194" actId="20577"/>
+          <ac:spMkLst>
+            <pc:docMk/>
+            <pc:sldMk cId="2926508388" sldId="257"/>
+            <ac:spMk id="8" creationId="{B85650C6-7F00-41D8-89C1-139C277483EB}"/>
+          </ac:spMkLst>
+        </pc:spChg>
+        <pc:spChg chg="add mod">
+          <ac:chgData name="Alex Dent" userId="S::100506322@unimail.derby.ac.uk::4d9ae5c4-03b0-4a4c-833c-428df8ac79a1" providerId="AD" clId="Web-{0E9030D5-4112-1BCC-7CBF-08F85C80D745}" dt="2021-02-23T14:50:43.089" v="209" actId="14100"/>
+          <ac:spMkLst>
+            <pc:docMk/>
+            <pc:sldMk cId="2926508388" sldId="257"/>
+            <ac:spMk id="10" creationId="{76DBC2F5-F8E2-4806-9C23-BB196024F14B}"/>
+          </ac:spMkLst>
+        </pc:spChg>
+        <pc:spChg chg="add">
+          <ac:chgData name="Alex Dent" userId="S::100506322@unimail.derby.ac.uk::4d9ae5c4-03b0-4a4c-833c-428df8ac79a1" providerId="AD" clId="Web-{0E9030D5-4112-1BCC-7CBF-08F85C80D745}" dt="2021-02-23T14:51:01.886" v="210"/>
           <ac:spMkLst>
             <pc:docMk/>
             <pc:sldMk cId="2926508388" sldId="257"/>
             <ac:spMk id="11" creationId="{C2522294-BD57-40C2-9A1E-4D1D085ED974}"/>
           </ac:spMkLst>
         </pc:spChg>
+        <pc:spChg chg="add">
+          <ac:chgData name="Alex Dent" userId="S::100506322@unimail.derby.ac.uk::4d9ae5c4-03b0-4a4c-833c-428df8ac79a1" providerId="AD" clId="Web-{0E9030D5-4112-1BCC-7CBF-08F85C80D745}" dt="2021-02-23T14:51:17.636" v="211"/>
+          <ac:spMkLst>
+            <pc:docMk/>
+            <pc:sldMk cId="2926508388" sldId="257"/>
+            <ac:spMk id="12" creationId="{5A62A2CE-5889-4B58-B509-A82CA02ADD9C}"/>
+          </ac:spMkLst>
+        </pc:spChg>
+        <pc:spChg chg="add">
+          <ac:chgData name="Alex Dent" userId="S::100506322@unimail.derby.ac.uk::4d9ae5c4-03b0-4a4c-833c-428df8ac79a1" providerId="AD" clId="Web-{0E9030D5-4112-1BCC-7CBF-08F85C80D745}" dt="2021-02-23T14:51:17.777" v="212"/>
+          <ac:spMkLst>
+            <pc:docMk/>
+            <pc:sldMk cId="2926508388" sldId="257"/>
+            <ac:spMk id="13" creationId="{0D820CF3-FBC7-4B9D-A763-746143D96FB3}"/>
+          </ac:spMkLst>
+        </pc:spChg>
       </pc:sldChg>
+    </pc:docChg>
+  </pc:docChgLst>
+  <pc:docChgLst>
+    <pc:chgData name="Cosmin Covrig" userId="S::100517186@unimail.derby.ac.uk::8dcd05c6-e7ae-4cf1-8843-fa63bee14fde" providerId="AD" clId="Web-{DB32D146-5815-4497-85E9-36A3C38C20D2}"/>
+    <pc:docChg chg="modSld addMainMaster delMainMaster">
+      <pc:chgData name="Cosmin Covrig" userId="S::100517186@unimail.derby.ac.uk::8dcd05c6-e7ae-4cf1-8843-fa63bee14fde" providerId="AD" clId="Web-{DB32D146-5815-4497-85E9-36A3C38C20D2}" dt="2021-02-23T14:55:31.309" v="176"/>
+      <pc:docMkLst>
+        <pc:docMk/>
+      </pc:docMkLst>
+      <pc:sldChg chg="addSp delSp modSp mod modClrScheme chgLayout">
+        <pc:chgData name="Cosmin Covrig" userId="S::100517186@unimail.derby.ac.uk::8dcd05c6-e7ae-4cf1-8843-fa63bee14fde" providerId="AD" clId="Web-{DB32D146-5815-4497-85E9-36A3C38C20D2}" dt="2021-02-23T14:55:31.309" v="176"/>
+        <pc:sldMkLst>
+          <pc:docMk/>
+          <pc:sldMk cId="109857222" sldId="256"/>
+        </pc:sldMkLst>
+        <pc:spChg chg="mod ord">
+          <ac:chgData name="Cosmin Covrig" userId="S::100517186@unimail.derby.ac.uk::8dcd05c6-e7ae-4cf1-8843-fa63bee14fde" providerId="AD" clId="Web-{DB32D146-5815-4497-85E9-36A3C38C20D2}" dt="2021-02-23T14:55:31.309" v="176"/>
+          <ac:spMkLst>
+            <pc:docMk/>
+            <pc:sldMk cId="109857222" sldId="256"/>
+            <ac:spMk id="2" creationId="{00000000-0000-0000-0000-000000000000}"/>
+          </ac:spMkLst>
+        </pc:spChg>
+        <pc:spChg chg="mod ord">
+          <ac:chgData name="Cosmin Covrig" userId="S::100517186@unimail.derby.ac.uk::8dcd05c6-e7ae-4cf1-8843-fa63bee14fde" providerId="AD" clId="Web-{DB32D146-5815-4497-85E9-36A3C38C20D2}" dt="2021-02-23T14:55:31.309" v="176"/>
+          <ac:spMkLst>
+            <pc:docMk/>
+            <pc:sldMk cId="109857222" sldId="256"/>
+            <ac:spMk id="3" creationId="{00000000-0000-0000-0000-000000000000}"/>
+          </ac:spMkLst>
+        </pc:spChg>
+        <pc:spChg chg="add del mod">
+          <ac:chgData name="Cosmin Covrig" userId="S::100517186@unimail.derby.ac.uk::8dcd05c6-e7ae-4cf1-8843-fa63bee14fde" providerId="AD" clId="Web-{DB32D146-5815-4497-85E9-36A3C38C20D2}" dt="2021-02-23T14:36:09.125" v="32"/>
+          <ac:spMkLst>
+            <pc:docMk/>
+            <pc:sldMk cId="109857222" sldId="256"/>
+            <ac:spMk id="4" creationId="{98F49ACD-370B-4C47-9C04-0F26048E795B}"/>
+          </ac:spMkLst>
+        </pc:spChg>
+        <pc:spChg chg="mod">
+          <ac:chgData name="Cosmin Covrig" userId="S::100517186@unimail.derby.ac.uk::8dcd05c6-e7ae-4cf1-8843-fa63bee14fde" providerId="AD" clId="Web-{DB32D146-5815-4497-85E9-36A3C38C20D2}" dt="2021-02-23T14:38:58.831" v="77" actId="1076"/>
+          <ac:spMkLst>
+            <pc:docMk/>
+            <pc:sldMk cId="109857222" sldId="256"/>
+            <ac:spMk id="5" creationId="{F39E51F4-5EE1-40CC-B6DB-9A51D13E45E1}"/>
+          </ac:spMkLst>
+        </pc:spChg>
+        <pc:spChg chg="add del mod">
+          <ac:chgData name="Cosmin Covrig" userId="S::100517186@unimail.derby.ac.uk::8dcd05c6-e7ae-4cf1-8843-fa63bee14fde" providerId="AD" clId="Web-{DB32D146-5815-4497-85E9-36A3C38C20D2}" dt="2021-02-23T14:40:31.880" v="95"/>
+          <ac:spMkLst>
+            <pc:docMk/>
+            <pc:sldMk cId="109857222" sldId="256"/>
+            <ac:spMk id="6" creationId="{0FDBBA8C-4DA3-4403-A3EB-2F1EDFA75F38}"/>
+          </ac:spMkLst>
+        </pc:spChg>
+        <pc:spChg chg="add del">
+          <ac:chgData name="Cosmin Covrig" userId="S::100517186@unimail.derby.ac.uk::8dcd05c6-e7ae-4cf1-8843-fa63bee14fde" providerId="AD" clId="Web-{DB32D146-5815-4497-85E9-36A3C38C20D2}" dt="2021-02-23T14:36:14.219" v="35"/>
+          <ac:spMkLst>
+            <pc:docMk/>
+            <pc:sldMk cId="109857222" sldId="256"/>
+            <ac:spMk id="7" creationId="{73B82A8F-3EDC-4FAC-AB38-2509CDE6617A}"/>
+          </ac:spMkLst>
+        </pc:spChg>
+        <pc:spChg chg="mod">
+          <ac:chgData name="Cosmin Covrig" userId="S::100517186@unimail.derby.ac.uk::8dcd05c6-e7ae-4cf1-8843-fa63bee14fde" providerId="AD" clId="Web-{DB32D146-5815-4497-85E9-36A3C38C20D2}" dt="2021-02-23T14:38:33.628" v="75" actId="20577"/>
+          <ac:spMkLst>
+            <pc:docMk/>
+            <pc:sldMk cId="109857222" sldId="256"/>
+            <ac:spMk id="8" creationId="{8CA9DDC5-9505-4974-8BD1-24DA27DBDB9B}"/>
+          </ac:spMkLst>
+        </pc:spChg>
+        <pc:spChg chg="add mod">
+          <ac:chgData name="Cosmin Covrig" userId="S::100517186@unimail.derby.ac.uk::8dcd05c6-e7ae-4cf1-8843-fa63bee14fde" providerId="AD" clId="Web-{DB32D146-5815-4497-85E9-36A3C38C20D2}" dt="2021-02-23T14:39:41.504" v="83" actId="1076"/>
+          <ac:spMkLst>
+            <pc:docMk/>
+            <pc:sldMk cId="109857222" sldId="256"/>
+            <ac:spMk id="9" creationId="{C256ADBA-0193-4154-A9EC-4DF0AE55BD82}"/>
+          </ac:spMkLst>
+        </pc:spChg>
+        <pc:spChg chg="mod">
+          <ac:chgData name="Cosmin Covrig" userId="S::100517186@unimail.derby.ac.uk::8dcd05c6-e7ae-4cf1-8843-fa63bee14fde" providerId="AD" clId="Web-{DB32D146-5815-4497-85E9-36A3C38C20D2}" dt="2021-02-23T14:38:39.175" v="76" actId="20577"/>
+          <ac:spMkLst>
+            <pc:docMk/>
+            <pc:sldMk cId="109857222" sldId="256"/>
+            <ac:spMk id="10" creationId="{3FD72FA5-F79E-4358-A434-0275E3DA9332}"/>
+          </ac:spMkLst>
+        </pc:spChg>
+        <pc:spChg chg="mod">
+          <ac:chgData name="Cosmin Covrig" userId="S::100517186@unimail.derby.ac.uk::8dcd05c6-e7ae-4cf1-8843-fa63bee14fde" providerId="AD" clId="Web-{DB32D146-5815-4497-85E9-36A3C38C20D2}" dt="2021-02-23T14:39:34.504" v="82" actId="1076"/>
+          <ac:spMkLst>
+            <pc:docMk/>
+            <pc:sldMk cId="109857222" sldId="256"/>
+            <ac:spMk id="11" creationId="{45DC4821-A6CB-4E64-A438-A5A25A1EF676}"/>
+          </ac:spMkLst>
+        </pc:spChg>
+      </pc:sldChg>
+      <pc:sldChg chg="addSp delSp modSp mod modClrScheme chgLayout">
+        <pc:chgData name="Cosmin Covrig" userId="S::100517186@unimail.derby.ac.uk::8dcd05c6-e7ae-4cf1-8843-fa63bee14fde" providerId="AD" clId="Web-{DB32D146-5815-4497-85E9-36A3C38C20D2}" dt="2021-02-23T14:55:31.309" v="176"/>
+        <pc:sldMkLst>
+          <pc:docMk/>
+          <pc:sldMk cId="2926508388" sldId="257"/>
+        </pc:sldMkLst>
+        <pc:spChg chg="mod ord">
+          <ac:chgData name="Cosmin Covrig" userId="S::100517186@unimail.derby.ac.uk::8dcd05c6-e7ae-4cf1-8843-fa63bee14fde" providerId="AD" clId="Web-{DB32D146-5815-4497-85E9-36A3C38C20D2}" dt="2021-02-23T14:55:31.309" v="176"/>
+          <ac:spMkLst>
+            <pc:docMk/>
+            <pc:sldMk cId="2926508388" sldId="257"/>
+            <ac:spMk id="2" creationId="{6A2B298E-0391-482E-B01A-3C5C94A52F29}"/>
+          </ac:spMkLst>
+        </pc:spChg>
+        <pc:spChg chg="add mod">
+          <ac:chgData name="Cosmin Covrig" userId="S::100517186@unimail.derby.ac.uk::8dcd05c6-e7ae-4cf1-8843-fa63bee14fde" providerId="AD" clId="Web-{DB32D146-5815-4497-85E9-36A3C38C20D2}" dt="2021-02-23T14:44:35.136" v="105" actId="1076"/>
+          <ac:spMkLst>
+            <pc:docMk/>
+            <pc:sldMk cId="2926508388" sldId="257"/>
+            <ac:spMk id="3" creationId="{4A5C7E49-028F-4D07-B7F0-60FA8D2C9756}"/>
+          </ac:spMkLst>
+        </pc:spChg>
+        <pc:spChg chg="del">
+          <ac:chgData name="Cosmin Covrig" userId="S::100517186@unimail.derby.ac.uk::8dcd05c6-e7ae-4cf1-8843-fa63bee14fde" providerId="AD" clId="Web-{DB32D146-5815-4497-85E9-36A3C38C20D2}" dt="2021-02-23T14:44:01.400" v="97"/>
+          <ac:spMkLst>
+            <pc:docMk/>
+            <pc:sldMk cId="2926508388" sldId="257"/>
+            <ac:spMk id="3" creationId="{DE744D3C-F406-4BC0-9523-D5E411805B7A}"/>
+          </ac:spMkLst>
+        </pc:spChg>
+        <pc:spChg chg="add del">
+          <ac:chgData name="Cosmin Covrig" userId="S::100517186@unimail.derby.ac.uk::8dcd05c6-e7ae-4cf1-8843-fa63bee14fde" providerId="AD" clId="Web-{DB32D146-5815-4497-85E9-36A3C38C20D2}" dt="2021-02-23T14:44:12.479" v="99"/>
+          <ac:spMkLst>
+            <pc:docMk/>
+            <pc:sldMk cId="2926508388" sldId="257"/>
+            <ac:spMk id="4" creationId="{26C17C2B-E358-41AC-9134-40390CBB8298}"/>
+          </ac:spMkLst>
+        </pc:spChg>
+        <pc:spChg chg="add mod">
+          <ac:chgData name="Cosmin Covrig" userId="S::100517186@unimail.derby.ac.uk::8dcd05c6-e7ae-4cf1-8843-fa63bee14fde" providerId="AD" clId="Web-{DB32D146-5815-4497-85E9-36A3C38C20D2}" dt="2021-02-23T14:48:40.735" v="145" actId="20577"/>
+          <ac:spMkLst>
+            <pc:docMk/>
+            <pc:sldMk cId="2926508388" sldId="257"/>
+            <ac:spMk id="4" creationId="{A2C0ED73-8A79-4BDC-B3E3-B2EA324F83C7}"/>
+          </ac:spMkLst>
+        </pc:spChg>
+        <pc:spChg chg="mod">
+          <ac:chgData name="Cosmin Covrig" userId="S::100517186@unimail.derby.ac.uk::8dcd05c6-e7ae-4cf1-8843-fa63bee14fde" providerId="AD" clId="Web-{DB32D146-5815-4497-85E9-36A3C38C20D2}" dt="2021-02-23T14:50:42.440" v="154" actId="1076"/>
+          <ac:spMkLst>
+            <pc:docMk/>
+            <pc:sldMk cId="2926508388" sldId="257"/>
+            <ac:spMk id="5" creationId="{6AFB3809-FA0A-497E-87B5-5F086DE5CB61}"/>
+          </ac:spMkLst>
+        </pc:spChg>
+        <pc:spChg chg="mod">
+          <ac:chgData name="Cosmin Covrig" userId="S::100517186@unimail.derby.ac.uk::8dcd05c6-e7ae-4cf1-8843-fa63bee14fde" providerId="AD" clId="Web-{DB32D146-5815-4497-85E9-36A3C38C20D2}" dt="2021-02-23T14:50:45.909" v="156" actId="1076"/>
+          <ac:spMkLst>
+            <pc:docMk/>
+            <pc:sldMk cId="2926508388" sldId="257"/>
+            <ac:spMk id="6" creationId="{3D5D2E58-DE92-4291-9B36-376EFDC0F8EE}"/>
+          </ac:spMkLst>
+        </pc:spChg>
+        <pc:spChg chg="mod">
+          <ac:chgData name="Cosmin Covrig" userId="S::100517186@unimail.derby.ac.uk::8dcd05c6-e7ae-4cf1-8843-fa63bee14fde" providerId="AD" clId="Web-{DB32D146-5815-4497-85E9-36A3C38C20D2}" dt="2021-02-23T14:51:06.550" v="161" actId="1076"/>
+          <ac:spMkLst>
+            <pc:docMk/>
+            <pc:sldMk cId="2926508388" sldId="257"/>
+            <ac:spMk id="7" creationId="{7B120C33-0FA6-46AE-9455-0E159BC7993F}"/>
+          </ac:spMkLst>
+        </pc:spChg>
+        <pc:spChg chg="add mod">
+          <ac:chgData name="Cosmin Covrig" userId="S::100517186@unimail.derby.ac.uk::8dcd05c6-e7ae-4cf1-8843-fa63bee14fde" providerId="AD" clId="Web-{DB32D146-5815-4497-85E9-36A3C38C20D2}" dt="2021-02-23T14:51:01.441" v="160" actId="1076"/>
+          <ac:spMkLst>
+            <pc:docMk/>
+            <pc:sldMk cId="2926508388" sldId="257"/>
+            <ac:spMk id="8" creationId="{B85650C6-7F00-41D8-89C1-139C277483EB}"/>
+          </ac:spMkLst>
+        </pc:spChg>
+        <pc:picChg chg="add mod">
+          <ac:chgData name="Cosmin Covrig" userId="S::100517186@unimail.derby.ac.uk::8dcd05c6-e7ae-4cf1-8843-fa63bee14fde" providerId="AD" clId="Web-{DB32D146-5815-4497-85E9-36A3C38C20D2}" dt="2021-02-23T14:52:03.239" v="174" actId="1076"/>
+          <ac:picMkLst>
+            <pc:docMk/>
+            <pc:sldMk cId="2926508388" sldId="257"/>
+            <ac:picMk id="9" creationId="{61CAF954-C830-4E27-962E-3AB12F7D9DA7}"/>
+          </ac:picMkLst>
+        </pc:picChg>
+      </pc:sldChg>
+      <pc:sldMasterChg chg="del delSldLayout">
+        <pc:chgData name="Cosmin Covrig" userId="S::100517186@unimail.derby.ac.uk::8dcd05c6-e7ae-4cf1-8843-fa63bee14fde" providerId="AD" clId="Web-{DB32D146-5815-4497-85E9-36A3C38C20D2}" dt="2021-02-23T14:55:27.012" v="175"/>
+        <pc:sldMasterMkLst>
+          <pc:docMk/>
+          <pc:sldMasterMk cId="2460954070" sldId="2147483660"/>
+        </pc:sldMasterMkLst>
+        <pc:sldLayoutChg chg="del">
+          <pc:chgData name="Cosmin Covrig" userId="S::100517186@unimail.derby.ac.uk::8dcd05c6-e7ae-4cf1-8843-fa63bee14fde" providerId="AD" clId="Web-{DB32D146-5815-4497-85E9-36A3C38C20D2}" dt="2021-02-23T14:55:27.012" v="175"/>
+          <pc:sldLayoutMkLst>
+            <pc:docMk/>
+            <pc:sldMasterMk cId="2460954070" sldId="2147483660"/>
+            <pc:sldLayoutMk cId="2385387890" sldId="2147483661"/>
+          </pc:sldLayoutMkLst>
+        </pc:sldLayoutChg>
+        <pc:sldLayoutChg chg="del">
+          <pc:chgData name="Cosmin Covrig" userId="S::100517186@unimail.derby.ac.uk::8dcd05c6-e7ae-4cf1-8843-fa63bee14fde" providerId="AD" clId="Web-{DB32D146-5815-4497-85E9-36A3C38C20D2}" dt="2021-02-23T14:55:27.012" v="175"/>
+          <pc:sldLayoutMkLst>
+            <pc:docMk/>
+            <pc:sldMasterMk cId="2460954070" sldId="2147483660"/>
+            <pc:sldLayoutMk cId="949138452" sldId="2147483662"/>
+          </pc:sldLayoutMkLst>
+        </pc:sldLayoutChg>
+        <pc:sldLayoutChg chg="del">
+          <pc:chgData name="Cosmin Covrig" userId="S::100517186@unimail.derby.ac.uk::8dcd05c6-e7ae-4cf1-8843-fa63bee14fde" providerId="AD" clId="Web-{DB32D146-5815-4497-85E9-36A3C38C20D2}" dt="2021-02-23T14:55:27.012" v="175"/>
+          <pc:sldLayoutMkLst>
+            <pc:docMk/>
+            <pc:sldMasterMk cId="2460954070" sldId="2147483660"/>
+            <pc:sldLayoutMk cId="2591524520" sldId="2147483663"/>
+          </pc:sldLayoutMkLst>
+        </pc:sldLayoutChg>
+        <pc:sldLayoutChg chg="del">
+          <pc:chgData name="Cosmin Covrig" userId="S::100517186@unimail.derby.ac.uk::8dcd05c6-e7ae-4cf1-8843-fa63bee14fde" providerId="AD" clId="Web-{DB32D146-5815-4497-85E9-36A3C38C20D2}" dt="2021-02-23T14:55:27.012" v="175"/>
+          <pc:sldLayoutMkLst>
+            <pc:docMk/>
+            <pc:sldMasterMk cId="2460954070" sldId="2147483660"/>
+            <pc:sldLayoutMk cId="1203092039" sldId="2147483664"/>
+          </pc:sldLayoutMkLst>
+        </pc:sldLayoutChg>
+        <pc:sldLayoutChg chg="del">
+          <pc:chgData name="Cosmin Covrig" userId="S::100517186@unimail.derby.ac.uk::8dcd05c6-e7ae-4cf1-8843-fa63bee14fde" providerId="AD" clId="Web-{DB32D146-5815-4497-85E9-36A3C38C20D2}" dt="2021-02-23T14:55:27.012" v="175"/>
+          <pc:sldLayoutMkLst>
+            <pc:docMk/>
+            <pc:sldMasterMk cId="2460954070" sldId="2147483660"/>
+            <pc:sldLayoutMk cId="3733172339" sldId="2147483665"/>
+          </pc:sldLayoutMkLst>
+        </pc:sldLayoutChg>
+        <pc:sldLayoutChg chg="del">
+          <pc:chgData name="Cosmin Covrig" userId="S::100517186@unimail.derby.ac.uk::8dcd05c6-e7ae-4cf1-8843-fa63bee14fde" providerId="AD" clId="Web-{DB32D146-5815-4497-85E9-36A3C38C20D2}" dt="2021-02-23T14:55:27.012" v="175"/>
+          <pc:sldLayoutMkLst>
+            <pc:docMk/>
+            <pc:sldMasterMk cId="2460954070" sldId="2147483660"/>
+            <pc:sldLayoutMk cId="3210312558" sldId="2147483666"/>
+          </pc:sldLayoutMkLst>
+        </pc:sldLayoutChg>
+        <pc:sldLayoutChg chg="del">
+          <pc:chgData name="Cosmin Covrig" userId="S::100517186@unimail.derby.ac.uk::8dcd05c6-e7ae-4cf1-8843-fa63bee14fde" providerId="AD" clId="Web-{DB32D146-5815-4497-85E9-36A3C38C20D2}" dt="2021-02-23T14:55:27.012" v="175"/>
+          <pc:sldLayoutMkLst>
+            <pc:docMk/>
+            <pc:sldMasterMk cId="2460954070" sldId="2147483660"/>
+            <pc:sldLayoutMk cId="3146388984" sldId="2147483667"/>
+          </pc:sldLayoutMkLst>
+        </pc:sldLayoutChg>
+        <pc:sldLayoutChg chg="del">
+          <pc:chgData name="Cosmin Covrig" userId="S::100517186@unimail.derby.ac.uk::8dcd05c6-e7ae-4cf1-8843-fa63bee14fde" providerId="AD" clId="Web-{DB32D146-5815-4497-85E9-36A3C38C20D2}" dt="2021-02-23T14:55:27.012" v="175"/>
+          <pc:sldLayoutMkLst>
+            <pc:docMk/>
+            <pc:sldMasterMk cId="2460954070" sldId="2147483660"/>
+            <pc:sldLayoutMk cId="3171841454" sldId="2147483668"/>
+          </pc:sldLayoutMkLst>
+        </pc:sldLayoutChg>
+        <pc:sldLayoutChg chg="del">
+          <pc:chgData name="Cosmin Covrig" userId="S::100517186@unimail.derby.ac.uk::8dcd05c6-e7ae-4cf1-8843-fa63bee14fde" providerId="AD" clId="Web-{DB32D146-5815-4497-85E9-36A3C38C20D2}" dt="2021-02-23T14:55:27.012" v="175"/>
+          <pc:sldLayoutMkLst>
+            <pc:docMk/>
+            <pc:sldMasterMk cId="2460954070" sldId="2147483660"/>
+            <pc:sldLayoutMk cId="1718958274" sldId="2147483669"/>
+          </pc:sldLayoutMkLst>
+        </pc:sldLayoutChg>
+        <pc:sldLayoutChg chg="del">
+          <pc:chgData name="Cosmin Covrig" userId="S::100517186@unimail.derby.ac.uk::8dcd05c6-e7ae-4cf1-8843-fa63bee14fde" providerId="AD" clId="Web-{DB32D146-5815-4497-85E9-36A3C38C20D2}" dt="2021-02-23T14:55:27.012" v="175"/>
+          <pc:sldLayoutMkLst>
+            <pc:docMk/>
+            <pc:sldMasterMk cId="2460954070" sldId="2147483660"/>
+            <pc:sldLayoutMk cId="2202905451" sldId="2147483670"/>
+          </pc:sldLayoutMkLst>
+        </pc:sldLayoutChg>
+        <pc:sldLayoutChg chg="del">
+          <pc:chgData name="Cosmin Covrig" userId="S::100517186@unimail.derby.ac.uk::8dcd05c6-e7ae-4cf1-8843-fa63bee14fde" providerId="AD" clId="Web-{DB32D146-5815-4497-85E9-36A3C38C20D2}" dt="2021-02-23T14:55:27.012" v="175"/>
+          <pc:sldLayoutMkLst>
+            <pc:docMk/>
+            <pc:sldMasterMk cId="2460954070" sldId="2147483660"/>
+            <pc:sldLayoutMk cId="3479445657" sldId="2147483671"/>
+          </pc:sldLayoutMkLst>
+        </pc:sldLayoutChg>
+      </pc:sldMasterChg>
+      <pc:sldMasterChg chg="add del addSldLayout delSldLayout modSldLayout">
+        <pc:chgData name="Cosmin Covrig" userId="S::100517186@unimail.derby.ac.uk::8dcd05c6-e7ae-4cf1-8843-fa63bee14fde" providerId="AD" clId="Web-{DB32D146-5815-4497-85E9-36A3C38C20D2}" dt="2021-02-23T14:55:31.309" v="176"/>
+        <pc:sldMasterMkLst>
+          <pc:docMk/>
+          <pc:sldMasterMk cId="665205197" sldId="2147483672"/>
+        </pc:sldMasterMkLst>
+        <pc:sldLayoutChg chg="add del mod replId">
+          <pc:chgData name="Cosmin Covrig" userId="S::100517186@unimail.derby.ac.uk::8dcd05c6-e7ae-4cf1-8843-fa63bee14fde" providerId="AD" clId="Web-{DB32D146-5815-4497-85E9-36A3C38C20D2}" dt="2021-02-23T14:55:31.309" v="176"/>
+          <pc:sldLayoutMkLst>
+            <pc:docMk/>
+            <pc:sldMasterMk cId="665205197" sldId="2147483672"/>
+            <pc:sldLayoutMk cId="981895020" sldId="2147483673"/>
+          </pc:sldLayoutMkLst>
+        </pc:sldLayoutChg>
+        <pc:sldLayoutChg chg="add del mod replId">
+          <pc:chgData name="Cosmin Covrig" userId="S::100517186@unimail.derby.ac.uk::8dcd05c6-e7ae-4cf1-8843-fa63bee14fde" providerId="AD" clId="Web-{DB32D146-5815-4497-85E9-36A3C38C20D2}" dt="2021-02-23T14:55:31.309" v="176"/>
+          <pc:sldLayoutMkLst>
+            <pc:docMk/>
+            <pc:sldMasterMk cId="665205197" sldId="2147483672"/>
+            <pc:sldLayoutMk cId="2824324434" sldId="2147483674"/>
+          </pc:sldLayoutMkLst>
+        </pc:sldLayoutChg>
+        <pc:sldLayoutChg chg="add del mod replId">
+          <pc:chgData name="Cosmin Covrig" userId="S::100517186@unimail.derby.ac.uk::8dcd05c6-e7ae-4cf1-8843-fa63bee14fde" providerId="AD" clId="Web-{DB32D146-5815-4497-85E9-36A3C38C20D2}" dt="2021-02-23T14:55:31.309" v="176"/>
+          <pc:sldLayoutMkLst>
+            <pc:docMk/>
+            <pc:sldMasterMk cId="665205197" sldId="2147483672"/>
+            <pc:sldLayoutMk cId="3492755417" sldId="2147483675"/>
+          </pc:sldLayoutMkLst>
+        </pc:sldLayoutChg>
+        <pc:sldLayoutChg chg="add del mod replId">
+          <pc:chgData name="Cosmin Covrig" userId="S::100517186@unimail.derby.ac.uk::8dcd05c6-e7ae-4cf1-8843-fa63bee14fde" providerId="AD" clId="Web-{DB32D146-5815-4497-85E9-36A3C38C20D2}" dt="2021-02-23T14:55:31.309" v="176"/>
+          <pc:sldLayoutMkLst>
+            <pc:docMk/>
+            <pc:sldMasterMk cId="665205197" sldId="2147483672"/>
+            <pc:sldLayoutMk cId="2158454683" sldId="2147483676"/>
+          </pc:sldLayoutMkLst>
+        </pc:sldLayoutChg>
+        <pc:sldLayoutChg chg="add del mod replId">
+          <pc:chgData name="Cosmin Covrig" userId="S::100517186@unimail.derby.ac.uk::8dcd05c6-e7ae-4cf1-8843-fa63bee14fde" providerId="AD" clId="Web-{DB32D146-5815-4497-85E9-36A3C38C20D2}" dt="2021-02-23T14:55:31.309" v="176"/>
+          <pc:sldLayoutMkLst>
+            <pc:docMk/>
+            <pc:sldMasterMk cId="665205197" sldId="2147483672"/>
+            <pc:sldLayoutMk cId="1603289333" sldId="2147483677"/>
+          </pc:sldLayoutMkLst>
+        </pc:sldLayoutChg>
+        <pc:sldLayoutChg chg="add del mod replId">
+          <pc:chgData name="Cosmin Covrig" userId="S::100517186@unimail.derby.ac.uk::8dcd05c6-e7ae-4cf1-8843-fa63bee14fde" providerId="AD" clId="Web-{DB32D146-5815-4497-85E9-36A3C38C20D2}" dt="2021-02-23T14:55:31.309" v="176"/>
+          <pc:sldLayoutMkLst>
+            <pc:docMk/>
+            <pc:sldMasterMk cId="665205197" sldId="2147483672"/>
+            <pc:sldLayoutMk cId="1951633616" sldId="2147483678"/>
+          </pc:sldLayoutMkLst>
+        </pc:sldLayoutChg>
+        <pc:sldLayoutChg chg="add del mod replId">
+          <pc:chgData name="Cosmin Covrig" userId="S::100517186@unimail.derby.ac.uk::8dcd05c6-e7ae-4cf1-8843-fa63bee14fde" providerId="AD" clId="Web-{DB32D146-5815-4497-85E9-36A3C38C20D2}" dt="2021-02-23T14:55:31.309" v="176"/>
+          <pc:sldLayoutMkLst>
+            <pc:docMk/>
+            <pc:sldMasterMk cId="665205197" sldId="2147483672"/>
+            <pc:sldLayoutMk cId="2466059200" sldId="2147483679"/>
+          </pc:sldLayoutMkLst>
+        </pc:sldLayoutChg>
+        <pc:sldLayoutChg chg="add del mod replId">
+          <pc:chgData name="Cosmin Covrig" userId="S::100517186@unimail.derby.ac.uk::8dcd05c6-e7ae-4cf1-8843-fa63bee14fde" providerId="AD" clId="Web-{DB32D146-5815-4497-85E9-36A3C38C20D2}" dt="2021-02-23T14:55:31.309" v="176"/>
+          <pc:sldLayoutMkLst>
+            <pc:docMk/>
+            <pc:sldMasterMk cId="665205197" sldId="2147483672"/>
+            <pc:sldLayoutMk cId="4200740884" sldId="2147483680"/>
+          </pc:sldLayoutMkLst>
+        </pc:sldLayoutChg>
+        <pc:sldLayoutChg chg="add del mod replId">
+          <pc:chgData name="Cosmin Covrig" userId="S::100517186@unimail.derby.ac.uk::8dcd05c6-e7ae-4cf1-8843-fa63bee14fde" providerId="AD" clId="Web-{DB32D146-5815-4497-85E9-36A3C38C20D2}" dt="2021-02-23T14:55:31.309" v="176"/>
+          <pc:sldLayoutMkLst>
+            <pc:docMk/>
+            <pc:sldMasterMk cId="665205197" sldId="2147483672"/>
+            <pc:sldLayoutMk cId="1294813232" sldId="2147483681"/>
+          </pc:sldLayoutMkLst>
+        </pc:sldLayoutChg>
+        <pc:sldLayoutChg chg="add del mod replId">
+          <pc:chgData name="Cosmin Covrig" userId="S::100517186@unimail.derby.ac.uk::8dcd05c6-e7ae-4cf1-8843-fa63bee14fde" providerId="AD" clId="Web-{DB32D146-5815-4497-85E9-36A3C38C20D2}" dt="2021-02-23T14:55:31.309" v="176"/>
+          <pc:sldLayoutMkLst>
+            <pc:docMk/>
+            <pc:sldMasterMk cId="665205197" sldId="2147483672"/>
+            <pc:sldLayoutMk cId="2546239580" sldId="2147483682"/>
+          </pc:sldLayoutMkLst>
+        </pc:sldLayoutChg>
+        <pc:sldLayoutChg chg="add del mod replId">
+          <pc:chgData name="Cosmin Covrig" userId="S::100517186@unimail.derby.ac.uk::8dcd05c6-e7ae-4cf1-8843-fa63bee14fde" providerId="AD" clId="Web-{DB32D146-5815-4497-85E9-36A3C38C20D2}" dt="2021-02-23T14:55:31.309" v="176"/>
+          <pc:sldLayoutMkLst>
+            <pc:docMk/>
+            <pc:sldMasterMk cId="665205197" sldId="2147483672"/>
+            <pc:sldLayoutMk cId="3595296623" sldId="2147483683"/>
+          </pc:sldLayoutMkLst>
+        </pc:sldLayoutChg>
+      </pc:sldMasterChg>
+      <pc:sldMasterChg chg="add addSldLayout modSldLayout">
+        <pc:chgData name="Cosmin Covrig" userId="S::100517186@unimail.derby.ac.uk::8dcd05c6-e7ae-4cf1-8843-fa63bee14fde" providerId="AD" clId="Web-{DB32D146-5815-4497-85E9-36A3C38C20D2}" dt="2021-02-23T14:55:31.309" v="176"/>
+        <pc:sldMasterMkLst>
+          <pc:docMk/>
+          <pc:sldMasterMk cId="2710199411" sldId="2147483684"/>
+        </pc:sldMasterMkLst>
+        <pc:sldLayoutChg chg="add mod replId">
+          <pc:chgData name="Cosmin Covrig" userId="S::100517186@unimail.derby.ac.uk::8dcd05c6-e7ae-4cf1-8843-fa63bee14fde" providerId="AD" clId="Web-{DB32D146-5815-4497-85E9-36A3C38C20D2}" dt="2021-02-23T14:55:31.309" v="176"/>
+          <pc:sldLayoutMkLst>
+            <pc:docMk/>
+            <pc:sldMasterMk cId="2710199411" sldId="2147483684"/>
+            <pc:sldLayoutMk cId="1713682349" sldId="2147483685"/>
+          </pc:sldLayoutMkLst>
+        </pc:sldLayoutChg>
+        <pc:sldLayoutChg chg="add mod replId">
+          <pc:chgData name="Cosmin Covrig" userId="S::100517186@unimail.derby.ac.uk::8dcd05c6-e7ae-4cf1-8843-fa63bee14fde" providerId="AD" clId="Web-{DB32D146-5815-4497-85E9-36A3C38C20D2}" dt="2021-02-23T14:55:31.309" v="176"/>
+          <pc:sldLayoutMkLst>
+            <pc:docMk/>
+            <pc:sldMasterMk cId="2710199411" sldId="2147483684"/>
+            <pc:sldLayoutMk cId="2675436021" sldId="2147483686"/>
+          </pc:sldLayoutMkLst>
+        </pc:sldLayoutChg>
+        <pc:sldLayoutChg chg="add mod replId">
+          <pc:chgData name="Cosmin Covrig" userId="S::100517186@unimail.derby.ac.uk::8dcd05c6-e7ae-4cf1-8843-fa63bee14fde" providerId="AD" clId="Web-{DB32D146-5815-4497-85E9-36A3C38C20D2}" dt="2021-02-23T14:55:31.309" v="176"/>
+          <pc:sldLayoutMkLst>
+            <pc:docMk/>
+            <pc:sldMasterMk cId="2710199411" sldId="2147483684"/>
+            <pc:sldLayoutMk cId="3533389901" sldId="2147483687"/>
+          </pc:sldLayoutMkLst>
+        </pc:sldLayoutChg>
+        <pc:sldLayoutChg chg="add mod replId">
+          <pc:chgData name="Cosmin Covrig" userId="S::100517186@unimail.derby.ac.uk::8dcd05c6-e7ae-4cf1-8843-fa63bee14fde" providerId="AD" clId="Web-{DB32D146-5815-4497-85E9-36A3C38C20D2}" dt="2021-02-23T14:55:31.309" v="176"/>
+          <pc:sldLayoutMkLst>
+            <pc:docMk/>
+            <pc:sldMasterMk cId="2710199411" sldId="2147483684"/>
+            <pc:sldLayoutMk cId="636089524" sldId="2147483688"/>
+          </pc:sldLayoutMkLst>
+        </pc:sldLayoutChg>
+        <pc:sldLayoutChg chg="add mod replId">
+          <pc:chgData name="Cosmin Covrig" userId="S::100517186@unimail.derby.ac.uk::8dcd05c6-e7ae-4cf1-8843-fa63bee14fde" providerId="AD" clId="Web-{DB32D146-5815-4497-85E9-36A3C38C20D2}" dt="2021-02-23T14:55:31.309" v="176"/>
+          <pc:sldLayoutMkLst>
+            <pc:docMk/>
+            <pc:sldMasterMk cId="2710199411" sldId="2147483684"/>
+            <pc:sldLayoutMk cId="4033909118" sldId="2147483689"/>
+          </pc:sldLayoutMkLst>
+        </pc:sldLayoutChg>
+        <pc:sldLayoutChg chg="add mod replId">
+          <pc:chgData name="Cosmin Covrig" userId="S::100517186@unimail.derby.ac.uk::8dcd05c6-e7ae-4cf1-8843-fa63bee14fde" providerId="AD" clId="Web-{DB32D146-5815-4497-85E9-36A3C38C20D2}" dt="2021-02-23T14:55:31.309" v="176"/>
+          <pc:sldLayoutMkLst>
+            <pc:docMk/>
+            <pc:sldMasterMk cId="2710199411" sldId="2147483684"/>
+            <pc:sldLayoutMk cId="4077004031" sldId="2147483690"/>
+          </pc:sldLayoutMkLst>
+        </pc:sldLayoutChg>
+        <pc:sldLayoutChg chg="add mod replId">
+          <pc:chgData name="Cosmin Covrig" userId="S::100517186@unimail.derby.ac.uk::8dcd05c6-e7ae-4cf1-8843-fa63bee14fde" providerId="AD" clId="Web-{DB32D146-5815-4497-85E9-36A3C38C20D2}" dt="2021-02-23T14:55:31.309" v="176"/>
+          <pc:sldLayoutMkLst>
+            <pc:docMk/>
+            <pc:sldMasterMk cId="2710199411" sldId="2147483684"/>
+            <pc:sldLayoutMk cId="2974803338" sldId="2147483691"/>
+          </pc:sldLayoutMkLst>
+        </pc:sldLayoutChg>
+        <pc:sldLayoutChg chg="add mod replId">
+          <pc:chgData name="Cosmin Covrig" userId="S::100517186@unimail.derby.ac.uk::8dcd05c6-e7ae-4cf1-8843-fa63bee14fde" providerId="AD" clId="Web-{DB32D146-5815-4497-85E9-36A3C38C20D2}" dt="2021-02-23T14:55:31.309" v="176"/>
+          <pc:sldLayoutMkLst>
+            <pc:docMk/>
+            <pc:sldMasterMk cId="2710199411" sldId="2147483684"/>
+            <pc:sldLayoutMk cId="823693320" sldId="2147483692"/>
+          </pc:sldLayoutMkLst>
+        </pc:sldLayoutChg>
+        <pc:sldLayoutChg chg="add mod replId">
+          <pc:chgData name="Cosmin Covrig" userId="S::100517186@unimail.derby.ac.uk::8dcd05c6-e7ae-4cf1-8843-fa63bee14fde" providerId="AD" clId="Web-{DB32D146-5815-4497-85E9-36A3C38C20D2}" dt="2021-02-23T14:55:31.309" v="176"/>
+          <pc:sldLayoutMkLst>
+            <pc:docMk/>
+            <pc:sldMasterMk cId="2710199411" sldId="2147483684"/>
+            <pc:sldLayoutMk cId="2813169369" sldId="2147483693"/>
+          </pc:sldLayoutMkLst>
+        </pc:sldLayoutChg>
+        <pc:sldLayoutChg chg="add mod replId">
+          <pc:chgData name="Cosmin Covrig" userId="S::100517186@unimail.derby.ac.uk::8dcd05c6-e7ae-4cf1-8843-fa63bee14fde" providerId="AD" clId="Web-{DB32D146-5815-4497-85E9-36A3C38C20D2}" dt="2021-02-23T14:55:31.309" v="176"/>
+          <pc:sldLayoutMkLst>
+            <pc:docMk/>
+            <pc:sldMasterMk cId="2710199411" sldId="2147483684"/>
+            <pc:sldLayoutMk cId="3760679582" sldId="2147483694"/>
+          </pc:sldLayoutMkLst>
+        </pc:sldLayoutChg>
+        <pc:sldLayoutChg chg="add mod replId">
+          <pc:chgData name="Cosmin Covrig" userId="S::100517186@unimail.derby.ac.uk::8dcd05c6-e7ae-4cf1-8843-fa63bee14fde" providerId="AD" clId="Web-{DB32D146-5815-4497-85E9-36A3C38C20D2}" dt="2021-02-23T14:55:31.309" v="176"/>
+          <pc:sldLayoutMkLst>
+            <pc:docMk/>
+            <pc:sldMasterMk cId="2710199411" sldId="2147483684"/>
+            <pc:sldLayoutMk cId="1386778836" sldId="2147483695"/>
+          </pc:sldLayoutMkLst>
+        </pc:sldLayoutChg>
+      </pc:sldMasterChg>
     </pc:docChg>
   </pc:docChgLst>
   <pc:docChgLst>
     <pc:chgData name="Alex Dent" userId="4d9ae5c4-03b0-4a4c-833c-428df8ac79a1" providerId="ADAL" clId="{1B802794-2BA0-4A94-BD26-1716E606C6DB}"/>
     <pc:docChg chg="undo custSel mod addSld delSld modSld">
-      <pc:chgData name="Alex Dent" userId="4d9ae5c4-03b0-4a4c-833c-428df8ac79a1" providerId="ADAL" clId="{1B802794-2BA0-4A94-BD26-1716E606C6DB}" dt="2021-02-25T15:31:49.392" v="4329" actId="20577"/>
+      <pc:chgData name="Alex Dent" userId="4d9ae5c4-03b0-4a4c-833c-428df8ac79a1" providerId="ADAL" clId="{1B802794-2BA0-4A94-BD26-1716E606C6DB}" dt="2021-03-02T14:44:33.398" v="4339" actId="27636"/>
       <pc:docMkLst>
         <pc:docMk/>
       </pc:docMkLst>
@@ -2177,7 +1820,7 @@
         </pc:picChg>
       </pc:sldChg>
       <pc:sldChg chg="addSp delSp modSp new mod">
-        <pc:chgData name="Alex Dent" userId="4d9ae5c4-03b0-4a4c-833c-428df8ac79a1" providerId="ADAL" clId="{1B802794-2BA0-4A94-BD26-1716E606C6DB}" dt="2021-02-24T16:03:05.006" v="1912" actId="27636"/>
+        <pc:chgData name="Alex Dent" userId="4d9ae5c4-03b0-4a4c-833c-428df8ac79a1" providerId="ADAL" clId="{1B802794-2BA0-4A94-BD26-1716E606C6DB}" dt="2021-03-02T14:44:33.398" v="4339" actId="27636"/>
         <pc:sldMkLst>
           <pc:docMk/>
           <pc:sldMk cId="1589364513" sldId="261"/>
@@ -2247,7 +1890,7 @@
           </ac:spMkLst>
         </pc:spChg>
         <pc:spChg chg="add mod">
-          <ac:chgData name="Alex Dent" userId="4d9ae5c4-03b0-4a4c-833c-428df8ac79a1" providerId="ADAL" clId="{1B802794-2BA0-4A94-BD26-1716E606C6DB}" dt="2021-02-24T16:03:05.006" v="1912" actId="27636"/>
+          <ac:chgData name="Alex Dent" userId="4d9ae5c4-03b0-4a4c-833c-428df8ac79a1" providerId="ADAL" clId="{1B802794-2BA0-4A94-BD26-1716E606C6DB}" dt="2021-03-02T14:44:33.398" v="4339" actId="27636"/>
           <ac:spMkLst>
             <pc:docMk/>
             <pc:sldMk cId="1589364513" sldId="261"/>
@@ -4519,644 +4162,1000 @@
     </pc:docChg>
   </pc:docChgLst>
   <pc:docChgLst>
-    <pc:chgData name="Cosmin Covrig" userId="S::100517186@unimail.derby.ac.uk::8dcd05c6-e7ae-4cf1-8843-fa63bee14fde" providerId="AD" clId="Web-{DB32D146-5815-4497-85E9-36A3C38C20D2}"/>
-    <pc:docChg chg="modSld addMainMaster delMainMaster">
-      <pc:chgData name="Cosmin Covrig" userId="S::100517186@unimail.derby.ac.uk::8dcd05c6-e7ae-4cf1-8843-fa63bee14fde" providerId="AD" clId="Web-{DB32D146-5815-4497-85E9-36A3C38C20D2}" dt="2021-02-23T14:55:31.309" v="176"/>
+    <pc:chgData clId="Web-{029DEA9D-38DA-3D54-DA2D-BED0612A7FB1}"/>
+    <pc:docChg chg="modSld">
+      <pc:chgData name="" userId="" providerId="" clId="Web-{029DEA9D-38DA-3D54-DA2D-BED0612A7FB1}" dt="2021-02-23T14:51:43.627" v="0" actId="1076"/>
       <pc:docMkLst>
         <pc:docMk/>
       </pc:docMkLst>
-      <pc:sldChg chg="addSp delSp modSp mod modClrScheme chgLayout">
-        <pc:chgData name="Cosmin Covrig" userId="S::100517186@unimail.derby.ac.uk::8dcd05c6-e7ae-4cf1-8843-fa63bee14fde" providerId="AD" clId="Web-{DB32D146-5815-4497-85E9-36A3C38C20D2}" dt="2021-02-23T14:55:31.309" v="176"/>
-        <pc:sldMkLst>
-          <pc:docMk/>
-          <pc:sldMk cId="109857222" sldId="256"/>
-        </pc:sldMkLst>
-        <pc:spChg chg="mod ord">
-          <ac:chgData name="Cosmin Covrig" userId="S::100517186@unimail.derby.ac.uk::8dcd05c6-e7ae-4cf1-8843-fa63bee14fde" providerId="AD" clId="Web-{DB32D146-5815-4497-85E9-36A3C38C20D2}" dt="2021-02-23T14:55:31.309" v="176"/>
-          <ac:spMkLst>
-            <pc:docMk/>
-            <pc:sldMk cId="109857222" sldId="256"/>
-            <ac:spMk id="2" creationId="{00000000-0000-0000-0000-000000000000}"/>
-          </ac:spMkLst>
-        </pc:spChg>
-        <pc:spChg chg="mod ord">
-          <ac:chgData name="Cosmin Covrig" userId="S::100517186@unimail.derby.ac.uk::8dcd05c6-e7ae-4cf1-8843-fa63bee14fde" providerId="AD" clId="Web-{DB32D146-5815-4497-85E9-36A3C38C20D2}" dt="2021-02-23T14:55:31.309" v="176"/>
-          <ac:spMkLst>
-            <pc:docMk/>
-            <pc:sldMk cId="109857222" sldId="256"/>
-            <ac:spMk id="3" creationId="{00000000-0000-0000-0000-000000000000}"/>
-          </ac:spMkLst>
-        </pc:spChg>
-        <pc:spChg chg="add del mod">
-          <ac:chgData name="Cosmin Covrig" userId="S::100517186@unimail.derby.ac.uk::8dcd05c6-e7ae-4cf1-8843-fa63bee14fde" providerId="AD" clId="Web-{DB32D146-5815-4497-85E9-36A3C38C20D2}" dt="2021-02-23T14:36:09.125" v="32"/>
-          <ac:spMkLst>
-            <pc:docMk/>
-            <pc:sldMk cId="109857222" sldId="256"/>
-            <ac:spMk id="4" creationId="{98F49ACD-370B-4C47-9C04-0F26048E795B}"/>
-          </ac:spMkLst>
-        </pc:spChg>
-        <pc:spChg chg="mod">
-          <ac:chgData name="Cosmin Covrig" userId="S::100517186@unimail.derby.ac.uk::8dcd05c6-e7ae-4cf1-8843-fa63bee14fde" providerId="AD" clId="Web-{DB32D146-5815-4497-85E9-36A3C38C20D2}" dt="2021-02-23T14:38:58.831" v="77" actId="1076"/>
-          <ac:spMkLst>
-            <pc:docMk/>
-            <pc:sldMk cId="109857222" sldId="256"/>
-            <ac:spMk id="5" creationId="{F39E51F4-5EE1-40CC-B6DB-9A51D13E45E1}"/>
-          </ac:spMkLst>
-        </pc:spChg>
-        <pc:spChg chg="add del mod">
-          <ac:chgData name="Cosmin Covrig" userId="S::100517186@unimail.derby.ac.uk::8dcd05c6-e7ae-4cf1-8843-fa63bee14fde" providerId="AD" clId="Web-{DB32D146-5815-4497-85E9-36A3C38C20D2}" dt="2021-02-23T14:40:31.880" v="95"/>
-          <ac:spMkLst>
-            <pc:docMk/>
-            <pc:sldMk cId="109857222" sldId="256"/>
-            <ac:spMk id="6" creationId="{0FDBBA8C-4DA3-4403-A3EB-2F1EDFA75F38}"/>
-          </ac:spMkLst>
-        </pc:spChg>
-        <pc:spChg chg="add del">
-          <ac:chgData name="Cosmin Covrig" userId="S::100517186@unimail.derby.ac.uk::8dcd05c6-e7ae-4cf1-8843-fa63bee14fde" providerId="AD" clId="Web-{DB32D146-5815-4497-85E9-36A3C38C20D2}" dt="2021-02-23T14:36:14.219" v="35"/>
-          <ac:spMkLst>
-            <pc:docMk/>
-            <pc:sldMk cId="109857222" sldId="256"/>
-            <ac:spMk id="7" creationId="{73B82A8F-3EDC-4FAC-AB38-2509CDE6617A}"/>
-          </ac:spMkLst>
-        </pc:spChg>
-        <pc:spChg chg="mod">
-          <ac:chgData name="Cosmin Covrig" userId="S::100517186@unimail.derby.ac.uk::8dcd05c6-e7ae-4cf1-8843-fa63bee14fde" providerId="AD" clId="Web-{DB32D146-5815-4497-85E9-36A3C38C20D2}" dt="2021-02-23T14:38:33.628" v="75" actId="20577"/>
-          <ac:spMkLst>
-            <pc:docMk/>
-            <pc:sldMk cId="109857222" sldId="256"/>
-            <ac:spMk id="8" creationId="{8CA9DDC5-9505-4974-8BD1-24DA27DBDB9B}"/>
-          </ac:spMkLst>
-        </pc:spChg>
-        <pc:spChg chg="add mod">
-          <ac:chgData name="Cosmin Covrig" userId="S::100517186@unimail.derby.ac.uk::8dcd05c6-e7ae-4cf1-8843-fa63bee14fde" providerId="AD" clId="Web-{DB32D146-5815-4497-85E9-36A3C38C20D2}" dt="2021-02-23T14:39:41.504" v="83" actId="1076"/>
-          <ac:spMkLst>
-            <pc:docMk/>
-            <pc:sldMk cId="109857222" sldId="256"/>
-            <ac:spMk id="9" creationId="{C256ADBA-0193-4154-A9EC-4DF0AE55BD82}"/>
-          </ac:spMkLst>
-        </pc:spChg>
-        <pc:spChg chg="mod">
-          <ac:chgData name="Cosmin Covrig" userId="S::100517186@unimail.derby.ac.uk::8dcd05c6-e7ae-4cf1-8843-fa63bee14fde" providerId="AD" clId="Web-{DB32D146-5815-4497-85E9-36A3C38C20D2}" dt="2021-02-23T14:38:39.175" v="76" actId="20577"/>
-          <ac:spMkLst>
-            <pc:docMk/>
-            <pc:sldMk cId="109857222" sldId="256"/>
-            <ac:spMk id="10" creationId="{3FD72FA5-F79E-4358-A434-0275E3DA9332}"/>
-          </ac:spMkLst>
-        </pc:spChg>
-        <pc:spChg chg="mod">
-          <ac:chgData name="Cosmin Covrig" userId="S::100517186@unimail.derby.ac.uk::8dcd05c6-e7ae-4cf1-8843-fa63bee14fde" providerId="AD" clId="Web-{DB32D146-5815-4497-85E9-36A3C38C20D2}" dt="2021-02-23T14:39:34.504" v="82" actId="1076"/>
-          <ac:spMkLst>
-            <pc:docMk/>
-            <pc:sldMk cId="109857222" sldId="256"/>
-            <ac:spMk id="11" creationId="{45DC4821-A6CB-4E64-A438-A5A25A1EF676}"/>
-          </ac:spMkLst>
-        </pc:spChg>
-      </pc:sldChg>
-      <pc:sldChg chg="addSp delSp modSp mod modClrScheme chgLayout">
-        <pc:chgData name="Cosmin Covrig" userId="S::100517186@unimail.derby.ac.uk::8dcd05c6-e7ae-4cf1-8843-fa63bee14fde" providerId="AD" clId="Web-{DB32D146-5815-4497-85E9-36A3C38C20D2}" dt="2021-02-23T14:55:31.309" v="176"/>
-        <pc:sldMkLst>
-          <pc:docMk/>
-          <pc:sldMk cId="2926508388" sldId="257"/>
-        </pc:sldMkLst>
-        <pc:spChg chg="mod ord">
-          <ac:chgData name="Cosmin Covrig" userId="S::100517186@unimail.derby.ac.uk::8dcd05c6-e7ae-4cf1-8843-fa63bee14fde" providerId="AD" clId="Web-{DB32D146-5815-4497-85E9-36A3C38C20D2}" dt="2021-02-23T14:55:31.309" v="176"/>
-          <ac:spMkLst>
-            <pc:docMk/>
-            <pc:sldMk cId="2926508388" sldId="257"/>
-            <ac:spMk id="2" creationId="{6A2B298E-0391-482E-B01A-3C5C94A52F29}"/>
-          </ac:spMkLst>
-        </pc:spChg>
-        <pc:spChg chg="add mod">
-          <ac:chgData name="Cosmin Covrig" userId="S::100517186@unimail.derby.ac.uk::8dcd05c6-e7ae-4cf1-8843-fa63bee14fde" providerId="AD" clId="Web-{DB32D146-5815-4497-85E9-36A3C38C20D2}" dt="2021-02-23T14:44:35.136" v="105" actId="1076"/>
-          <ac:spMkLst>
-            <pc:docMk/>
-            <pc:sldMk cId="2926508388" sldId="257"/>
-            <ac:spMk id="3" creationId="{4A5C7E49-028F-4D07-B7F0-60FA8D2C9756}"/>
-          </ac:spMkLst>
-        </pc:spChg>
-        <pc:spChg chg="del">
-          <ac:chgData name="Cosmin Covrig" userId="S::100517186@unimail.derby.ac.uk::8dcd05c6-e7ae-4cf1-8843-fa63bee14fde" providerId="AD" clId="Web-{DB32D146-5815-4497-85E9-36A3C38C20D2}" dt="2021-02-23T14:44:01.400" v="97"/>
-          <ac:spMkLst>
-            <pc:docMk/>
-            <pc:sldMk cId="2926508388" sldId="257"/>
-            <ac:spMk id="3" creationId="{DE744D3C-F406-4BC0-9523-D5E411805B7A}"/>
-          </ac:spMkLst>
-        </pc:spChg>
-        <pc:spChg chg="add del">
-          <ac:chgData name="Cosmin Covrig" userId="S::100517186@unimail.derby.ac.uk::8dcd05c6-e7ae-4cf1-8843-fa63bee14fde" providerId="AD" clId="Web-{DB32D146-5815-4497-85E9-36A3C38C20D2}" dt="2021-02-23T14:44:12.479" v="99"/>
-          <ac:spMkLst>
-            <pc:docMk/>
-            <pc:sldMk cId="2926508388" sldId="257"/>
-            <ac:spMk id="4" creationId="{26C17C2B-E358-41AC-9134-40390CBB8298}"/>
-          </ac:spMkLst>
-        </pc:spChg>
-        <pc:spChg chg="add mod">
-          <ac:chgData name="Cosmin Covrig" userId="S::100517186@unimail.derby.ac.uk::8dcd05c6-e7ae-4cf1-8843-fa63bee14fde" providerId="AD" clId="Web-{DB32D146-5815-4497-85E9-36A3C38C20D2}" dt="2021-02-23T14:48:40.735" v="145" actId="20577"/>
-          <ac:spMkLst>
-            <pc:docMk/>
-            <pc:sldMk cId="2926508388" sldId="257"/>
-            <ac:spMk id="4" creationId="{A2C0ED73-8A79-4BDC-B3E3-B2EA324F83C7}"/>
-          </ac:spMkLst>
-        </pc:spChg>
-        <pc:spChg chg="mod">
-          <ac:chgData name="Cosmin Covrig" userId="S::100517186@unimail.derby.ac.uk::8dcd05c6-e7ae-4cf1-8843-fa63bee14fde" providerId="AD" clId="Web-{DB32D146-5815-4497-85E9-36A3C38C20D2}" dt="2021-02-23T14:50:42.440" v="154" actId="1076"/>
-          <ac:spMkLst>
-            <pc:docMk/>
-            <pc:sldMk cId="2926508388" sldId="257"/>
-            <ac:spMk id="5" creationId="{6AFB3809-FA0A-497E-87B5-5F086DE5CB61}"/>
-          </ac:spMkLst>
-        </pc:spChg>
-        <pc:spChg chg="mod">
-          <ac:chgData name="Cosmin Covrig" userId="S::100517186@unimail.derby.ac.uk::8dcd05c6-e7ae-4cf1-8843-fa63bee14fde" providerId="AD" clId="Web-{DB32D146-5815-4497-85E9-36A3C38C20D2}" dt="2021-02-23T14:50:45.909" v="156" actId="1076"/>
-          <ac:spMkLst>
-            <pc:docMk/>
-            <pc:sldMk cId="2926508388" sldId="257"/>
-            <ac:spMk id="6" creationId="{3D5D2E58-DE92-4291-9B36-376EFDC0F8EE}"/>
-          </ac:spMkLst>
-        </pc:spChg>
-        <pc:spChg chg="mod">
-          <ac:chgData name="Cosmin Covrig" userId="S::100517186@unimail.derby.ac.uk::8dcd05c6-e7ae-4cf1-8843-fa63bee14fde" providerId="AD" clId="Web-{DB32D146-5815-4497-85E9-36A3C38C20D2}" dt="2021-02-23T14:51:06.550" v="161" actId="1076"/>
-          <ac:spMkLst>
-            <pc:docMk/>
-            <pc:sldMk cId="2926508388" sldId="257"/>
-            <ac:spMk id="7" creationId="{7B120C33-0FA6-46AE-9455-0E159BC7993F}"/>
-          </ac:spMkLst>
-        </pc:spChg>
-        <pc:spChg chg="add mod">
-          <ac:chgData name="Cosmin Covrig" userId="S::100517186@unimail.derby.ac.uk::8dcd05c6-e7ae-4cf1-8843-fa63bee14fde" providerId="AD" clId="Web-{DB32D146-5815-4497-85E9-36A3C38C20D2}" dt="2021-02-23T14:51:01.441" v="160" actId="1076"/>
-          <ac:spMkLst>
-            <pc:docMk/>
-            <pc:sldMk cId="2926508388" sldId="257"/>
-            <ac:spMk id="8" creationId="{B85650C6-7F00-41D8-89C1-139C277483EB}"/>
-          </ac:spMkLst>
-        </pc:spChg>
-        <pc:picChg chg="add mod">
-          <ac:chgData name="Cosmin Covrig" userId="S::100517186@unimail.derby.ac.uk::8dcd05c6-e7ae-4cf1-8843-fa63bee14fde" providerId="AD" clId="Web-{DB32D146-5815-4497-85E9-36A3C38C20D2}" dt="2021-02-23T14:52:03.239" v="174" actId="1076"/>
-          <ac:picMkLst>
-            <pc:docMk/>
-            <pc:sldMk cId="2926508388" sldId="257"/>
-            <ac:picMk id="9" creationId="{61CAF954-C830-4E27-962E-3AB12F7D9DA7}"/>
-          </ac:picMkLst>
-        </pc:picChg>
-      </pc:sldChg>
-      <pc:sldMasterChg chg="del delSldLayout">
-        <pc:chgData name="Cosmin Covrig" userId="S::100517186@unimail.derby.ac.uk::8dcd05c6-e7ae-4cf1-8843-fa63bee14fde" providerId="AD" clId="Web-{DB32D146-5815-4497-85E9-36A3C38C20D2}" dt="2021-02-23T14:55:27.012" v="175"/>
-        <pc:sldMasterMkLst>
-          <pc:docMk/>
-          <pc:sldMasterMk cId="2460954070" sldId="2147483660"/>
-        </pc:sldMasterMkLst>
-        <pc:sldLayoutChg chg="del">
-          <pc:chgData name="Cosmin Covrig" userId="S::100517186@unimail.derby.ac.uk::8dcd05c6-e7ae-4cf1-8843-fa63bee14fde" providerId="AD" clId="Web-{DB32D146-5815-4497-85E9-36A3C38C20D2}" dt="2021-02-23T14:55:27.012" v="175"/>
-          <pc:sldLayoutMkLst>
-            <pc:docMk/>
-            <pc:sldMasterMk cId="2460954070" sldId="2147483660"/>
-            <pc:sldLayoutMk cId="2385387890" sldId="2147483661"/>
-          </pc:sldLayoutMkLst>
-        </pc:sldLayoutChg>
-        <pc:sldLayoutChg chg="del">
-          <pc:chgData name="Cosmin Covrig" userId="S::100517186@unimail.derby.ac.uk::8dcd05c6-e7ae-4cf1-8843-fa63bee14fde" providerId="AD" clId="Web-{DB32D146-5815-4497-85E9-36A3C38C20D2}" dt="2021-02-23T14:55:27.012" v="175"/>
-          <pc:sldLayoutMkLst>
-            <pc:docMk/>
-            <pc:sldMasterMk cId="2460954070" sldId="2147483660"/>
-            <pc:sldLayoutMk cId="949138452" sldId="2147483662"/>
-          </pc:sldLayoutMkLst>
-        </pc:sldLayoutChg>
-        <pc:sldLayoutChg chg="del">
-          <pc:chgData name="Cosmin Covrig" userId="S::100517186@unimail.derby.ac.uk::8dcd05c6-e7ae-4cf1-8843-fa63bee14fde" providerId="AD" clId="Web-{DB32D146-5815-4497-85E9-36A3C38C20D2}" dt="2021-02-23T14:55:27.012" v="175"/>
-          <pc:sldLayoutMkLst>
-            <pc:docMk/>
-            <pc:sldMasterMk cId="2460954070" sldId="2147483660"/>
-            <pc:sldLayoutMk cId="2591524520" sldId="2147483663"/>
-          </pc:sldLayoutMkLst>
-        </pc:sldLayoutChg>
-        <pc:sldLayoutChg chg="del">
-          <pc:chgData name="Cosmin Covrig" userId="S::100517186@unimail.derby.ac.uk::8dcd05c6-e7ae-4cf1-8843-fa63bee14fde" providerId="AD" clId="Web-{DB32D146-5815-4497-85E9-36A3C38C20D2}" dt="2021-02-23T14:55:27.012" v="175"/>
-          <pc:sldLayoutMkLst>
-            <pc:docMk/>
-            <pc:sldMasterMk cId="2460954070" sldId="2147483660"/>
-            <pc:sldLayoutMk cId="1203092039" sldId="2147483664"/>
-          </pc:sldLayoutMkLst>
-        </pc:sldLayoutChg>
-        <pc:sldLayoutChg chg="del">
-          <pc:chgData name="Cosmin Covrig" userId="S::100517186@unimail.derby.ac.uk::8dcd05c6-e7ae-4cf1-8843-fa63bee14fde" providerId="AD" clId="Web-{DB32D146-5815-4497-85E9-36A3C38C20D2}" dt="2021-02-23T14:55:27.012" v="175"/>
-          <pc:sldLayoutMkLst>
-            <pc:docMk/>
-            <pc:sldMasterMk cId="2460954070" sldId="2147483660"/>
-            <pc:sldLayoutMk cId="3733172339" sldId="2147483665"/>
-          </pc:sldLayoutMkLst>
-        </pc:sldLayoutChg>
-        <pc:sldLayoutChg chg="del">
-          <pc:chgData name="Cosmin Covrig" userId="S::100517186@unimail.derby.ac.uk::8dcd05c6-e7ae-4cf1-8843-fa63bee14fde" providerId="AD" clId="Web-{DB32D146-5815-4497-85E9-36A3C38C20D2}" dt="2021-02-23T14:55:27.012" v="175"/>
-          <pc:sldLayoutMkLst>
-            <pc:docMk/>
-            <pc:sldMasterMk cId="2460954070" sldId="2147483660"/>
-            <pc:sldLayoutMk cId="3210312558" sldId="2147483666"/>
-          </pc:sldLayoutMkLst>
-        </pc:sldLayoutChg>
-        <pc:sldLayoutChg chg="del">
-          <pc:chgData name="Cosmin Covrig" userId="S::100517186@unimail.derby.ac.uk::8dcd05c6-e7ae-4cf1-8843-fa63bee14fde" providerId="AD" clId="Web-{DB32D146-5815-4497-85E9-36A3C38C20D2}" dt="2021-02-23T14:55:27.012" v="175"/>
-          <pc:sldLayoutMkLst>
-            <pc:docMk/>
-            <pc:sldMasterMk cId="2460954070" sldId="2147483660"/>
-            <pc:sldLayoutMk cId="3146388984" sldId="2147483667"/>
-          </pc:sldLayoutMkLst>
-        </pc:sldLayoutChg>
-        <pc:sldLayoutChg chg="del">
-          <pc:chgData name="Cosmin Covrig" userId="S::100517186@unimail.derby.ac.uk::8dcd05c6-e7ae-4cf1-8843-fa63bee14fde" providerId="AD" clId="Web-{DB32D146-5815-4497-85E9-36A3C38C20D2}" dt="2021-02-23T14:55:27.012" v="175"/>
-          <pc:sldLayoutMkLst>
-            <pc:docMk/>
-            <pc:sldMasterMk cId="2460954070" sldId="2147483660"/>
-            <pc:sldLayoutMk cId="3171841454" sldId="2147483668"/>
-          </pc:sldLayoutMkLst>
-        </pc:sldLayoutChg>
-        <pc:sldLayoutChg chg="del">
-          <pc:chgData name="Cosmin Covrig" userId="S::100517186@unimail.derby.ac.uk::8dcd05c6-e7ae-4cf1-8843-fa63bee14fde" providerId="AD" clId="Web-{DB32D146-5815-4497-85E9-36A3C38C20D2}" dt="2021-02-23T14:55:27.012" v="175"/>
-          <pc:sldLayoutMkLst>
-            <pc:docMk/>
-            <pc:sldMasterMk cId="2460954070" sldId="2147483660"/>
-            <pc:sldLayoutMk cId="1718958274" sldId="2147483669"/>
-          </pc:sldLayoutMkLst>
-        </pc:sldLayoutChg>
-        <pc:sldLayoutChg chg="del">
-          <pc:chgData name="Cosmin Covrig" userId="S::100517186@unimail.derby.ac.uk::8dcd05c6-e7ae-4cf1-8843-fa63bee14fde" providerId="AD" clId="Web-{DB32D146-5815-4497-85E9-36A3C38C20D2}" dt="2021-02-23T14:55:27.012" v="175"/>
-          <pc:sldLayoutMkLst>
-            <pc:docMk/>
-            <pc:sldMasterMk cId="2460954070" sldId="2147483660"/>
-            <pc:sldLayoutMk cId="2202905451" sldId="2147483670"/>
-          </pc:sldLayoutMkLst>
-        </pc:sldLayoutChg>
-        <pc:sldLayoutChg chg="del">
-          <pc:chgData name="Cosmin Covrig" userId="S::100517186@unimail.derby.ac.uk::8dcd05c6-e7ae-4cf1-8843-fa63bee14fde" providerId="AD" clId="Web-{DB32D146-5815-4497-85E9-36A3C38C20D2}" dt="2021-02-23T14:55:27.012" v="175"/>
-          <pc:sldLayoutMkLst>
-            <pc:docMk/>
-            <pc:sldMasterMk cId="2460954070" sldId="2147483660"/>
-            <pc:sldLayoutMk cId="3479445657" sldId="2147483671"/>
-          </pc:sldLayoutMkLst>
-        </pc:sldLayoutChg>
-      </pc:sldMasterChg>
-      <pc:sldMasterChg chg="add del addSldLayout delSldLayout modSldLayout">
-        <pc:chgData name="Cosmin Covrig" userId="S::100517186@unimail.derby.ac.uk::8dcd05c6-e7ae-4cf1-8843-fa63bee14fde" providerId="AD" clId="Web-{DB32D146-5815-4497-85E9-36A3C38C20D2}" dt="2021-02-23T14:55:31.309" v="176"/>
-        <pc:sldMasterMkLst>
-          <pc:docMk/>
-          <pc:sldMasterMk cId="665205197" sldId="2147483672"/>
-        </pc:sldMasterMkLst>
-        <pc:sldLayoutChg chg="add del mod replId">
-          <pc:chgData name="Cosmin Covrig" userId="S::100517186@unimail.derby.ac.uk::8dcd05c6-e7ae-4cf1-8843-fa63bee14fde" providerId="AD" clId="Web-{DB32D146-5815-4497-85E9-36A3C38C20D2}" dt="2021-02-23T14:55:31.309" v="176"/>
-          <pc:sldLayoutMkLst>
-            <pc:docMk/>
-            <pc:sldMasterMk cId="665205197" sldId="2147483672"/>
-            <pc:sldLayoutMk cId="981895020" sldId="2147483673"/>
-          </pc:sldLayoutMkLst>
-        </pc:sldLayoutChg>
-        <pc:sldLayoutChg chg="add del mod replId">
-          <pc:chgData name="Cosmin Covrig" userId="S::100517186@unimail.derby.ac.uk::8dcd05c6-e7ae-4cf1-8843-fa63bee14fde" providerId="AD" clId="Web-{DB32D146-5815-4497-85E9-36A3C38C20D2}" dt="2021-02-23T14:55:31.309" v="176"/>
-          <pc:sldLayoutMkLst>
-            <pc:docMk/>
-            <pc:sldMasterMk cId="665205197" sldId="2147483672"/>
-            <pc:sldLayoutMk cId="2824324434" sldId="2147483674"/>
-          </pc:sldLayoutMkLst>
-        </pc:sldLayoutChg>
-        <pc:sldLayoutChg chg="add del mod replId">
-          <pc:chgData name="Cosmin Covrig" userId="S::100517186@unimail.derby.ac.uk::8dcd05c6-e7ae-4cf1-8843-fa63bee14fde" providerId="AD" clId="Web-{DB32D146-5815-4497-85E9-36A3C38C20D2}" dt="2021-02-23T14:55:31.309" v="176"/>
-          <pc:sldLayoutMkLst>
-            <pc:docMk/>
-            <pc:sldMasterMk cId="665205197" sldId="2147483672"/>
-            <pc:sldLayoutMk cId="3492755417" sldId="2147483675"/>
-          </pc:sldLayoutMkLst>
-        </pc:sldLayoutChg>
-        <pc:sldLayoutChg chg="add del mod replId">
-          <pc:chgData name="Cosmin Covrig" userId="S::100517186@unimail.derby.ac.uk::8dcd05c6-e7ae-4cf1-8843-fa63bee14fde" providerId="AD" clId="Web-{DB32D146-5815-4497-85E9-36A3C38C20D2}" dt="2021-02-23T14:55:31.309" v="176"/>
-          <pc:sldLayoutMkLst>
-            <pc:docMk/>
-            <pc:sldMasterMk cId="665205197" sldId="2147483672"/>
-            <pc:sldLayoutMk cId="2158454683" sldId="2147483676"/>
-          </pc:sldLayoutMkLst>
-        </pc:sldLayoutChg>
-        <pc:sldLayoutChg chg="add del mod replId">
-          <pc:chgData name="Cosmin Covrig" userId="S::100517186@unimail.derby.ac.uk::8dcd05c6-e7ae-4cf1-8843-fa63bee14fde" providerId="AD" clId="Web-{DB32D146-5815-4497-85E9-36A3C38C20D2}" dt="2021-02-23T14:55:31.309" v="176"/>
-          <pc:sldLayoutMkLst>
-            <pc:docMk/>
-            <pc:sldMasterMk cId="665205197" sldId="2147483672"/>
-            <pc:sldLayoutMk cId="1603289333" sldId="2147483677"/>
-          </pc:sldLayoutMkLst>
-        </pc:sldLayoutChg>
-        <pc:sldLayoutChg chg="add del mod replId">
-          <pc:chgData name="Cosmin Covrig" userId="S::100517186@unimail.derby.ac.uk::8dcd05c6-e7ae-4cf1-8843-fa63bee14fde" providerId="AD" clId="Web-{DB32D146-5815-4497-85E9-36A3C38C20D2}" dt="2021-02-23T14:55:31.309" v="176"/>
-          <pc:sldLayoutMkLst>
-            <pc:docMk/>
-            <pc:sldMasterMk cId="665205197" sldId="2147483672"/>
-            <pc:sldLayoutMk cId="1951633616" sldId="2147483678"/>
-          </pc:sldLayoutMkLst>
-        </pc:sldLayoutChg>
-        <pc:sldLayoutChg chg="add del mod replId">
-          <pc:chgData name="Cosmin Covrig" userId="S::100517186@unimail.derby.ac.uk::8dcd05c6-e7ae-4cf1-8843-fa63bee14fde" providerId="AD" clId="Web-{DB32D146-5815-4497-85E9-36A3C38C20D2}" dt="2021-02-23T14:55:31.309" v="176"/>
-          <pc:sldLayoutMkLst>
-            <pc:docMk/>
-            <pc:sldMasterMk cId="665205197" sldId="2147483672"/>
-            <pc:sldLayoutMk cId="2466059200" sldId="2147483679"/>
-          </pc:sldLayoutMkLst>
-        </pc:sldLayoutChg>
-        <pc:sldLayoutChg chg="add del mod replId">
-          <pc:chgData name="Cosmin Covrig" userId="S::100517186@unimail.derby.ac.uk::8dcd05c6-e7ae-4cf1-8843-fa63bee14fde" providerId="AD" clId="Web-{DB32D146-5815-4497-85E9-36A3C38C20D2}" dt="2021-02-23T14:55:31.309" v="176"/>
-          <pc:sldLayoutMkLst>
-            <pc:docMk/>
-            <pc:sldMasterMk cId="665205197" sldId="2147483672"/>
-            <pc:sldLayoutMk cId="4200740884" sldId="2147483680"/>
-          </pc:sldLayoutMkLst>
-        </pc:sldLayoutChg>
-        <pc:sldLayoutChg chg="add del mod replId">
-          <pc:chgData name="Cosmin Covrig" userId="S::100517186@unimail.derby.ac.uk::8dcd05c6-e7ae-4cf1-8843-fa63bee14fde" providerId="AD" clId="Web-{DB32D146-5815-4497-85E9-36A3C38C20D2}" dt="2021-02-23T14:55:31.309" v="176"/>
-          <pc:sldLayoutMkLst>
-            <pc:docMk/>
-            <pc:sldMasterMk cId="665205197" sldId="2147483672"/>
-            <pc:sldLayoutMk cId="1294813232" sldId="2147483681"/>
-          </pc:sldLayoutMkLst>
-        </pc:sldLayoutChg>
-        <pc:sldLayoutChg chg="add del mod replId">
-          <pc:chgData name="Cosmin Covrig" userId="S::100517186@unimail.derby.ac.uk::8dcd05c6-e7ae-4cf1-8843-fa63bee14fde" providerId="AD" clId="Web-{DB32D146-5815-4497-85E9-36A3C38C20D2}" dt="2021-02-23T14:55:31.309" v="176"/>
-          <pc:sldLayoutMkLst>
-            <pc:docMk/>
-            <pc:sldMasterMk cId="665205197" sldId="2147483672"/>
-            <pc:sldLayoutMk cId="2546239580" sldId="2147483682"/>
-          </pc:sldLayoutMkLst>
-        </pc:sldLayoutChg>
-        <pc:sldLayoutChg chg="add del mod replId">
-          <pc:chgData name="Cosmin Covrig" userId="S::100517186@unimail.derby.ac.uk::8dcd05c6-e7ae-4cf1-8843-fa63bee14fde" providerId="AD" clId="Web-{DB32D146-5815-4497-85E9-36A3C38C20D2}" dt="2021-02-23T14:55:31.309" v="176"/>
-          <pc:sldLayoutMkLst>
-            <pc:docMk/>
-            <pc:sldMasterMk cId="665205197" sldId="2147483672"/>
-            <pc:sldLayoutMk cId="3595296623" sldId="2147483683"/>
-          </pc:sldLayoutMkLst>
-        </pc:sldLayoutChg>
-      </pc:sldMasterChg>
-      <pc:sldMasterChg chg="add addSldLayout modSldLayout">
-        <pc:chgData name="Cosmin Covrig" userId="S::100517186@unimail.derby.ac.uk::8dcd05c6-e7ae-4cf1-8843-fa63bee14fde" providerId="AD" clId="Web-{DB32D146-5815-4497-85E9-36A3C38C20D2}" dt="2021-02-23T14:55:31.309" v="176"/>
-        <pc:sldMasterMkLst>
-          <pc:docMk/>
-          <pc:sldMasterMk cId="2710199411" sldId="2147483684"/>
-        </pc:sldMasterMkLst>
-        <pc:sldLayoutChg chg="add mod replId">
-          <pc:chgData name="Cosmin Covrig" userId="S::100517186@unimail.derby.ac.uk::8dcd05c6-e7ae-4cf1-8843-fa63bee14fde" providerId="AD" clId="Web-{DB32D146-5815-4497-85E9-36A3C38C20D2}" dt="2021-02-23T14:55:31.309" v="176"/>
-          <pc:sldLayoutMkLst>
-            <pc:docMk/>
-            <pc:sldMasterMk cId="2710199411" sldId="2147483684"/>
-            <pc:sldLayoutMk cId="1713682349" sldId="2147483685"/>
-          </pc:sldLayoutMkLst>
-        </pc:sldLayoutChg>
-        <pc:sldLayoutChg chg="add mod replId">
-          <pc:chgData name="Cosmin Covrig" userId="S::100517186@unimail.derby.ac.uk::8dcd05c6-e7ae-4cf1-8843-fa63bee14fde" providerId="AD" clId="Web-{DB32D146-5815-4497-85E9-36A3C38C20D2}" dt="2021-02-23T14:55:31.309" v="176"/>
-          <pc:sldLayoutMkLst>
-            <pc:docMk/>
-            <pc:sldMasterMk cId="2710199411" sldId="2147483684"/>
-            <pc:sldLayoutMk cId="2675436021" sldId="2147483686"/>
-          </pc:sldLayoutMkLst>
-        </pc:sldLayoutChg>
-        <pc:sldLayoutChg chg="add mod replId">
-          <pc:chgData name="Cosmin Covrig" userId="S::100517186@unimail.derby.ac.uk::8dcd05c6-e7ae-4cf1-8843-fa63bee14fde" providerId="AD" clId="Web-{DB32D146-5815-4497-85E9-36A3C38C20D2}" dt="2021-02-23T14:55:31.309" v="176"/>
-          <pc:sldLayoutMkLst>
-            <pc:docMk/>
-            <pc:sldMasterMk cId="2710199411" sldId="2147483684"/>
-            <pc:sldLayoutMk cId="3533389901" sldId="2147483687"/>
-          </pc:sldLayoutMkLst>
-        </pc:sldLayoutChg>
-        <pc:sldLayoutChg chg="add mod replId">
-          <pc:chgData name="Cosmin Covrig" userId="S::100517186@unimail.derby.ac.uk::8dcd05c6-e7ae-4cf1-8843-fa63bee14fde" providerId="AD" clId="Web-{DB32D146-5815-4497-85E9-36A3C38C20D2}" dt="2021-02-23T14:55:31.309" v="176"/>
-          <pc:sldLayoutMkLst>
-            <pc:docMk/>
-            <pc:sldMasterMk cId="2710199411" sldId="2147483684"/>
-            <pc:sldLayoutMk cId="636089524" sldId="2147483688"/>
-          </pc:sldLayoutMkLst>
-        </pc:sldLayoutChg>
-        <pc:sldLayoutChg chg="add mod replId">
-          <pc:chgData name="Cosmin Covrig" userId="S::100517186@unimail.derby.ac.uk::8dcd05c6-e7ae-4cf1-8843-fa63bee14fde" providerId="AD" clId="Web-{DB32D146-5815-4497-85E9-36A3C38C20D2}" dt="2021-02-23T14:55:31.309" v="176"/>
-          <pc:sldLayoutMkLst>
-            <pc:docMk/>
-            <pc:sldMasterMk cId="2710199411" sldId="2147483684"/>
-            <pc:sldLayoutMk cId="4033909118" sldId="2147483689"/>
-          </pc:sldLayoutMkLst>
-        </pc:sldLayoutChg>
-        <pc:sldLayoutChg chg="add mod replId">
-          <pc:chgData name="Cosmin Covrig" userId="S::100517186@unimail.derby.ac.uk::8dcd05c6-e7ae-4cf1-8843-fa63bee14fde" providerId="AD" clId="Web-{DB32D146-5815-4497-85E9-36A3C38C20D2}" dt="2021-02-23T14:55:31.309" v="176"/>
-          <pc:sldLayoutMkLst>
-            <pc:docMk/>
-            <pc:sldMasterMk cId="2710199411" sldId="2147483684"/>
-            <pc:sldLayoutMk cId="4077004031" sldId="2147483690"/>
-          </pc:sldLayoutMkLst>
-        </pc:sldLayoutChg>
-        <pc:sldLayoutChg chg="add mod replId">
-          <pc:chgData name="Cosmin Covrig" userId="S::100517186@unimail.derby.ac.uk::8dcd05c6-e7ae-4cf1-8843-fa63bee14fde" providerId="AD" clId="Web-{DB32D146-5815-4497-85E9-36A3C38C20D2}" dt="2021-02-23T14:55:31.309" v="176"/>
-          <pc:sldLayoutMkLst>
-            <pc:docMk/>
-            <pc:sldMasterMk cId="2710199411" sldId="2147483684"/>
-            <pc:sldLayoutMk cId="2974803338" sldId="2147483691"/>
-          </pc:sldLayoutMkLst>
-        </pc:sldLayoutChg>
-        <pc:sldLayoutChg chg="add mod replId">
-          <pc:chgData name="Cosmin Covrig" userId="S::100517186@unimail.derby.ac.uk::8dcd05c6-e7ae-4cf1-8843-fa63bee14fde" providerId="AD" clId="Web-{DB32D146-5815-4497-85E9-36A3C38C20D2}" dt="2021-02-23T14:55:31.309" v="176"/>
-          <pc:sldLayoutMkLst>
-            <pc:docMk/>
-            <pc:sldMasterMk cId="2710199411" sldId="2147483684"/>
-            <pc:sldLayoutMk cId="823693320" sldId="2147483692"/>
-          </pc:sldLayoutMkLst>
-        </pc:sldLayoutChg>
-        <pc:sldLayoutChg chg="add mod replId">
-          <pc:chgData name="Cosmin Covrig" userId="S::100517186@unimail.derby.ac.uk::8dcd05c6-e7ae-4cf1-8843-fa63bee14fde" providerId="AD" clId="Web-{DB32D146-5815-4497-85E9-36A3C38C20D2}" dt="2021-02-23T14:55:31.309" v="176"/>
-          <pc:sldLayoutMkLst>
-            <pc:docMk/>
-            <pc:sldMasterMk cId="2710199411" sldId="2147483684"/>
-            <pc:sldLayoutMk cId="2813169369" sldId="2147483693"/>
-          </pc:sldLayoutMkLst>
-        </pc:sldLayoutChg>
-        <pc:sldLayoutChg chg="add mod replId">
-          <pc:chgData name="Cosmin Covrig" userId="S::100517186@unimail.derby.ac.uk::8dcd05c6-e7ae-4cf1-8843-fa63bee14fde" providerId="AD" clId="Web-{DB32D146-5815-4497-85E9-36A3C38C20D2}" dt="2021-02-23T14:55:31.309" v="176"/>
-          <pc:sldLayoutMkLst>
-            <pc:docMk/>
-            <pc:sldMasterMk cId="2710199411" sldId="2147483684"/>
-            <pc:sldLayoutMk cId="3760679582" sldId="2147483694"/>
-          </pc:sldLayoutMkLst>
-        </pc:sldLayoutChg>
-        <pc:sldLayoutChg chg="add mod replId">
-          <pc:chgData name="Cosmin Covrig" userId="S::100517186@unimail.derby.ac.uk::8dcd05c6-e7ae-4cf1-8843-fa63bee14fde" providerId="AD" clId="Web-{DB32D146-5815-4497-85E9-36A3C38C20D2}" dt="2021-02-23T14:55:31.309" v="176"/>
-          <pc:sldLayoutMkLst>
-            <pc:docMk/>
-            <pc:sldMasterMk cId="2710199411" sldId="2147483684"/>
-            <pc:sldLayoutMk cId="1386778836" sldId="2147483695"/>
-          </pc:sldLayoutMkLst>
-        </pc:sldLayoutChg>
-      </pc:sldMasterChg>
-    </pc:docChg>
-  </pc:docChgLst>
-  <pc:docChgLst>
-    <pc:chgData name="Alex Dent" userId="S::100506322@unimail.derby.ac.uk::4d9ae5c4-03b0-4a4c-833c-428df8ac79a1" providerId="AD" clId="Web-{0E9030D5-4112-1BCC-7CBF-08F85C80D745}"/>
-    <pc:docChg chg="addSld delSld modSld">
-      <pc:chgData name="Alex Dent" userId="S::100506322@unimail.derby.ac.uk::4d9ae5c4-03b0-4a4c-833c-428df8ac79a1" providerId="AD" clId="Web-{0E9030D5-4112-1BCC-7CBF-08F85C80D745}" dt="2021-02-23T14:51:17.777" v="212"/>
-      <pc:docMkLst>
-        <pc:docMk/>
-      </pc:docMkLst>
-      <pc:sldChg chg="addSp modSp">
-        <pc:chgData name="Alex Dent" userId="S::100506322@unimail.derby.ac.uk::4d9ae5c4-03b0-4a4c-833c-428df8ac79a1" providerId="AD" clId="Web-{0E9030D5-4112-1BCC-7CBF-08F85C80D745}" dt="2021-02-23T14:40:41.536" v="141" actId="1076"/>
-        <pc:sldMkLst>
-          <pc:docMk/>
-          <pc:sldMk cId="109857222" sldId="256"/>
-        </pc:sldMkLst>
-        <pc:spChg chg="mod">
-          <ac:chgData name="Alex Dent" userId="S::100506322@unimail.derby.ac.uk::4d9ae5c4-03b0-4a4c-833c-428df8ac79a1" providerId="AD" clId="Web-{0E9030D5-4112-1BCC-7CBF-08F85C80D745}" dt="2021-02-23T14:35:20.814" v="58" actId="20577"/>
-          <ac:spMkLst>
-            <pc:docMk/>
-            <pc:sldMk cId="109857222" sldId="256"/>
-            <ac:spMk id="2" creationId="{00000000-0000-0000-0000-000000000000}"/>
-          </ac:spMkLst>
-        </pc:spChg>
-        <pc:spChg chg="mod">
-          <ac:chgData name="Alex Dent" userId="S::100506322@unimail.derby.ac.uk::4d9ae5c4-03b0-4a4c-833c-428df8ac79a1" providerId="AD" clId="Web-{0E9030D5-4112-1BCC-7CBF-08F85C80D745}" dt="2021-02-23T14:37:34.972" v="95" actId="20577"/>
-          <ac:spMkLst>
-            <pc:docMk/>
-            <pc:sldMk cId="109857222" sldId="256"/>
-            <ac:spMk id="3" creationId="{00000000-0000-0000-0000-000000000000}"/>
-          </ac:spMkLst>
-        </pc:spChg>
-        <pc:spChg chg="add mod">
-          <ac:chgData name="Alex Dent" userId="S::100506322@unimail.derby.ac.uk::4d9ae5c4-03b0-4a4c-833c-428df8ac79a1" providerId="AD" clId="Web-{0E9030D5-4112-1BCC-7CBF-08F85C80D745}" dt="2021-02-23T14:38:47.004" v="108" actId="1076"/>
-          <ac:spMkLst>
-            <pc:docMk/>
-            <pc:sldMk cId="109857222" sldId="256"/>
-            <ac:spMk id="5" creationId="{F39E51F4-5EE1-40CC-B6DB-9A51D13E45E1}"/>
-          </ac:spMkLst>
-        </pc:spChg>
-        <pc:spChg chg="add mod">
-          <ac:chgData name="Alex Dent" userId="S::100506322@unimail.derby.ac.uk::4d9ae5c4-03b0-4a4c-833c-428df8ac79a1" providerId="AD" clId="Web-{0E9030D5-4112-1BCC-7CBF-08F85C80D745}" dt="2021-02-23T14:38:18.785" v="107" actId="20577"/>
-          <ac:spMkLst>
-            <pc:docMk/>
-            <pc:sldMk cId="109857222" sldId="256"/>
-            <ac:spMk id="8" creationId="{8CA9DDC5-9505-4974-8BD1-24DA27DBDB9B}"/>
-          </ac:spMkLst>
-        </pc:spChg>
-        <pc:spChg chg="mod">
-          <ac:chgData name="Alex Dent" userId="S::100506322@unimail.derby.ac.uk::4d9ae5c4-03b0-4a4c-833c-428df8ac79a1" providerId="AD" clId="Web-{0E9030D5-4112-1BCC-7CBF-08F85C80D745}" dt="2021-02-23T14:40:37.583" v="139" actId="1076"/>
-          <ac:spMkLst>
-            <pc:docMk/>
-            <pc:sldMk cId="109857222" sldId="256"/>
-            <ac:spMk id="9" creationId="{C256ADBA-0193-4154-A9EC-4DF0AE55BD82}"/>
-          </ac:spMkLst>
-        </pc:spChg>
-        <pc:spChg chg="add mod">
-          <ac:chgData name="Alex Dent" userId="S::100506322@unimail.derby.ac.uk::4d9ae5c4-03b0-4a4c-833c-428df8ac79a1" providerId="AD" clId="Web-{0E9030D5-4112-1BCC-7CBF-08F85C80D745}" dt="2021-02-23T14:38:14.769" v="106" actId="20577"/>
-          <ac:spMkLst>
-            <pc:docMk/>
-            <pc:sldMk cId="109857222" sldId="256"/>
-            <ac:spMk id="10" creationId="{3FD72FA5-F79E-4358-A434-0275E3DA9332}"/>
-          </ac:spMkLst>
-        </pc:spChg>
-        <pc:spChg chg="add mod">
-          <ac:chgData name="Alex Dent" userId="S::100506322@unimail.derby.ac.uk::4d9ae5c4-03b0-4a4c-833c-428df8ac79a1" providerId="AD" clId="Web-{0E9030D5-4112-1BCC-7CBF-08F85C80D745}" dt="2021-02-23T14:40:41.536" v="141" actId="1076"/>
-          <ac:spMkLst>
-            <pc:docMk/>
-            <pc:sldMk cId="109857222" sldId="256"/>
-            <ac:spMk id="11" creationId="{45DC4821-A6CB-4E64-A438-A5A25A1EF676}"/>
-          </ac:spMkLst>
-        </pc:spChg>
-        <pc:spChg chg="add mod">
-          <ac:chgData name="Alex Dent" userId="S::100506322@unimail.derby.ac.uk::4d9ae5c4-03b0-4a4c-833c-428df8ac79a1" providerId="AD" clId="Web-{0E9030D5-4112-1BCC-7CBF-08F85C80D745}" dt="2021-02-23T14:40:37.583" v="140" actId="1076"/>
-          <ac:spMkLst>
-            <pc:docMk/>
-            <pc:sldMk cId="109857222" sldId="256"/>
-            <ac:spMk id="12" creationId="{0AD72C76-B0FC-4E45-AAB2-876BA1ADC575}"/>
-          </ac:spMkLst>
-        </pc:spChg>
-      </pc:sldChg>
-      <pc:sldChg chg="add del replId">
-        <pc:chgData name="Alex Dent" userId="S::100506322@unimail.derby.ac.uk::4d9ae5c4-03b0-4a4c-833c-428df8ac79a1" providerId="AD" clId="Web-{0E9030D5-4112-1BCC-7CBF-08F85C80D745}" dt="2021-02-23T14:39:29.426" v="123"/>
-        <pc:sldMkLst>
-          <pc:docMk/>
-          <pc:sldMk cId="2544910636" sldId="257"/>
-        </pc:sldMkLst>
-      </pc:sldChg>
-      <pc:sldChg chg="addSp delSp modSp new">
-        <pc:chgData name="Alex Dent" userId="S::100506322@unimail.derby.ac.uk::4d9ae5c4-03b0-4a4c-833c-428df8ac79a1" providerId="AD" clId="Web-{0E9030D5-4112-1BCC-7CBF-08F85C80D745}" dt="2021-02-23T14:51:17.777" v="212"/>
+      <pc:sldChg chg="modSp">
+        <pc:chgData name="" userId="" providerId="" clId="Web-{029DEA9D-38DA-3D54-DA2D-BED0612A7FB1}" dt="2021-02-23T14:51:43.627" v="0" actId="1076"/>
         <pc:sldMkLst>
           <pc:docMk/>
           <pc:sldMk cId="2926508388" sldId="257"/>
         </pc:sldMkLst>
         <pc:spChg chg="mod">
-          <ac:chgData name="Alex Dent" userId="S::100506322@unimail.derby.ac.uk::4d9ae5c4-03b0-4a4c-833c-428df8ac79a1" providerId="AD" clId="Web-{0E9030D5-4112-1BCC-7CBF-08F85C80D745}" dt="2021-02-23T14:44:34.476" v="170" actId="1076"/>
-          <ac:spMkLst>
-            <pc:docMk/>
-            <pc:sldMk cId="2926508388" sldId="257"/>
-            <ac:spMk id="2" creationId="{6A2B298E-0391-482E-B01A-3C5C94A52F29}"/>
-          </ac:spMkLst>
-        </pc:spChg>
-        <pc:spChg chg="del">
-          <ac:chgData name="Alex Dent" userId="S::100506322@unimail.derby.ac.uk::4d9ae5c4-03b0-4a4c-833c-428df8ac79a1" providerId="AD" clId="Web-{0E9030D5-4112-1BCC-7CBF-08F85C80D745}" dt="2021-02-23T14:44:49.273" v="176"/>
-          <ac:spMkLst>
-            <pc:docMk/>
-            <pc:sldMk cId="2926508388" sldId="257"/>
-            <ac:spMk id="3" creationId="{4A5C7E49-028F-4D07-B7F0-60FA8D2C9756}"/>
-          </ac:spMkLst>
-        </pc:spChg>
-        <pc:spChg chg="add mod">
-          <ac:chgData name="Alex Dent" userId="S::100506322@unimail.derby.ac.uk::4d9ae5c4-03b0-4a4c-833c-428df8ac79a1" providerId="AD" clId="Web-{0E9030D5-4112-1BCC-7CBF-08F85C80D745}" dt="2021-02-23T14:48:06.119" v="196" actId="20577"/>
-          <ac:spMkLst>
-            <pc:docMk/>
-            <pc:sldMk cId="2926508388" sldId="257"/>
-            <ac:spMk id="5" creationId="{6AFB3809-FA0A-497E-87B5-5F086DE5CB61}"/>
-          </ac:spMkLst>
-        </pc:spChg>
-        <pc:spChg chg="add mod">
-          <ac:chgData name="Alex Dent" userId="S::100506322@unimail.derby.ac.uk::4d9ae5c4-03b0-4a4c-833c-428df8ac79a1" providerId="AD" clId="Web-{0E9030D5-4112-1BCC-7CBF-08F85C80D745}" dt="2021-02-23T14:47:58.369" v="192" actId="20577"/>
-          <ac:spMkLst>
-            <pc:docMk/>
-            <pc:sldMk cId="2926508388" sldId="257"/>
-            <ac:spMk id="6" creationId="{3D5D2E58-DE92-4291-9B36-376EFDC0F8EE}"/>
-          </ac:spMkLst>
-        </pc:spChg>
-        <pc:spChg chg="add mod">
-          <ac:chgData name="Alex Dent" userId="S::100506322@unimail.derby.ac.uk::4d9ae5c4-03b0-4a4c-833c-428df8ac79a1" providerId="AD" clId="Web-{0E9030D5-4112-1BCC-7CBF-08F85C80D745}" dt="2021-02-23T14:46:50.149" v="190" actId="20577"/>
-          <ac:spMkLst>
-            <pc:docMk/>
-            <pc:sldMk cId="2926508388" sldId="257"/>
-            <ac:spMk id="7" creationId="{7B120C33-0FA6-46AE-9455-0E159BC7993F}"/>
-          </ac:spMkLst>
-        </pc:spChg>
-        <pc:spChg chg="mod">
-          <ac:chgData name="Alex Dent" userId="S::100506322@unimail.derby.ac.uk::4d9ae5c4-03b0-4a4c-833c-428df8ac79a1" providerId="AD" clId="Web-{0E9030D5-4112-1BCC-7CBF-08F85C80D745}" dt="2021-02-23T14:48:01.666" v="194" actId="20577"/>
-          <ac:spMkLst>
-            <pc:docMk/>
-            <pc:sldMk cId="2926508388" sldId="257"/>
-            <ac:spMk id="8" creationId="{B85650C6-7F00-41D8-89C1-139C277483EB}"/>
-          </ac:spMkLst>
-        </pc:spChg>
-        <pc:spChg chg="add mod">
-          <ac:chgData name="Alex Dent" userId="S::100506322@unimail.derby.ac.uk::4d9ae5c4-03b0-4a4c-833c-428df8ac79a1" providerId="AD" clId="Web-{0E9030D5-4112-1BCC-7CBF-08F85C80D745}" dt="2021-02-23T14:50:43.089" v="209" actId="14100"/>
-          <ac:spMkLst>
-            <pc:docMk/>
-            <pc:sldMk cId="2926508388" sldId="257"/>
-            <ac:spMk id="10" creationId="{76DBC2F5-F8E2-4806-9C23-BB196024F14B}"/>
-          </ac:spMkLst>
-        </pc:spChg>
-        <pc:spChg chg="add">
-          <ac:chgData name="Alex Dent" userId="S::100506322@unimail.derby.ac.uk::4d9ae5c4-03b0-4a4c-833c-428df8ac79a1" providerId="AD" clId="Web-{0E9030D5-4112-1BCC-7CBF-08F85C80D745}" dt="2021-02-23T14:51:01.886" v="210"/>
+          <ac:chgData name="" userId="" providerId="" clId="Web-{029DEA9D-38DA-3D54-DA2D-BED0612A7FB1}" dt="2021-02-23T14:51:43.627" v="0" actId="1076"/>
           <ac:spMkLst>
             <pc:docMk/>
             <pc:sldMk cId="2926508388" sldId="257"/>
             <ac:spMk id="11" creationId="{C2522294-BD57-40C2-9A1E-4D1D085ED974}"/>
           </ac:spMkLst>
         </pc:spChg>
-        <pc:spChg chg="add">
-          <ac:chgData name="Alex Dent" userId="S::100506322@unimail.derby.ac.uk::4d9ae5c4-03b0-4a4c-833c-428df8ac79a1" providerId="AD" clId="Web-{0E9030D5-4112-1BCC-7CBF-08F85C80D745}" dt="2021-02-23T14:51:17.636" v="211"/>
+      </pc:sldChg>
+    </pc:docChg>
+  </pc:docChgLst>
+  <pc:docChgLst>
+    <pc:chgData name="Cosmin Covrig" userId="8dcd05c6-e7ae-4cf1-8843-fa63bee14fde" providerId="ADAL" clId="{5B883DA1-DD95-4CDE-95DD-51AE6D9D97DF}"/>
+    <pc:docChg chg="undo custSel addSld delSld modSld sldOrd">
+      <pc:chgData name="Cosmin Covrig" userId="8dcd05c6-e7ae-4cf1-8843-fa63bee14fde" providerId="ADAL" clId="{5B883DA1-DD95-4CDE-95DD-51AE6D9D97DF}" dt="2021-02-25T15:25:34.337" v="2142" actId="1076"/>
+      <pc:docMkLst>
+        <pc:docMk/>
+      </pc:docMkLst>
+      <pc:sldChg chg="addSp delSp modSp mod setBg">
+        <pc:chgData name="Cosmin Covrig" userId="8dcd05c6-e7ae-4cf1-8843-fa63bee14fde" providerId="ADAL" clId="{5B883DA1-DD95-4CDE-95DD-51AE6D9D97DF}" dt="2021-02-25T15:14:21.185" v="1800" actId="1076"/>
+        <pc:sldMkLst>
+          <pc:docMk/>
+          <pc:sldMk cId="2926508388" sldId="257"/>
+        </pc:sldMkLst>
+        <pc:spChg chg="mod">
+          <ac:chgData name="Cosmin Covrig" userId="8dcd05c6-e7ae-4cf1-8843-fa63bee14fde" providerId="ADAL" clId="{5B883DA1-DD95-4CDE-95DD-51AE6D9D97DF}" dt="2021-02-23T15:26:31.105" v="195" actId="20577"/>
           <ac:spMkLst>
             <pc:docMk/>
             <pc:sldMk cId="2926508388" sldId="257"/>
-            <ac:spMk id="12" creationId="{5A62A2CE-5889-4B58-B509-A82CA02ADD9C}"/>
-          </ac:spMkLst>
-        </pc:spChg>
-        <pc:spChg chg="add">
-          <ac:chgData name="Alex Dent" userId="S::100506322@unimail.derby.ac.uk::4d9ae5c4-03b0-4a4c-833c-428df8ac79a1" providerId="AD" clId="Web-{0E9030D5-4112-1BCC-7CBF-08F85C80D745}" dt="2021-02-23T14:51:17.777" v="212"/>
+            <ac:spMk id="12" creationId="{11E2038B-85E5-4526-867C-63B2C9A208AE}"/>
+          </ac:spMkLst>
+        </pc:spChg>
+        <pc:spChg chg="add mod">
+          <ac:chgData name="Cosmin Covrig" userId="8dcd05c6-e7ae-4cf1-8843-fa63bee14fde" providerId="ADAL" clId="{5B883DA1-DD95-4CDE-95DD-51AE6D9D97DF}" dt="2021-02-25T15:09:54.149" v="1745" actId="1076"/>
           <ac:spMkLst>
             <pc:docMk/>
             <pc:sldMk cId="2926508388" sldId="257"/>
-            <ac:spMk id="13" creationId="{0D820CF3-FBC7-4B9D-A763-746143D96FB3}"/>
-          </ac:spMkLst>
-        </pc:spChg>
+            <ac:spMk id="17" creationId="{CDE03E53-08BD-416B-983A-DE440D2F972E}"/>
+          </ac:spMkLst>
+        </pc:spChg>
+        <pc:spChg chg="add mod">
+          <ac:chgData name="Cosmin Covrig" userId="8dcd05c6-e7ae-4cf1-8843-fa63bee14fde" providerId="ADAL" clId="{5B883DA1-DD95-4CDE-95DD-51AE6D9D97DF}" dt="2021-02-25T15:14:21.185" v="1800" actId="1076"/>
+          <ac:spMkLst>
+            <pc:docMk/>
+            <pc:sldMk cId="2926508388" sldId="257"/>
+            <ac:spMk id="21" creationId="{65096748-2001-4688-B874-8C35F86AC736}"/>
+          </ac:spMkLst>
+        </pc:spChg>
+        <pc:grpChg chg="mod">
+          <ac:chgData name="Cosmin Covrig" userId="8dcd05c6-e7ae-4cf1-8843-fa63bee14fde" providerId="ADAL" clId="{5B883DA1-DD95-4CDE-95DD-51AE6D9D97DF}" dt="2021-02-23T15:22:36.154" v="125" actId="14100"/>
+          <ac:grpSpMkLst>
+            <pc:docMk/>
+            <pc:sldMk cId="2926508388" sldId="257"/>
+            <ac:grpSpMk id="10" creationId="{5100E35E-EDE7-4F88-97E8-9241A4D36214}"/>
+          </ac:grpSpMkLst>
+        </pc:grpChg>
+        <pc:picChg chg="del mod">
+          <ac:chgData name="Cosmin Covrig" userId="8dcd05c6-e7ae-4cf1-8843-fa63bee14fde" providerId="ADAL" clId="{5B883DA1-DD95-4CDE-95DD-51AE6D9D97DF}" dt="2021-02-23T15:00:32.312" v="19" actId="478"/>
+          <ac:picMkLst>
+            <pc:docMk/>
+            <pc:sldMk cId="2926508388" sldId="257"/>
+            <ac:picMk id="9" creationId="{61CAF954-C830-4E27-962E-3AB12F7D9DA7}"/>
+          </ac:picMkLst>
+        </pc:picChg>
+        <pc:picChg chg="add del mod">
+          <ac:chgData name="Cosmin Covrig" userId="8dcd05c6-e7ae-4cf1-8843-fa63bee14fde" providerId="ADAL" clId="{5B883DA1-DD95-4CDE-95DD-51AE6D9D97DF}" dt="2021-02-23T15:01:57.268" v="56" actId="478"/>
+          <ac:picMkLst>
+            <pc:docMk/>
+            <pc:sldMk cId="2926508388" sldId="257"/>
+            <ac:picMk id="10" creationId="{677AF5EC-2D0E-497A-94EE-AAB97372079F}"/>
+          </ac:picMkLst>
+        </pc:picChg>
+        <pc:picChg chg="add del mod">
+          <ac:chgData name="Cosmin Covrig" userId="8dcd05c6-e7ae-4cf1-8843-fa63bee14fde" providerId="ADAL" clId="{5B883DA1-DD95-4CDE-95DD-51AE6D9D97DF}" dt="2021-02-23T15:00:47.855" v="29" actId="478"/>
+          <ac:picMkLst>
+            <pc:docMk/>
+            <pc:sldMk cId="2926508388" sldId="257"/>
+            <ac:picMk id="14" creationId="{4D2E85EE-93BE-430C-AF5A-0C65BCED094D}"/>
+          </ac:picMkLst>
+        </pc:picChg>
+        <pc:picChg chg="add del mod">
+          <ac:chgData name="Cosmin Covrig" userId="8dcd05c6-e7ae-4cf1-8843-fa63bee14fde" providerId="ADAL" clId="{5B883DA1-DD95-4CDE-95DD-51AE6D9D97DF}" dt="2021-02-23T15:02:02.391" v="62" actId="478"/>
+          <ac:picMkLst>
+            <pc:docMk/>
+            <pc:sldMk cId="2926508388" sldId="257"/>
+            <ac:picMk id="14" creationId="{9701F12F-3B76-47BA-A72E-16869C44F2AE}"/>
+          </ac:picMkLst>
+        </pc:picChg>
+        <pc:picChg chg="add del mod">
+          <ac:chgData name="Cosmin Covrig" userId="8dcd05c6-e7ae-4cf1-8843-fa63bee14fde" providerId="ADAL" clId="{5B883DA1-DD95-4CDE-95DD-51AE6D9D97DF}" dt="2021-02-23T15:02:03.763" v="64"/>
+          <ac:picMkLst>
+            <pc:docMk/>
+            <pc:sldMk cId="2926508388" sldId="257"/>
+            <ac:picMk id="15" creationId="{FD8A1D12-BF28-49B5-8897-132910F4A303}"/>
+          </ac:picMkLst>
+        </pc:picChg>
+        <pc:picChg chg="mod">
+          <ac:chgData name="Cosmin Covrig" userId="8dcd05c6-e7ae-4cf1-8843-fa63bee14fde" providerId="ADAL" clId="{5B883DA1-DD95-4CDE-95DD-51AE6D9D97DF}" dt="2021-02-23T15:13:17.423" v="76" actId="1076"/>
+          <ac:picMkLst>
+            <pc:docMk/>
+            <pc:sldMk cId="2926508388" sldId="257"/>
+            <ac:picMk id="18" creationId="{9152EB95-B04E-4F84-996F-8E3052E0BF23}"/>
+          </ac:picMkLst>
+        </pc:picChg>
+        <pc:picChg chg="add del mod">
+          <ac:chgData name="Cosmin Covrig" userId="8dcd05c6-e7ae-4cf1-8843-fa63bee14fde" providerId="ADAL" clId="{5B883DA1-DD95-4CDE-95DD-51AE6D9D97DF}" dt="2021-02-23T15:02:32.291" v="68" actId="478"/>
+          <ac:picMkLst>
+            <pc:docMk/>
+            <pc:sldMk cId="2926508388" sldId="257"/>
+            <ac:picMk id="1026" creationId="{F80D9CC4-2832-4DC3-964B-BBC24CB91816}"/>
+          </ac:picMkLst>
+        </pc:picChg>
+        <pc:picChg chg="add del mod">
+          <ac:chgData name="Cosmin Covrig" userId="8dcd05c6-e7ae-4cf1-8843-fa63bee14fde" providerId="ADAL" clId="{5B883DA1-DD95-4CDE-95DD-51AE6D9D97DF}" dt="2021-02-23T15:13:22.402" v="77" actId="478"/>
+          <ac:picMkLst>
+            <pc:docMk/>
+            <pc:sldMk cId="2926508388" sldId="257"/>
+            <ac:picMk id="2050" creationId="{C166D764-25BA-4472-A148-57F95EF3A2FD}"/>
+          </ac:picMkLst>
+        </pc:picChg>
+        <pc:cxnChg chg="add mod">
+          <ac:chgData name="Cosmin Covrig" userId="8dcd05c6-e7ae-4cf1-8843-fa63bee14fde" providerId="ADAL" clId="{5B883DA1-DD95-4CDE-95DD-51AE6D9D97DF}" dt="2021-02-25T15:09:56.660" v="1746" actId="1076"/>
+          <ac:cxnSpMkLst>
+            <pc:docMk/>
+            <pc:sldMk cId="2926508388" sldId="257"/>
+            <ac:cxnSpMk id="15" creationId="{43E32B53-0D15-4C96-A4AA-E16371E7C004}"/>
+          </ac:cxnSpMkLst>
+        </pc:cxnChg>
+        <pc:cxnChg chg="add">
+          <ac:chgData name="Cosmin Covrig" userId="8dcd05c6-e7ae-4cf1-8843-fa63bee14fde" providerId="ADAL" clId="{5B883DA1-DD95-4CDE-95DD-51AE6D9D97DF}" dt="2021-02-25T15:10:17.546" v="1747" actId="11529"/>
+          <ac:cxnSpMkLst>
+            <pc:docMk/>
+            <pc:sldMk cId="2926508388" sldId="257"/>
+            <ac:cxnSpMk id="20" creationId="{3FE86FA4-271B-45BA-9881-4D9E8479F15D}"/>
+          </ac:cxnSpMkLst>
+        </pc:cxnChg>
+      </pc:sldChg>
+      <pc:sldChg chg="addSp delSp modSp mod">
+        <pc:chgData name="Cosmin Covrig" userId="8dcd05c6-e7ae-4cf1-8843-fa63bee14fde" providerId="ADAL" clId="{5B883DA1-DD95-4CDE-95DD-51AE6D9D97DF}" dt="2021-02-25T15:15:49.621" v="1940" actId="1076"/>
+        <pc:sldMkLst>
+          <pc:docMk/>
+          <pc:sldMk cId="3269657135" sldId="258"/>
+        </pc:sldMkLst>
+        <pc:spChg chg="del">
+          <ac:chgData name="Cosmin Covrig" userId="8dcd05c6-e7ae-4cf1-8843-fa63bee14fde" providerId="ADAL" clId="{5B883DA1-DD95-4CDE-95DD-51AE6D9D97DF}" dt="2021-02-23T15:21:19.568" v="94" actId="478"/>
+          <ac:spMkLst>
+            <pc:docMk/>
+            <pc:sldMk cId="3269657135" sldId="258"/>
+            <ac:spMk id="3" creationId="{E5D4B336-56AE-4094-82B1-A11E9C41CC9E}"/>
+          </ac:spMkLst>
+        </pc:spChg>
+        <pc:spChg chg="add mod">
+          <ac:chgData name="Cosmin Covrig" userId="8dcd05c6-e7ae-4cf1-8843-fa63bee14fde" providerId="ADAL" clId="{5B883DA1-DD95-4CDE-95DD-51AE6D9D97DF}" dt="2021-02-25T15:15:49.621" v="1940" actId="1076"/>
+          <ac:spMkLst>
+            <pc:docMk/>
+            <pc:sldMk cId="3269657135" sldId="258"/>
+            <ac:spMk id="7" creationId="{EF3B6BD1-D879-494D-B30E-2033397FF820}"/>
+          </ac:spMkLst>
+        </pc:spChg>
+        <pc:spChg chg="mod">
+          <ac:chgData name="Cosmin Covrig" userId="8dcd05c6-e7ae-4cf1-8843-fa63bee14fde" providerId="ADAL" clId="{5B883DA1-DD95-4CDE-95DD-51AE6D9D97DF}" dt="2021-02-23T15:26:37.458" v="214" actId="20577"/>
+          <ac:spMkLst>
+            <pc:docMk/>
+            <pc:sldMk cId="3269657135" sldId="258"/>
+            <ac:spMk id="15" creationId="{728B1D49-F8FF-4B66-AC57-077B47C91408}"/>
+          </ac:spMkLst>
+        </pc:spChg>
+        <pc:spChg chg="add del mod">
+          <ac:chgData name="Cosmin Covrig" userId="8dcd05c6-e7ae-4cf1-8843-fa63bee14fde" providerId="ADAL" clId="{5B883DA1-DD95-4CDE-95DD-51AE6D9D97DF}" dt="2021-02-23T15:25:40.142" v="129"/>
+          <ac:spMkLst>
+            <pc:docMk/>
+            <pc:sldMk cId="3269657135" sldId="258"/>
+            <ac:spMk id="20" creationId="{ACD8BE7D-0ECF-4D10-8D07-A6F1B02FE8D1}"/>
+          </ac:spMkLst>
+        </pc:spChg>
+        <pc:spChg chg="add del mod">
+          <ac:chgData name="Cosmin Covrig" userId="8dcd05c6-e7ae-4cf1-8843-fa63bee14fde" providerId="ADAL" clId="{5B883DA1-DD95-4CDE-95DD-51AE6D9D97DF}" dt="2021-02-23T15:25:40.143" v="131"/>
+          <ac:spMkLst>
+            <pc:docMk/>
+            <pc:sldMk cId="3269657135" sldId="258"/>
+            <ac:spMk id="21" creationId="{FE03B5BD-5DD2-4D96-8807-321334D6BE5B}"/>
+          </ac:spMkLst>
+        </pc:spChg>
+        <pc:spChg chg="add mod">
+          <ac:chgData name="Cosmin Covrig" userId="8dcd05c6-e7ae-4cf1-8843-fa63bee14fde" providerId="ADAL" clId="{5B883DA1-DD95-4CDE-95DD-51AE6D9D97DF}" dt="2021-02-23T15:28:30.220" v="221" actId="1076"/>
+          <ac:spMkLst>
+            <pc:docMk/>
+            <pc:sldMk cId="3269657135" sldId="258"/>
+            <ac:spMk id="23" creationId="{DEDF5BF5-AEA5-4FD7-8A30-339616FE612D}"/>
+          </ac:spMkLst>
+        </pc:spChg>
+        <pc:spChg chg="add mod">
+          <ac:chgData name="Cosmin Covrig" userId="8dcd05c6-e7ae-4cf1-8843-fa63bee14fde" providerId="ADAL" clId="{5B883DA1-DD95-4CDE-95DD-51AE6D9D97DF}" dt="2021-02-23T15:28:34.141" v="223" actId="1076"/>
+          <ac:spMkLst>
+            <pc:docMk/>
+            <pc:sldMk cId="3269657135" sldId="258"/>
+            <ac:spMk id="24" creationId="{1547B4B7-7877-4EC9-A3CB-24AB2D10FEE1}"/>
+          </ac:spMkLst>
+        </pc:spChg>
+        <pc:spChg chg="add mod">
+          <ac:chgData name="Cosmin Covrig" userId="8dcd05c6-e7ae-4cf1-8843-fa63bee14fde" providerId="ADAL" clId="{5B883DA1-DD95-4CDE-95DD-51AE6D9D97DF}" dt="2021-02-23T15:28:38.017" v="225" actId="1076"/>
+          <ac:spMkLst>
+            <pc:docMk/>
+            <pc:sldMk cId="3269657135" sldId="258"/>
+            <ac:spMk id="25" creationId="{D283C36E-3692-4396-B211-11AE85B260A4}"/>
+          </ac:spMkLst>
+        </pc:spChg>
+        <pc:spChg chg="add mod">
+          <ac:chgData name="Cosmin Covrig" userId="8dcd05c6-e7ae-4cf1-8843-fa63bee14fde" providerId="ADAL" clId="{5B883DA1-DD95-4CDE-95DD-51AE6D9D97DF}" dt="2021-02-23T15:28:41.775" v="227" actId="1076"/>
+          <ac:spMkLst>
+            <pc:docMk/>
+            <pc:sldMk cId="3269657135" sldId="258"/>
+            <ac:spMk id="26" creationId="{23206CA7-DDA4-4F95-80F7-8E2976249C5D}"/>
+          </ac:spMkLst>
+        </pc:spChg>
+        <pc:spChg chg="add mod">
+          <ac:chgData name="Cosmin Covrig" userId="8dcd05c6-e7ae-4cf1-8843-fa63bee14fde" providerId="ADAL" clId="{5B883DA1-DD95-4CDE-95DD-51AE6D9D97DF}" dt="2021-02-23T15:28:45.352" v="229" actId="1076"/>
+          <ac:spMkLst>
+            <pc:docMk/>
+            <pc:sldMk cId="3269657135" sldId="258"/>
+            <ac:spMk id="27" creationId="{AC2C9EF4-5C0B-4CFA-89B4-9F63847341DC}"/>
+          </ac:spMkLst>
+        </pc:spChg>
+        <pc:spChg chg="add mod">
+          <ac:chgData name="Cosmin Covrig" userId="8dcd05c6-e7ae-4cf1-8843-fa63bee14fde" providerId="ADAL" clId="{5B883DA1-DD95-4CDE-95DD-51AE6D9D97DF}" dt="2021-02-23T15:28:52.487" v="231" actId="1076"/>
+          <ac:spMkLst>
+            <pc:docMk/>
+            <pc:sldMk cId="3269657135" sldId="258"/>
+            <ac:spMk id="28" creationId="{A1F7073E-702C-435F-BB5C-323607E4DDE8}"/>
+          </ac:spMkLst>
+        </pc:spChg>
+        <pc:graphicFrameChg chg="modGraphic">
+          <ac:chgData name="Cosmin Covrig" userId="8dcd05c6-e7ae-4cf1-8843-fa63bee14fde" providerId="ADAL" clId="{5B883DA1-DD95-4CDE-95DD-51AE6D9D97DF}" dt="2021-02-23T15:30:13" v="271" actId="20577"/>
+          <ac:graphicFrameMkLst>
+            <pc:docMk/>
+            <pc:sldMk cId="3269657135" sldId="258"/>
+            <ac:graphicFrameMk id="22" creationId="{DE57F998-0CA3-4E7C-9B3F-D7AC4976DE24}"/>
+          </ac:graphicFrameMkLst>
+        </pc:graphicFrameChg>
+        <pc:cxnChg chg="add mod">
+          <ac:chgData name="Cosmin Covrig" userId="8dcd05c6-e7ae-4cf1-8843-fa63bee14fde" providerId="ADAL" clId="{5B883DA1-DD95-4CDE-95DD-51AE6D9D97DF}" dt="2021-02-25T15:14:49.824" v="1803" actId="14100"/>
+          <ac:cxnSpMkLst>
+            <pc:docMk/>
+            <pc:sldMk cId="3269657135" sldId="258"/>
+            <ac:cxnSpMk id="3" creationId="{A7CB2E88-8743-4A12-92AF-2370F256BB5E}"/>
+          </ac:cxnSpMkLst>
+        </pc:cxnChg>
+      </pc:sldChg>
+      <pc:sldChg chg="addSp delSp modSp del mod">
+        <pc:chgData name="Cosmin Covrig" userId="8dcd05c6-e7ae-4cf1-8843-fa63bee14fde" providerId="ADAL" clId="{5B883DA1-DD95-4CDE-95DD-51AE6D9D97DF}" dt="2021-02-25T15:16:32.208" v="1941" actId="47"/>
+        <pc:sldMkLst>
+          <pc:docMk/>
+          <pc:sldMk cId="333425768" sldId="259"/>
+        </pc:sldMkLst>
+        <pc:spChg chg="add mod">
+          <ac:chgData name="Cosmin Covrig" userId="8dcd05c6-e7ae-4cf1-8843-fa63bee14fde" providerId="ADAL" clId="{5B883DA1-DD95-4CDE-95DD-51AE6D9D97DF}" dt="2021-02-23T15:34:56.820" v="316" actId="14100"/>
+          <ac:spMkLst>
+            <pc:docMk/>
+            <pc:sldMk cId="333425768" sldId="259"/>
+            <ac:spMk id="23" creationId="{39E84D1B-979C-419E-BFDB-2668C5D8AD61}"/>
+          </ac:spMkLst>
+        </pc:spChg>
+        <pc:spChg chg="del mod">
+          <ac:chgData name="Cosmin Covrig" userId="8dcd05c6-e7ae-4cf1-8843-fa63bee14fde" providerId="ADAL" clId="{5B883DA1-DD95-4CDE-95DD-51AE6D9D97DF}" dt="2021-02-23T15:39:33.781" v="377" actId="478"/>
+          <ac:spMkLst>
+            <pc:docMk/>
+            <pc:sldMk cId="333425768" sldId="259"/>
+            <ac:spMk id="25" creationId="{FFC5603C-4EC2-41D5-B8BD-F0FCE8AC5458}"/>
+          </ac:spMkLst>
+        </pc:spChg>
+        <pc:spChg chg="add mod">
+          <ac:chgData name="Cosmin Covrig" userId="8dcd05c6-e7ae-4cf1-8843-fa63bee14fde" providerId="ADAL" clId="{5B883DA1-DD95-4CDE-95DD-51AE6D9D97DF}" dt="2021-02-23T15:35:38.472" v="322" actId="20577"/>
+          <ac:spMkLst>
+            <pc:docMk/>
+            <pc:sldMk cId="333425768" sldId="259"/>
+            <ac:spMk id="28" creationId="{EB68B9D6-5720-4826-9BEC-EC9DB5B2A388}"/>
+          </ac:spMkLst>
+        </pc:spChg>
+        <pc:spChg chg="mod">
+          <ac:chgData name="Cosmin Covrig" userId="8dcd05c6-e7ae-4cf1-8843-fa63bee14fde" providerId="ADAL" clId="{5B883DA1-DD95-4CDE-95DD-51AE6D9D97DF}" dt="2021-02-23T15:37:20.952" v="337" actId="1076"/>
+          <ac:spMkLst>
+            <pc:docMk/>
+            <pc:sldMk cId="333425768" sldId="259"/>
+            <ac:spMk id="30" creationId="{5F809E13-2D41-45BB-905F-88EFB5C7FE72}"/>
+          </ac:spMkLst>
+        </pc:spChg>
+        <pc:spChg chg="mod">
+          <ac:chgData name="Cosmin Covrig" userId="8dcd05c6-e7ae-4cf1-8843-fa63bee14fde" providerId="ADAL" clId="{5B883DA1-DD95-4CDE-95DD-51AE6D9D97DF}" dt="2021-02-23T15:37:57.982" v="345" actId="1076"/>
+          <ac:spMkLst>
+            <pc:docMk/>
+            <pc:sldMk cId="333425768" sldId="259"/>
+            <ac:spMk id="31" creationId="{BEF45A2B-5801-411B-8109-29C4935431D5}"/>
+          </ac:spMkLst>
+        </pc:spChg>
+        <pc:spChg chg="add mod">
+          <ac:chgData name="Cosmin Covrig" userId="8dcd05c6-e7ae-4cf1-8843-fa63bee14fde" providerId="ADAL" clId="{5B883DA1-DD95-4CDE-95DD-51AE6D9D97DF}" dt="2021-02-23T15:39:02.750" v="371" actId="1076"/>
+          <ac:spMkLst>
+            <pc:docMk/>
+            <pc:sldMk cId="333425768" sldId="259"/>
+            <ac:spMk id="35" creationId="{8D8595B6-9168-45AF-BE74-499978608F49}"/>
+          </ac:spMkLst>
+        </pc:spChg>
+        <pc:picChg chg="add del mod">
+          <ac:chgData name="Cosmin Covrig" userId="8dcd05c6-e7ae-4cf1-8843-fa63bee14fde" providerId="ADAL" clId="{5B883DA1-DD95-4CDE-95DD-51AE6D9D97DF}" dt="2021-02-23T15:39:08.455" v="373" actId="478"/>
+          <ac:picMkLst>
+            <pc:docMk/>
+            <pc:sldMk cId="333425768" sldId="259"/>
+            <ac:picMk id="24" creationId="{B55E4A6B-B054-4FD5-9A20-20A4EE1D4539}"/>
+          </ac:picMkLst>
+        </pc:picChg>
+        <pc:picChg chg="add mod">
+          <ac:chgData name="Cosmin Covrig" userId="8dcd05c6-e7ae-4cf1-8843-fa63bee14fde" providerId="ADAL" clId="{5B883DA1-DD95-4CDE-95DD-51AE6D9D97DF}" dt="2021-02-23T15:39:42.292" v="380" actId="1076"/>
+          <ac:picMkLst>
+            <pc:docMk/>
+            <pc:sldMk cId="333425768" sldId="259"/>
+            <ac:picMk id="3074" creationId="{3D336115-E994-47F8-9252-63D00BC4E8FB}"/>
+          </ac:picMkLst>
+        </pc:picChg>
+        <pc:cxnChg chg="add">
+          <ac:chgData name="Cosmin Covrig" userId="8dcd05c6-e7ae-4cf1-8843-fa63bee14fde" providerId="ADAL" clId="{5B883DA1-DD95-4CDE-95DD-51AE6D9D97DF}" dt="2021-02-23T15:33:22.838" v="290" actId="11529"/>
+          <ac:cxnSpMkLst>
+            <pc:docMk/>
+            <pc:sldMk cId="333425768" sldId="259"/>
+            <ac:cxnSpMk id="3" creationId="{421514E2-9BFC-46B8-BB80-A3B40DBF8E45}"/>
+          </ac:cxnSpMkLst>
+        </pc:cxnChg>
+        <pc:cxnChg chg="add mod">
+          <ac:chgData name="Cosmin Covrig" userId="8dcd05c6-e7ae-4cf1-8843-fa63bee14fde" providerId="ADAL" clId="{5B883DA1-DD95-4CDE-95DD-51AE6D9D97DF}" dt="2021-02-23T15:34:34.661" v="300" actId="1076"/>
+          <ac:cxnSpMkLst>
+            <pc:docMk/>
+            <pc:sldMk cId="333425768" sldId="259"/>
+            <ac:cxnSpMk id="27" creationId="{20472A70-509E-4A10-8E69-30CCCD8FC894}"/>
+          </ac:cxnSpMkLst>
+        </pc:cxnChg>
+        <pc:cxnChg chg="add mod">
+          <ac:chgData name="Cosmin Covrig" userId="8dcd05c6-e7ae-4cf1-8843-fa63bee14fde" providerId="ADAL" clId="{5B883DA1-DD95-4CDE-95DD-51AE6D9D97DF}" dt="2021-02-23T15:35:12.924" v="320" actId="1076"/>
+          <ac:cxnSpMkLst>
+            <pc:docMk/>
+            <pc:sldMk cId="333425768" sldId="259"/>
+            <ac:cxnSpMk id="29" creationId="{6B053E72-64F1-4F5F-ACC0-2FDAE8185F19}"/>
+          </ac:cxnSpMkLst>
+        </pc:cxnChg>
+        <pc:cxnChg chg="add mod">
+          <ac:chgData name="Cosmin Covrig" userId="8dcd05c6-e7ae-4cf1-8843-fa63bee14fde" providerId="ADAL" clId="{5B883DA1-DD95-4CDE-95DD-51AE6D9D97DF}" dt="2021-02-23T15:37:17.986" v="336" actId="1076"/>
+          <ac:cxnSpMkLst>
+            <pc:docMk/>
+            <pc:sldMk cId="333425768" sldId="259"/>
+            <ac:cxnSpMk id="32" creationId="{C903200B-975F-4669-8FA8-BAEE42CB4C46}"/>
+          </ac:cxnSpMkLst>
+        </pc:cxnChg>
+        <pc:cxnChg chg="add mod">
+          <ac:chgData name="Cosmin Covrig" userId="8dcd05c6-e7ae-4cf1-8843-fa63bee14fde" providerId="ADAL" clId="{5B883DA1-DD95-4CDE-95DD-51AE6D9D97DF}" dt="2021-02-23T15:38:57.849" v="370" actId="1076"/>
+          <ac:cxnSpMkLst>
+            <pc:docMk/>
+            <pc:sldMk cId="333425768" sldId="259"/>
+            <ac:cxnSpMk id="33" creationId="{3E041508-8188-428D-B7C3-74E48D132B06}"/>
+          </ac:cxnSpMkLst>
+        </pc:cxnChg>
+        <pc:cxnChg chg="add del mod">
+          <ac:chgData name="Cosmin Covrig" userId="8dcd05c6-e7ae-4cf1-8843-fa63bee14fde" providerId="ADAL" clId="{5B883DA1-DD95-4CDE-95DD-51AE6D9D97DF}" dt="2021-02-23T15:38:00.349" v="346" actId="478"/>
+          <ac:cxnSpMkLst>
+            <pc:docMk/>
+            <pc:sldMk cId="333425768" sldId="259"/>
+            <ac:cxnSpMk id="34" creationId="{F48287DE-601B-407C-B264-960AA84371CD}"/>
+          </ac:cxnSpMkLst>
+        </pc:cxnChg>
+        <pc:cxnChg chg="add mod">
+          <ac:chgData name="Cosmin Covrig" userId="8dcd05c6-e7ae-4cf1-8843-fa63bee14fde" providerId="ADAL" clId="{5B883DA1-DD95-4CDE-95DD-51AE6D9D97DF}" dt="2021-02-23T15:39:05.811" v="372" actId="1076"/>
+          <ac:cxnSpMkLst>
+            <pc:docMk/>
+            <pc:sldMk cId="333425768" sldId="259"/>
+            <ac:cxnSpMk id="36" creationId="{6A8E7B63-A7E8-4333-BE03-5712DFB50650}"/>
+          </ac:cxnSpMkLst>
+        </pc:cxnChg>
+      </pc:sldChg>
+      <pc:sldChg chg="modSp mod">
+        <pc:chgData name="Cosmin Covrig" userId="8dcd05c6-e7ae-4cf1-8843-fa63bee14fde" providerId="ADAL" clId="{5B883DA1-DD95-4CDE-95DD-51AE6D9D97DF}" dt="2021-02-23T15:45:17.293" v="537" actId="20577"/>
+        <pc:sldMkLst>
+          <pc:docMk/>
+          <pc:sldMk cId="993698962" sldId="260"/>
+        </pc:sldMkLst>
+        <pc:graphicFrameChg chg="modGraphic">
+          <ac:chgData name="Cosmin Covrig" userId="8dcd05c6-e7ae-4cf1-8843-fa63bee14fde" providerId="ADAL" clId="{5B883DA1-DD95-4CDE-95DD-51AE6D9D97DF}" dt="2021-02-23T15:45:17.293" v="537" actId="20577"/>
+          <ac:graphicFrameMkLst>
+            <pc:docMk/>
+            <pc:sldMk cId="993698962" sldId="260"/>
+            <ac:graphicFrameMk id="16" creationId="{A0796847-9761-460A-A648-1AF901ED793F}"/>
+          </ac:graphicFrameMkLst>
+        </pc:graphicFrameChg>
+      </pc:sldChg>
+      <pc:sldChg chg="addSp delSp modSp mod addCm delCm">
+        <pc:chgData name="Cosmin Covrig" userId="8dcd05c6-e7ae-4cf1-8843-fa63bee14fde" providerId="ADAL" clId="{5B883DA1-DD95-4CDE-95DD-51AE6D9D97DF}" dt="2021-02-25T15:21:43.976" v="2140" actId="1076"/>
+        <pc:sldMkLst>
+          <pc:docMk/>
+          <pc:sldMk cId="1589364513" sldId="261"/>
+        </pc:sldMkLst>
+        <pc:spChg chg="mod">
+          <ac:chgData name="Cosmin Covrig" userId="8dcd05c6-e7ae-4cf1-8843-fa63bee14fde" providerId="ADAL" clId="{5B883DA1-DD95-4CDE-95DD-51AE6D9D97DF}" dt="2021-02-25T15:21:42.300" v="2139" actId="1076"/>
+          <ac:spMkLst>
+            <pc:docMk/>
+            <pc:sldMk cId="1589364513" sldId="261"/>
+            <ac:spMk id="15" creationId="{996901F8-D239-4FBE-BE12-BDF531202516}"/>
+          </ac:spMkLst>
+        </pc:spChg>
+        <pc:spChg chg="add mod">
+          <ac:chgData name="Cosmin Covrig" userId="8dcd05c6-e7ae-4cf1-8843-fa63bee14fde" providerId="ADAL" clId="{5B883DA1-DD95-4CDE-95DD-51AE6D9D97DF}" dt="2021-02-25T15:20:38.213" v="2067" actId="20577"/>
+          <ac:spMkLst>
+            <pc:docMk/>
+            <pc:sldMk cId="1589364513" sldId="261"/>
+            <ac:spMk id="17" creationId="{458AAD0D-FF1A-4FAA-8675-3C98E84EBA78}"/>
+          </ac:spMkLst>
+        </pc:spChg>
+        <pc:spChg chg="add mod">
+          <ac:chgData name="Cosmin Covrig" userId="8dcd05c6-e7ae-4cf1-8843-fa63bee14fde" providerId="ADAL" clId="{5B883DA1-DD95-4CDE-95DD-51AE6D9D97DF}" dt="2021-02-25T15:21:08.148" v="2108" actId="1076"/>
+          <ac:spMkLst>
+            <pc:docMk/>
+            <pc:sldMk cId="1589364513" sldId="261"/>
+            <ac:spMk id="21" creationId="{19F8C2F7-A96A-4235-9614-141D5E28E019}"/>
+          </ac:spMkLst>
+        </pc:spChg>
+        <pc:spChg chg="add mod">
+          <ac:chgData name="Cosmin Covrig" userId="8dcd05c6-e7ae-4cf1-8843-fa63bee14fde" providerId="ADAL" clId="{5B883DA1-DD95-4CDE-95DD-51AE6D9D97DF}" dt="2021-02-25T15:21:43.976" v="2140" actId="1076"/>
+          <ac:spMkLst>
+            <pc:docMk/>
+            <pc:sldMk cId="1589364513" sldId="261"/>
+            <ac:spMk id="24" creationId="{8B8F65C5-B19E-4063-B83C-C4E97229C42A}"/>
+          </ac:spMkLst>
+        </pc:spChg>
+        <pc:spChg chg="add mod">
+          <ac:chgData name="Cosmin Covrig" userId="8dcd05c6-e7ae-4cf1-8843-fa63bee14fde" providerId="ADAL" clId="{5B883DA1-DD95-4CDE-95DD-51AE6D9D97DF}" dt="2021-02-23T16:04:02.705" v="589" actId="1076"/>
+          <ac:spMkLst>
+            <pc:docMk/>
+            <pc:sldMk cId="1589364513" sldId="261"/>
+            <ac:spMk id="42" creationId="{8A8CE5DA-B8ED-477A-A1A3-8D22C7A3A270}"/>
+          </ac:spMkLst>
+        </pc:spChg>
+        <pc:spChg chg="add mod">
+          <ac:chgData name="Cosmin Covrig" userId="8dcd05c6-e7ae-4cf1-8843-fa63bee14fde" providerId="ADAL" clId="{5B883DA1-DD95-4CDE-95DD-51AE6D9D97DF}" dt="2021-02-23T16:03:50.813" v="576" actId="20577"/>
+          <ac:spMkLst>
+            <pc:docMk/>
+            <pc:sldMk cId="1589364513" sldId="261"/>
+            <ac:spMk id="44" creationId="{AE918D52-B0D3-43ED-975B-4AC8453E543A}"/>
+          </ac:spMkLst>
+        </pc:spChg>
+        <pc:spChg chg="add del mod">
+          <ac:chgData name="Cosmin Covrig" userId="8dcd05c6-e7ae-4cf1-8843-fa63bee14fde" providerId="ADAL" clId="{5B883DA1-DD95-4CDE-95DD-51AE6D9D97DF}" dt="2021-02-23T16:03:59.900" v="582"/>
+          <ac:spMkLst>
+            <pc:docMk/>
+            <pc:sldMk cId="1589364513" sldId="261"/>
+            <ac:spMk id="46" creationId="{19086F5B-698B-4A85-9760-45C5327EDC0D}"/>
+          </ac:spMkLst>
+        </pc:spChg>
+        <pc:spChg chg="add del mod">
+          <ac:chgData name="Cosmin Covrig" userId="8dcd05c6-e7ae-4cf1-8843-fa63bee14fde" providerId="ADAL" clId="{5B883DA1-DD95-4CDE-95DD-51AE6D9D97DF}" dt="2021-02-23T16:03:59.901" v="584"/>
+          <ac:spMkLst>
+            <pc:docMk/>
+            <pc:sldMk cId="1589364513" sldId="261"/>
+            <ac:spMk id="48" creationId="{C49D5298-CDEA-4863-B700-D153BA18D837}"/>
+          </ac:spMkLst>
+        </pc:spChg>
+        <pc:spChg chg="add del mod">
+          <ac:chgData name="Cosmin Covrig" userId="8dcd05c6-e7ae-4cf1-8843-fa63bee14fde" providerId="ADAL" clId="{5B883DA1-DD95-4CDE-95DD-51AE6D9D97DF}" dt="2021-02-23T16:03:59.901" v="586"/>
+          <ac:spMkLst>
+            <pc:docMk/>
+            <pc:sldMk cId="1589364513" sldId="261"/>
+            <ac:spMk id="49" creationId="{77A0A206-6593-4080-89B2-1BA4FB6F22FB}"/>
+          </ac:spMkLst>
+        </pc:spChg>
+        <pc:spChg chg="add del mod">
+          <ac:chgData name="Cosmin Covrig" userId="8dcd05c6-e7ae-4cf1-8843-fa63bee14fde" providerId="ADAL" clId="{5B883DA1-DD95-4CDE-95DD-51AE6D9D97DF}" dt="2021-02-23T16:03:59.902" v="588"/>
+          <ac:spMkLst>
+            <pc:docMk/>
+            <pc:sldMk cId="1589364513" sldId="261"/>
+            <ac:spMk id="52" creationId="{AB64E590-2961-4A24-A65E-C8FFBA267870}"/>
+          </ac:spMkLst>
+        </pc:spChg>
+        <pc:spChg chg="add del mod">
+          <ac:chgData name="Cosmin Covrig" userId="8dcd05c6-e7ae-4cf1-8843-fa63bee14fde" providerId="ADAL" clId="{5B883DA1-DD95-4CDE-95DD-51AE6D9D97DF}" dt="2021-02-23T16:04:06.653" v="591"/>
+          <ac:spMkLst>
+            <pc:docMk/>
+            <pc:sldMk cId="1589364513" sldId="261"/>
+            <ac:spMk id="54" creationId="{9FAF060E-0A3F-4FF2-AAF9-C23EB69B165B}"/>
+          </ac:spMkLst>
+        </pc:spChg>
+        <pc:spChg chg="add del mod">
+          <ac:chgData name="Cosmin Covrig" userId="8dcd05c6-e7ae-4cf1-8843-fa63bee14fde" providerId="ADAL" clId="{5B883DA1-DD95-4CDE-95DD-51AE6D9D97DF}" dt="2021-02-23T16:04:06.653" v="591"/>
+          <ac:spMkLst>
+            <pc:docMk/>
+            <pc:sldMk cId="1589364513" sldId="261"/>
+            <ac:spMk id="56" creationId="{64640B80-B86E-48F0-A863-6A9D463C8048}"/>
+          </ac:spMkLst>
+        </pc:spChg>
+        <pc:spChg chg="add del mod">
+          <ac:chgData name="Cosmin Covrig" userId="8dcd05c6-e7ae-4cf1-8843-fa63bee14fde" providerId="ADAL" clId="{5B883DA1-DD95-4CDE-95DD-51AE6D9D97DF}" dt="2021-02-23T16:04:06.653" v="591"/>
+          <ac:spMkLst>
+            <pc:docMk/>
+            <pc:sldMk cId="1589364513" sldId="261"/>
+            <ac:spMk id="58" creationId="{032590F7-413B-4D1E-B955-B84B56BA81B7}"/>
+          </ac:spMkLst>
+        </pc:spChg>
+        <pc:spChg chg="add del mod">
+          <ac:chgData name="Cosmin Covrig" userId="8dcd05c6-e7ae-4cf1-8843-fa63bee14fde" providerId="ADAL" clId="{5B883DA1-DD95-4CDE-95DD-51AE6D9D97DF}" dt="2021-02-23T16:04:06.653" v="591"/>
+          <ac:spMkLst>
+            <pc:docMk/>
+            <pc:sldMk cId="1589364513" sldId="261"/>
+            <ac:spMk id="60" creationId="{156BC95B-0DCF-49A7-81DC-9A7569EE7D1F}"/>
+          </ac:spMkLst>
+        </pc:spChg>
+        <pc:spChg chg="add del mod">
+          <ac:chgData name="Cosmin Covrig" userId="8dcd05c6-e7ae-4cf1-8843-fa63bee14fde" providerId="ADAL" clId="{5B883DA1-DD95-4CDE-95DD-51AE6D9D97DF}" dt="2021-02-23T16:04:06.653" v="591"/>
+          <ac:spMkLst>
+            <pc:docMk/>
+            <pc:sldMk cId="1589364513" sldId="261"/>
+            <ac:spMk id="61" creationId="{66D116B3-0B0D-400C-A968-38EAC961B23D}"/>
+          </ac:spMkLst>
+        </pc:spChg>
+        <pc:spChg chg="add del mod">
+          <ac:chgData name="Cosmin Covrig" userId="8dcd05c6-e7ae-4cf1-8843-fa63bee14fde" providerId="ADAL" clId="{5B883DA1-DD95-4CDE-95DD-51AE6D9D97DF}" dt="2021-02-23T16:04:06.653" v="591"/>
+          <ac:spMkLst>
+            <pc:docMk/>
+            <pc:sldMk cId="1589364513" sldId="261"/>
+            <ac:spMk id="64" creationId="{F64AD235-78AF-4470-B75A-D29530BEDC3C}"/>
+          </ac:spMkLst>
+        </pc:spChg>
+        <pc:spChg chg="add mod">
+          <ac:chgData name="Cosmin Covrig" userId="8dcd05c6-e7ae-4cf1-8843-fa63bee14fde" providerId="ADAL" clId="{5B883DA1-DD95-4CDE-95DD-51AE6D9D97DF}" dt="2021-02-23T16:04:25.926" v="599" actId="1076"/>
+          <ac:spMkLst>
+            <pc:docMk/>
+            <pc:sldMk cId="1589364513" sldId="261"/>
+            <ac:spMk id="66" creationId="{256824D0-4756-4F02-9C23-02371629FAB9}"/>
+          </ac:spMkLst>
+        </pc:spChg>
+        <pc:spChg chg="add mod">
+          <ac:chgData name="Cosmin Covrig" userId="8dcd05c6-e7ae-4cf1-8843-fa63bee14fde" providerId="ADAL" clId="{5B883DA1-DD95-4CDE-95DD-51AE6D9D97DF}" dt="2021-02-23T16:04:47.404" v="625" actId="20577"/>
+          <ac:spMkLst>
+            <pc:docMk/>
+            <pc:sldMk cId="1589364513" sldId="261"/>
+            <ac:spMk id="67" creationId="{301EE115-C734-4336-AFD2-E8D23D95071A}"/>
+          </ac:spMkLst>
+        </pc:spChg>
+        <pc:grpChg chg="mod">
+          <ac:chgData name="Cosmin Covrig" userId="8dcd05c6-e7ae-4cf1-8843-fa63bee14fde" providerId="ADAL" clId="{5B883DA1-DD95-4CDE-95DD-51AE6D9D97DF}" dt="2021-02-24T16:03:15.316" v="907" actId="1076"/>
+          <ac:grpSpMkLst>
+            <pc:docMk/>
+            <pc:sldMk cId="1589364513" sldId="261"/>
+            <ac:grpSpMk id="36" creationId="{6CA90000-77E0-4CAE-9225-FFB09472E6F5}"/>
+          </ac:grpSpMkLst>
+        </pc:grpChg>
+        <pc:graphicFrameChg chg="mod modGraphic">
+          <ac:chgData name="Cosmin Covrig" userId="8dcd05c6-e7ae-4cf1-8843-fa63bee14fde" providerId="ADAL" clId="{5B883DA1-DD95-4CDE-95DD-51AE6D9D97DF}" dt="2021-02-23T16:03:04.762" v="546"/>
+          <ac:graphicFrameMkLst>
+            <pc:docMk/>
+            <pc:sldMk cId="1589364513" sldId="261"/>
+            <ac:graphicFrameMk id="19" creationId="{41726E5D-D642-41C1-B509-5C2FB2519AD5}"/>
+          </ac:graphicFrameMkLst>
+        </pc:graphicFrameChg>
+        <pc:cxnChg chg="add">
+          <ac:chgData name="Cosmin Covrig" userId="8dcd05c6-e7ae-4cf1-8843-fa63bee14fde" providerId="ADAL" clId="{5B883DA1-DD95-4CDE-95DD-51AE6D9D97DF}" dt="2021-02-25T15:19:43.445" v="1993" actId="11529"/>
+          <ac:cxnSpMkLst>
+            <pc:docMk/>
+            <pc:sldMk cId="1589364513" sldId="261"/>
+            <ac:cxnSpMk id="3" creationId="{07D92036-193E-4816-B080-190908CB3B0C}"/>
+          </ac:cxnSpMkLst>
+        </pc:cxnChg>
+        <pc:cxnChg chg="add mod">
+          <ac:chgData name="Cosmin Covrig" userId="8dcd05c6-e7ae-4cf1-8843-fa63bee14fde" providerId="ADAL" clId="{5B883DA1-DD95-4CDE-95DD-51AE6D9D97DF}" dt="2021-02-25T15:20:50.236" v="2072" actId="14100"/>
+          <ac:cxnSpMkLst>
+            <pc:docMk/>
+            <pc:sldMk cId="1589364513" sldId="261"/>
+            <ac:cxnSpMk id="32" creationId="{328F02B4-924A-4BFA-9A87-73D7F29887A9}"/>
+          </ac:cxnSpMkLst>
+        </pc:cxnChg>
+        <pc:cxnChg chg="add mod">
+          <ac:chgData name="Cosmin Covrig" userId="8dcd05c6-e7ae-4cf1-8843-fa63bee14fde" providerId="ADAL" clId="{5B883DA1-DD95-4CDE-95DD-51AE6D9D97DF}" dt="2021-02-25T15:21:28.538" v="2114" actId="1076"/>
+          <ac:cxnSpMkLst>
+            <pc:docMk/>
+            <pc:sldMk cId="1589364513" sldId="261"/>
+            <ac:cxnSpMk id="37" creationId="{3C9362EB-4C0D-40E7-AA29-FCBED076BC2C}"/>
+          </ac:cxnSpMkLst>
+        </pc:cxnChg>
+        <pc:cxnChg chg="add mod">
+          <ac:chgData name="Cosmin Covrig" userId="8dcd05c6-e7ae-4cf1-8843-fa63bee14fde" providerId="ADAL" clId="{5B883DA1-DD95-4CDE-95DD-51AE6D9D97DF}" dt="2021-02-23T16:03:31.608" v="548" actId="1076"/>
+          <ac:cxnSpMkLst>
+            <pc:docMk/>
+            <pc:sldMk cId="1589364513" sldId="261"/>
+            <ac:cxnSpMk id="43" creationId="{D75AD146-6FA3-4C9F-8923-982A9D45E7F0}"/>
+          </ac:cxnSpMkLst>
+        </pc:cxnChg>
+        <pc:cxnChg chg="add mod">
+          <ac:chgData name="Cosmin Covrig" userId="8dcd05c6-e7ae-4cf1-8843-fa63bee14fde" providerId="ADAL" clId="{5B883DA1-DD95-4CDE-95DD-51AE6D9D97DF}" dt="2021-02-23T16:03:31.608" v="548" actId="1076"/>
+          <ac:cxnSpMkLst>
+            <pc:docMk/>
+            <pc:sldMk cId="1589364513" sldId="261"/>
+            <ac:cxnSpMk id="45" creationId="{391543EA-460E-4EA3-BA80-F6225A6C1593}"/>
+          </ac:cxnSpMkLst>
+        </pc:cxnChg>
+        <pc:cxnChg chg="add mod">
+          <ac:chgData name="Cosmin Covrig" userId="8dcd05c6-e7ae-4cf1-8843-fa63bee14fde" providerId="ADAL" clId="{5B883DA1-DD95-4CDE-95DD-51AE6D9D97DF}" dt="2021-02-23T16:03:31.608" v="548" actId="1076"/>
+          <ac:cxnSpMkLst>
+            <pc:docMk/>
+            <pc:sldMk cId="1589364513" sldId="261"/>
+            <ac:cxnSpMk id="47" creationId="{000C9A60-38C2-4494-98E5-35A87C0A5E02}"/>
+          </ac:cxnSpMkLst>
+        </pc:cxnChg>
+        <pc:cxnChg chg="add mod">
+          <ac:chgData name="Cosmin Covrig" userId="8dcd05c6-e7ae-4cf1-8843-fa63bee14fde" providerId="ADAL" clId="{5B883DA1-DD95-4CDE-95DD-51AE6D9D97DF}" dt="2021-02-23T16:03:31.608" v="548" actId="1076"/>
+          <ac:cxnSpMkLst>
+            <pc:docMk/>
+            <pc:sldMk cId="1589364513" sldId="261"/>
+            <ac:cxnSpMk id="50" creationId="{384AC024-BE20-44B9-85B2-DFA3D272CA6D}"/>
+          </ac:cxnSpMkLst>
+        </pc:cxnChg>
+        <pc:cxnChg chg="add mod">
+          <ac:chgData name="Cosmin Covrig" userId="8dcd05c6-e7ae-4cf1-8843-fa63bee14fde" providerId="ADAL" clId="{5B883DA1-DD95-4CDE-95DD-51AE6D9D97DF}" dt="2021-02-23T16:03:31.608" v="548" actId="1076"/>
+          <ac:cxnSpMkLst>
+            <pc:docMk/>
+            <pc:sldMk cId="1589364513" sldId="261"/>
+            <ac:cxnSpMk id="51" creationId="{1DB7AF3D-1843-449C-8EC4-C37BA6C0644D}"/>
+          </ac:cxnSpMkLst>
+        </pc:cxnChg>
+        <pc:cxnChg chg="add mod">
+          <ac:chgData name="Cosmin Covrig" userId="8dcd05c6-e7ae-4cf1-8843-fa63bee14fde" providerId="ADAL" clId="{5B883DA1-DD95-4CDE-95DD-51AE6D9D97DF}" dt="2021-02-23T16:05:36.990" v="627" actId="1076"/>
+          <ac:cxnSpMkLst>
+            <pc:docMk/>
+            <pc:sldMk cId="1589364513" sldId="261"/>
+            <ac:cxnSpMk id="53" creationId="{83C788E5-8096-4B8A-AE1F-B299DB9A5AEA}"/>
+          </ac:cxnSpMkLst>
+        </pc:cxnChg>
+        <pc:cxnChg chg="add del mod">
+          <ac:chgData name="Cosmin Covrig" userId="8dcd05c6-e7ae-4cf1-8843-fa63bee14fde" providerId="ADAL" clId="{5B883DA1-DD95-4CDE-95DD-51AE6D9D97DF}" dt="2021-02-23T16:04:06.653" v="591"/>
+          <ac:cxnSpMkLst>
+            <pc:docMk/>
+            <pc:sldMk cId="1589364513" sldId="261"/>
+            <ac:cxnSpMk id="55" creationId="{6845A2A6-E678-4F3D-AFBD-5B9446B7460B}"/>
+          </ac:cxnSpMkLst>
+        </pc:cxnChg>
+        <pc:cxnChg chg="add del mod">
+          <ac:chgData name="Cosmin Covrig" userId="8dcd05c6-e7ae-4cf1-8843-fa63bee14fde" providerId="ADAL" clId="{5B883DA1-DD95-4CDE-95DD-51AE6D9D97DF}" dt="2021-02-23T16:04:06.653" v="591"/>
+          <ac:cxnSpMkLst>
+            <pc:docMk/>
+            <pc:sldMk cId="1589364513" sldId="261"/>
+            <ac:cxnSpMk id="57" creationId="{AE3DFF05-37BB-4D1D-9F27-E60EBA5C6CB8}"/>
+          </ac:cxnSpMkLst>
+        </pc:cxnChg>
+        <pc:cxnChg chg="add del mod">
+          <ac:chgData name="Cosmin Covrig" userId="8dcd05c6-e7ae-4cf1-8843-fa63bee14fde" providerId="ADAL" clId="{5B883DA1-DD95-4CDE-95DD-51AE6D9D97DF}" dt="2021-02-23T16:04:06.653" v="591"/>
+          <ac:cxnSpMkLst>
+            <pc:docMk/>
+            <pc:sldMk cId="1589364513" sldId="261"/>
+            <ac:cxnSpMk id="59" creationId="{E7BCA47A-D9CF-4796-874F-7AE3F3DB1074}"/>
+          </ac:cxnSpMkLst>
+        </pc:cxnChg>
+        <pc:cxnChg chg="add del mod">
+          <ac:chgData name="Cosmin Covrig" userId="8dcd05c6-e7ae-4cf1-8843-fa63bee14fde" providerId="ADAL" clId="{5B883DA1-DD95-4CDE-95DD-51AE6D9D97DF}" dt="2021-02-23T16:04:06.653" v="591"/>
+          <ac:cxnSpMkLst>
+            <pc:docMk/>
+            <pc:sldMk cId="1589364513" sldId="261"/>
+            <ac:cxnSpMk id="62" creationId="{91930BE5-FAA3-4F4B-BE8B-04623F7026D8}"/>
+          </ac:cxnSpMkLst>
+        </pc:cxnChg>
+        <pc:cxnChg chg="add del mod">
+          <ac:chgData name="Cosmin Covrig" userId="8dcd05c6-e7ae-4cf1-8843-fa63bee14fde" providerId="ADAL" clId="{5B883DA1-DD95-4CDE-95DD-51AE6D9D97DF}" dt="2021-02-23T16:04:06.653" v="591"/>
+          <ac:cxnSpMkLst>
+            <pc:docMk/>
+            <pc:sldMk cId="1589364513" sldId="261"/>
+            <ac:cxnSpMk id="63" creationId="{03D851AE-DC78-4690-B170-F85D5327288F}"/>
+          </ac:cxnSpMkLst>
+        </pc:cxnChg>
+        <pc:cxnChg chg="add del mod">
+          <ac:chgData name="Cosmin Covrig" userId="8dcd05c6-e7ae-4cf1-8843-fa63bee14fde" providerId="ADAL" clId="{5B883DA1-DD95-4CDE-95DD-51AE6D9D97DF}" dt="2021-02-23T16:04:06.653" v="591"/>
+          <ac:cxnSpMkLst>
+            <pc:docMk/>
+            <pc:sldMk cId="1589364513" sldId="261"/>
+            <ac:cxnSpMk id="65" creationId="{55E91DB4-658D-45A2-A646-8AEE0B2BDC70}"/>
+          </ac:cxnSpMkLst>
+        </pc:cxnChg>
+      </pc:sldChg>
+      <pc:sldChg chg="addSp delSp modSp mod">
+        <pc:chgData name="Cosmin Covrig" userId="8dcd05c6-e7ae-4cf1-8843-fa63bee14fde" providerId="ADAL" clId="{5B883DA1-DD95-4CDE-95DD-51AE6D9D97DF}" dt="2021-02-24T15:19:08.109" v="676" actId="20577"/>
+        <pc:sldMkLst>
+          <pc:docMk/>
+          <pc:sldMk cId="394540411" sldId="262"/>
+        </pc:sldMkLst>
+        <pc:spChg chg="mod">
+          <ac:chgData name="Cosmin Covrig" userId="8dcd05c6-e7ae-4cf1-8843-fa63bee14fde" providerId="ADAL" clId="{5B883DA1-DD95-4CDE-95DD-51AE6D9D97DF}" dt="2021-02-24T15:16:52.536" v="655" actId="1076"/>
+          <ac:spMkLst>
+            <pc:docMk/>
+            <pc:sldMk cId="394540411" sldId="262"/>
+            <ac:spMk id="2" creationId="{8F7B72DB-088E-47AC-8C43-CBFE2A376B4F}"/>
+          </ac:spMkLst>
+        </pc:spChg>
+        <pc:spChg chg="del">
+          <ac:chgData name="Cosmin Covrig" userId="8dcd05c6-e7ae-4cf1-8843-fa63bee14fde" providerId="ADAL" clId="{5B883DA1-DD95-4CDE-95DD-51AE6D9D97DF}" dt="2021-02-24T15:12:40.876" v="628" actId="478"/>
+          <ac:spMkLst>
+            <pc:docMk/>
+            <pc:sldMk cId="394540411" sldId="262"/>
+            <ac:spMk id="3" creationId="{9430DC0F-5202-4925-85CA-CFB36A6F1941}"/>
+          </ac:spMkLst>
+        </pc:spChg>
+        <pc:spChg chg="mod">
+          <ac:chgData name="Cosmin Covrig" userId="8dcd05c6-e7ae-4cf1-8843-fa63bee14fde" providerId="ADAL" clId="{5B883DA1-DD95-4CDE-95DD-51AE6D9D97DF}" dt="2021-02-24T15:19:04.261" v="675" actId="20577"/>
+          <ac:spMkLst>
+            <pc:docMk/>
+            <pc:sldMk cId="394540411" sldId="262"/>
+            <ac:spMk id="4" creationId="{94955620-8AF1-4E36-A0FC-6CFA5A593F4F}"/>
+          </ac:spMkLst>
+        </pc:spChg>
+        <pc:spChg chg="mod">
+          <ac:chgData name="Cosmin Covrig" userId="8dcd05c6-e7ae-4cf1-8843-fa63bee14fde" providerId="ADAL" clId="{5B883DA1-DD95-4CDE-95DD-51AE6D9D97DF}" dt="2021-02-24T15:19:08.109" v="676" actId="20577"/>
+          <ac:spMkLst>
+            <pc:docMk/>
+            <pc:sldMk cId="394540411" sldId="262"/>
+            <ac:spMk id="6" creationId="{D4CE9785-FFE6-4446-B083-C47205E26F93}"/>
+          </ac:spMkLst>
+        </pc:spChg>
+        <pc:spChg chg="add mod">
+          <ac:chgData name="Cosmin Covrig" userId="8dcd05c6-e7ae-4cf1-8843-fa63bee14fde" providerId="ADAL" clId="{5B883DA1-DD95-4CDE-95DD-51AE6D9D97DF}" dt="2021-02-24T15:18:27.049" v="670" actId="1076"/>
+          <ac:spMkLst>
+            <pc:docMk/>
+            <pc:sldMk cId="394540411" sldId="262"/>
+            <ac:spMk id="10" creationId="{D02894A9-78A9-45D5-8D28-C5E990170819}"/>
+          </ac:spMkLst>
+        </pc:spChg>
+      </pc:sldChg>
+      <pc:sldChg chg="addSp delSp modSp mod">
+        <pc:chgData name="Cosmin Covrig" userId="8dcd05c6-e7ae-4cf1-8843-fa63bee14fde" providerId="ADAL" clId="{5B883DA1-DD95-4CDE-95DD-51AE6D9D97DF}" dt="2021-02-25T15:25:34.337" v="2142" actId="1076"/>
+        <pc:sldMkLst>
+          <pc:docMk/>
+          <pc:sldMk cId="1786802942" sldId="263"/>
+        </pc:sldMkLst>
+        <pc:spChg chg="mod">
+          <ac:chgData name="Cosmin Covrig" userId="8dcd05c6-e7ae-4cf1-8843-fa63bee14fde" providerId="ADAL" clId="{5B883DA1-DD95-4CDE-95DD-51AE6D9D97DF}" dt="2021-02-24T15:27:06.193" v="703" actId="20577"/>
+          <ac:spMkLst>
+            <pc:docMk/>
+            <pc:sldMk cId="1786802942" sldId="263"/>
+            <ac:spMk id="13" creationId="{1F69C2E9-5E22-4E69-A9FB-E9A9469E889A}"/>
+          </ac:spMkLst>
+        </pc:spChg>
+        <pc:spChg chg="add mod">
+          <ac:chgData name="Cosmin Covrig" userId="8dcd05c6-e7ae-4cf1-8843-fa63bee14fde" providerId="ADAL" clId="{5B883DA1-DD95-4CDE-95DD-51AE6D9D97DF}" dt="2021-02-25T15:25:34.337" v="2142" actId="1076"/>
+          <ac:spMkLst>
+            <pc:docMk/>
+            <pc:sldMk cId="1786802942" sldId="263"/>
+            <ac:spMk id="17" creationId="{0577128B-D284-4480-A772-46B30EB6E073}"/>
+          </ac:spMkLst>
+        </pc:spChg>
+        <pc:picChg chg="add del mod">
+          <ac:chgData name="Cosmin Covrig" userId="8dcd05c6-e7ae-4cf1-8843-fa63bee14fde" providerId="ADAL" clId="{5B883DA1-DD95-4CDE-95DD-51AE6D9D97DF}" dt="2021-02-24T15:56:17.746" v="771" actId="21"/>
+          <ac:picMkLst>
+            <pc:docMk/>
+            <pc:sldMk cId="1786802942" sldId="263"/>
+            <ac:picMk id="24" creationId="{2E53868D-9D10-49C6-B12A-72F0685FCD51}"/>
+          </ac:picMkLst>
+        </pc:picChg>
+      </pc:sldChg>
+      <pc:sldChg chg="addSp modSp mod ord">
+        <pc:chgData name="Cosmin Covrig" userId="8dcd05c6-e7ae-4cf1-8843-fa63bee14fde" providerId="ADAL" clId="{5B883DA1-DD95-4CDE-95DD-51AE6D9D97DF}" dt="2021-02-25T15:18:12.551" v="1992" actId="1076"/>
+        <pc:sldMkLst>
+          <pc:docMk/>
+          <pc:sldMk cId="3014927007" sldId="265"/>
+        </pc:sldMkLst>
+        <pc:spChg chg="mod">
+          <ac:chgData name="Cosmin Covrig" userId="8dcd05c6-e7ae-4cf1-8843-fa63bee14fde" providerId="ADAL" clId="{5B883DA1-DD95-4CDE-95DD-51AE6D9D97DF}" dt="2021-02-24T15:52:13.980" v="717" actId="20577"/>
+          <ac:spMkLst>
+            <pc:docMk/>
+            <pc:sldMk cId="3014927007" sldId="265"/>
+            <ac:spMk id="6" creationId="{DB47EDD5-893F-46D8-A3F8-85A9340714AD}"/>
+          </ac:spMkLst>
+        </pc:spChg>
+        <pc:spChg chg="mod">
+          <ac:chgData name="Cosmin Covrig" userId="8dcd05c6-e7ae-4cf1-8843-fa63bee14fde" providerId="ADAL" clId="{5B883DA1-DD95-4CDE-95DD-51AE6D9D97DF}" dt="2021-02-24T15:54:44.057" v="747" actId="20577"/>
+          <ac:spMkLst>
+            <pc:docMk/>
+            <pc:sldMk cId="3014927007" sldId="265"/>
+            <ac:spMk id="11" creationId="{AF6401E5-CC2A-483D-B1B3-7780B52F87C5}"/>
+          </ac:spMkLst>
+        </pc:spChg>
+        <pc:spChg chg="mod">
+          <ac:chgData name="Cosmin Covrig" userId="8dcd05c6-e7ae-4cf1-8843-fa63bee14fde" providerId="ADAL" clId="{5B883DA1-DD95-4CDE-95DD-51AE6D9D97DF}" dt="2021-02-25T15:16:52.152" v="1944" actId="1076"/>
+          <ac:spMkLst>
+            <pc:docMk/>
+            <pc:sldMk cId="3014927007" sldId="265"/>
+            <ac:spMk id="14" creationId="{448B21C1-E950-4667-9EF5-AABA97E9CD03}"/>
+          </ac:spMkLst>
+        </pc:spChg>
+        <pc:spChg chg="mod">
+          <ac:chgData name="Cosmin Covrig" userId="8dcd05c6-e7ae-4cf1-8843-fa63bee14fde" providerId="ADAL" clId="{5B883DA1-DD95-4CDE-95DD-51AE6D9D97DF}" dt="2021-02-24T15:55:23.147" v="760" actId="20577"/>
+          <ac:spMkLst>
+            <pc:docMk/>
+            <pc:sldMk cId="3014927007" sldId="265"/>
+            <ac:spMk id="25" creationId="{2DFD8665-C45E-4B46-95D6-F7A4EA50B05E}"/>
+          </ac:spMkLst>
+        </pc:spChg>
+        <pc:spChg chg="add mod">
+          <ac:chgData name="Cosmin Covrig" userId="8dcd05c6-e7ae-4cf1-8843-fa63bee14fde" providerId="ADAL" clId="{5B883DA1-DD95-4CDE-95DD-51AE6D9D97DF}" dt="2021-02-25T15:18:12.551" v="1992" actId="1076"/>
+          <ac:spMkLst>
+            <pc:docMk/>
+            <pc:sldMk cId="3014927007" sldId="265"/>
+            <ac:spMk id="28" creationId="{BF74927B-E42D-4492-8997-E8861B952E42}"/>
+          </ac:spMkLst>
+        </pc:spChg>
+        <pc:cxnChg chg="add">
+          <ac:chgData name="Cosmin Covrig" userId="8dcd05c6-e7ae-4cf1-8843-fa63bee14fde" providerId="ADAL" clId="{5B883DA1-DD95-4CDE-95DD-51AE6D9D97DF}" dt="2021-02-25T15:17:05.980" v="1945" actId="11529"/>
+          <ac:cxnSpMkLst>
+            <pc:docMk/>
+            <pc:sldMk cId="3014927007" sldId="265"/>
+            <ac:cxnSpMk id="3" creationId="{6E7616F9-5EA7-45D2-AE88-1BCC72472482}"/>
+          </ac:cxnSpMkLst>
+        </pc:cxnChg>
+      </pc:sldChg>
+      <pc:sldChg chg="addSp delSp modSp new mod">
+        <pc:chgData name="Cosmin Covrig" userId="8dcd05c6-e7ae-4cf1-8843-fa63bee14fde" providerId="ADAL" clId="{5B883DA1-DD95-4CDE-95DD-51AE6D9D97DF}" dt="2021-02-24T16:19:30.092" v="1691" actId="20577"/>
+        <pc:sldMkLst>
+          <pc:docMk/>
+          <pc:sldMk cId="2324497481" sldId="266"/>
+        </pc:sldMkLst>
+        <pc:spChg chg="del">
+          <ac:chgData name="Cosmin Covrig" userId="8dcd05c6-e7ae-4cf1-8843-fa63bee14fde" providerId="ADAL" clId="{5B883DA1-DD95-4CDE-95DD-51AE6D9D97DF}" dt="2021-02-24T15:56:21.593" v="772" actId="478"/>
+          <ac:spMkLst>
+            <pc:docMk/>
+            <pc:sldMk cId="2324497481" sldId="266"/>
+            <ac:spMk id="3" creationId="{C7A4C7F9-8108-4A00-9A34-50DF360FC17E}"/>
+          </ac:spMkLst>
+        </pc:spChg>
+        <pc:spChg chg="add mod">
+          <ac:chgData name="Cosmin Covrig" userId="8dcd05c6-e7ae-4cf1-8843-fa63bee14fde" providerId="ADAL" clId="{5B883DA1-DD95-4CDE-95DD-51AE6D9D97DF}" dt="2021-02-24T16:01:27.020" v="827" actId="1076"/>
+          <ac:spMkLst>
+            <pc:docMk/>
+            <pc:sldMk cId="2324497481" sldId="266"/>
+            <ac:spMk id="17" creationId="{B6331B00-7FEB-4227-873A-53203A7F85A3}"/>
+          </ac:spMkLst>
+        </pc:spChg>
+        <pc:spChg chg="add mod">
+          <ac:chgData name="Cosmin Covrig" userId="8dcd05c6-e7ae-4cf1-8843-fa63bee14fde" providerId="ADAL" clId="{5B883DA1-DD95-4CDE-95DD-51AE6D9D97DF}" dt="2021-02-24T16:01:37.964" v="842" actId="20577"/>
+          <ac:spMkLst>
+            <pc:docMk/>
+            <pc:sldMk cId="2324497481" sldId="266"/>
+            <ac:spMk id="18" creationId="{85DB8975-1F61-45C9-B0A3-063706E36F8B}"/>
+          </ac:spMkLst>
+        </pc:spChg>
+        <pc:spChg chg="add mod">
+          <ac:chgData name="Cosmin Covrig" userId="8dcd05c6-e7ae-4cf1-8843-fa63bee14fde" providerId="ADAL" clId="{5B883DA1-DD95-4CDE-95DD-51AE6D9D97DF}" dt="2021-02-24T16:02:40.579" v="860" actId="1076"/>
+          <ac:spMkLst>
+            <pc:docMk/>
+            <pc:sldMk cId="2324497481" sldId="266"/>
+            <ac:spMk id="19" creationId="{AE674722-9B95-49E8-918D-98F1AB38D4D4}"/>
+          </ac:spMkLst>
+        </pc:spChg>
+        <pc:spChg chg="add mod">
+          <ac:chgData name="Cosmin Covrig" userId="8dcd05c6-e7ae-4cf1-8843-fa63bee14fde" providerId="ADAL" clId="{5B883DA1-DD95-4CDE-95DD-51AE6D9D97DF}" dt="2021-02-24T16:02:12.958" v="853" actId="1076"/>
+          <ac:spMkLst>
+            <pc:docMk/>
+            <pc:sldMk cId="2324497481" sldId="266"/>
+            <ac:spMk id="20" creationId="{A2944EC3-30DC-4C52-B8FA-49908EB175E1}"/>
+          </ac:spMkLst>
+        </pc:spChg>
+        <pc:spChg chg="add mod">
+          <ac:chgData name="Cosmin Covrig" userId="8dcd05c6-e7ae-4cf1-8843-fa63bee14fde" providerId="ADAL" clId="{5B883DA1-DD95-4CDE-95DD-51AE6D9D97DF}" dt="2021-02-24T16:02:52.960" v="903" actId="20577"/>
+          <ac:spMkLst>
+            <pc:docMk/>
+            <pc:sldMk cId="2324497481" sldId="266"/>
+            <ac:spMk id="21" creationId="{CA0D1A06-D4D4-40F0-A643-459D89A6433B}"/>
+          </ac:spMkLst>
+        </pc:spChg>
+        <pc:spChg chg="mod">
+          <ac:chgData name="Cosmin Covrig" userId="8dcd05c6-e7ae-4cf1-8843-fa63bee14fde" providerId="ADAL" clId="{5B883DA1-DD95-4CDE-95DD-51AE6D9D97DF}" dt="2021-02-24T16:03:19.066" v="908"/>
+          <ac:spMkLst>
+            <pc:docMk/>
+            <pc:sldMk cId="2324497481" sldId="266"/>
+            <ac:spMk id="23" creationId="{3C1962F1-443B-4532-97AA-657ACEF8CB3E}"/>
+          </ac:spMkLst>
+        </pc:spChg>
+        <pc:spChg chg="mod">
+          <ac:chgData name="Cosmin Covrig" userId="8dcd05c6-e7ae-4cf1-8843-fa63bee14fde" providerId="ADAL" clId="{5B883DA1-DD95-4CDE-95DD-51AE6D9D97DF}" dt="2021-02-24T16:03:34.823" v="920" actId="404"/>
+          <ac:spMkLst>
+            <pc:docMk/>
+            <pc:sldMk cId="2324497481" sldId="266"/>
+            <ac:spMk id="24" creationId="{21F574AA-0D04-4E69-86FA-06FE4792AC4F}"/>
+          </ac:spMkLst>
+        </pc:spChg>
+        <pc:spChg chg="add mod">
+          <ac:chgData name="Cosmin Covrig" userId="8dcd05c6-e7ae-4cf1-8843-fa63bee14fde" providerId="ADAL" clId="{5B883DA1-DD95-4CDE-95DD-51AE6D9D97DF}" dt="2021-02-24T16:10:15.456" v="1220" actId="20577"/>
+          <ac:spMkLst>
+            <pc:docMk/>
+            <pc:sldMk cId="2324497481" sldId="266"/>
+            <ac:spMk id="27" creationId="{AC12C313-026D-45B4-94C1-6E80984EB425}"/>
+          </ac:spMkLst>
+        </pc:spChg>
+        <pc:spChg chg="add mod">
+          <ac:chgData name="Cosmin Covrig" userId="8dcd05c6-e7ae-4cf1-8843-fa63bee14fde" providerId="ADAL" clId="{5B883DA1-DD95-4CDE-95DD-51AE6D9D97DF}" dt="2021-02-24T16:15:58.063" v="1517" actId="20577"/>
+          <ac:spMkLst>
+            <pc:docMk/>
+            <pc:sldMk cId="2324497481" sldId="266"/>
+            <ac:spMk id="28" creationId="{30D9D0B0-45FA-434A-B1D2-AFB1ECE90E31}"/>
+          </ac:spMkLst>
+        </pc:spChg>
+        <pc:spChg chg="add mod">
+          <ac:chgData name="Cosmin Covrig" userId="8dcd05c6-e7ae-4cf1-8843-fa63bee14fde" providerId="ADAL" clId="{5B883DA1-DD95-4CDE-95DD-51AE6D9D97DF}" dt="2021-02-24T16:16:33.347" v="1559" actId="20577"/>
+          <ac:spMkLst>
+            <pc:docMk/>
+            <pc:sldMk cId="2324497481" sldId="266"/>
+            <ac:spMk id="29" creationId="{BA0F79BD-D5AE-4B2A-B84A-82CEEEFAA619}"/>
+          </ac:spMkLst>
+        </pc:spChg>
+        <pc:spChg chg="add mod">
+          <ac:chgData name="Cosmin Covrig" userId="8dcd05c6-e7ae-4cf1-8843-fa63bee14fde" providerId="ADAL" clId="{5B883DA1-DD95-4CDE-95DD-51AE6D9D97DF}" dt="2021-02-24T16:19:30.092" v="1691" actId="20577"/>
+          <ac:spMkLst>
+            <pc:docMk/>
+            <pc:sldMk cId="2324497481" sldId="266"/>
+            <ac:spMk id="30" creationId="{521879E8-0F8C-4E97-B175-151C277F7EC5}"/>
+          </ac:spMkLst>
+        </pc:spChg>
+        <pc:grpChg chg="add mod">
+          <ac:chgData name="Cosmin Covrig" userId="8dcd05c6-e7ae-4cf1-8843-fa63bee14fde" providerId="ADAL" clId="{5B883DA1-DD95-4CDE-95DD-51AE6D9D97DF}" dt="2021-02-24T16:03:48.183" v="923" actId="1076"/>
+          <ac:grpSpMkLst>
+            <pc:docMk/>
+            <pc:sldMk cId="2324497481" sldId="266"/>
+            <ac:grpSpMk id="22" creationId="{32FE173B-37C6-44AE-BB27-C58C1A5BC3E1}"/>
+          </ac:grpSpMkLst>
+        </pc:grpChg>
+        <pc:picChg chg="add del mod">
+          <ac:chgData name="Cosmin Covrig" userId="8dcd05c6-e7ae-4cf1-8843-fa63bee14fde" providerId="ADAL" clId="{5B883DA1-DD95-4CDE-95DD-51AE6D9D97DF}" dt="2021-02-24T16:04:13.007" v="932" actId="478"/>
+          <ac:picMkLst>
+            <pc:docMk/>
+            <pc:sldMk cId="2324497481" sldId="266"/>
+            <ac:picMk id="4" creationId="{F4D190AA-55A6-45F8-A6D4-FB7CFD8C6C37}"/>
+          </ac:picMkLst>
+        </pc:picChg>
+        <pc:cxnChg chg="add mod">
+          <ac:chgData name="Cosmin Covrig" userId="8dcd05c6-e7ae-4cf1-8843-fa63bee14fde" providerId="ADAL" clId="{5B883DA1-DD95-4CDE-95DD-51AE6D9D97DF}" dt="2021-02-24T16:01:03.305" v="806" actId="14100"/>
+          <ac:cxnSpMkLst>
+            <pc:docMk/>
+            <pc:sldMk cId="2324497481" sldId="266"/>
+            <ac:cxnSpMk id="15" creationId="{F178946D-1972-46F2-8813-DAB5C96ECBF4}"/>
+          </ac:cxnSpMkLst>
+        </pc:cxnChg>
+      </pc:sldChg>
+      <pc:sldChg chg="addSp delSp mod">
+        <pc:chgData name="Cosmin Covrig" userId="8dcd05c6-e7ae-4cf1-8843-fa63bee14fde" providerId="ADAL" clId="{5B883DA1-DD95-4CDE-95DD-51AE6D9D97DF}" dt="2021-02-25T15:07:29.591" v="1702" actId="478"/>
+        <pc:sldMkLst>
+          <pc:docMk/>
+          <pc:sldMk cId="3117809531" sldId="269"/>
+        </pc:sldMkLst>
+        <pc:spChg chg="add del">
+          <ac:chgData name="Cosmin Covrig" userId="8dcd05c6-e7ae-4cf1-8843-fa63bee14fde" providerId="ADAL" clId="{5B883DA1-DD95-4CDE-95DD-51AE6D9D97DF}" dt="2021-02-25T15:07:29.591" v="1702" actId="478"/>
+          <ac:spMkLst>
+            <pc:docMk/>
+            <pc:sldMk cId="3117809531" sldId="269"/>
+            <ac:spMk id="12" creationId="{F93313E5-301E-424B-8AF8-0605E8FF4AF0}"/>
+          </ac:spMkLst>
+        </pc:spChg>
+      </pc:sldChg>
+      <pc:sldChg chg="modSp mod">
+        <pc:chgData name="Cosmin Covrig" userId="8dcd05c6-e7ae-4cf1-8843-fa63bee14fde" providerId="ADAL" clId="{5B883DA1-DD95-4CDE-95DD-51AE6D9D97DF}" dt="2021-02-25T15:06:02.254" v="1700" actId="1076"/>
+        <pc:sldMkLst>
+          <pc:docMk/>
+          <pc:sldMk cId="4223315037" sldId="270"/>
+        </pc:sldMkLst>
+        <pc:spChg chg="mod">
+          <ac:chgData name="Cosmin Covrig" userId="8dcd05c6-e7ae-4cf1-8843-fa63bee14fde" providerId="ADAL" clId="{5B883DA1-DD95-4CDE-95DD-51AE6D9D97DF}" dt="2021-02-25T15:05:48.773" v="1696" actId="404"/>
+          <ac:spMkLst>
+            <pc:docMk/>
+            <pc:sldMk cId="4223315037" sldId="270"/>
+            <ac:spMk id="12" creationId="{0D98892E-E15C-40F3-9C07-F6CB17AC7EFA}"/>
+          </ac:spMkLst>
+        </pc:spChg>
+        <pc:grpChg chg="mod">
+          <ac:chgData name="Cosmin Covrig" userId="8dcd05c6-e7ae-4cf1-8843-fa63bee14fde" providerId="ADAL" clId="{5B883DA1-DD95-4CDE-95DD-51AE6D9D97DF}" dt="2021-02-25T15:06:02.254" v="1700" actId="1076"/>
+          <ac:grpSpMkLst>
+            <pc:docMk/>
+            <pc:sldMk cId="4223315037" sldId="270"/>
+            <ac:grpSpMk id="10" creationId="{139FAE9D-BC32-40B3-8279-7499EE484AAE}"/>
+          </ac:grpSpMkLst>
+        </pc:grpChg>
+        <pc:grpChg chg="mod">
+          <ac:chgData name="Cosmin Covrig" userId="8dcd05c6-e7ae-4cf1-8843-fa63bee14fde" providerId="ADAL" clId="{5B883DA1-DD95-4CDE-95DD-51AE6D9D97DF}" dt="2021-02-25T15:05:56.200" v="1699" actId="1076"/>
+          <ac:grpSpMkLst>
+            <pc:docMk/>
+            <pc:sldMk cId="4223315037" sldId="270"/>
+            <ac:grpSpMk id="18" creationId="{52DA999A-40E3-4DB9-8287-328DA7EB635A}"/>
+          </ac:grpSpMkLst>
+        </pc:grpChg>
       </pc:sldChg>
     </pc:docChg>
   </pc:docChgLst>
@@ -5245,7 +5244,7 @@
           <a:p>
             <a:fld id="{473062FC-3E3C-4F0C-8DF1-E8C871EC0D42}" type="datetimeFigureOut">
               <a:rPr lang="en-GB" smtClean="0"/>
-              <a:t>25/02/2021</a:t>
+              <a:t>02/03/2021</a:t>
             </a:fld>
             <a:endParaRPr lang="en-GB"/>
           </a:p>
@@ -5642,7 +5641,7 @@
           <a:p>
             <a:fld id="{C764DE79-268F-4C1A-8933-263129D2AF90}" type="datetimeFigureOut">
               <a:rPr lang="en-US" dirty="0"/>
-              <a:t>2/25/2021</a:t>
+              <a:t>3/2/2021</a:t>
             </a:fld>
             <a:endParaRPr lang="en-US"/>
           </a:p>
@@ -5810,7 +5809,7 @@
           <a:p>
             <a:fld id="{C764DE79-268F-4C1A-8933-263129D2AF90}" type="datetimeFigureOut">
               <a:rPr lang="en-US" dirty="0"/>
-              <a:t>2/25/2021</a:t>
+              <a:t>3/2/2021</a:t>
             </a:fld>
             <a:endParaRPr lang="en-US"/>
           </a:p>
@@ -5988,7 +5987,7 @@
           <a:p>
             <a:fld id="{C764DE79-268F-4C1A-8933-263129D2AF90}" type="datetimeFigureOut">
               <a:rPr lang="en-US" dirty="0"/>
-              <a:t>2/25/2021</a:t>
+              <a:t>3/2/2021</a:t>
             </a:fld>
             <a:endParaRPr lang="en-US"/>
           </a:p>
@@ -6156,7 +6155,7 @@
           <a:p>
             <a:fld id="{C764DE79-268F-4C1A-8933-263129D2AF90}" type="datetimeFigureOut">
               <a:rPr lang="en-US" dirty="0"/>
-              <a:t>2/25/2021</a:t>
+              <a:t>3/2/2021</a:t>
             </a:fld>
             <a:endParaRPr lang="en-US"/>
           </a:p>
@@ -6401,7 +6400,7 @@
           <a:p>
             <a:fld id="{C764DE79-268F-4C1A-8933-263129D2AF90}" type="datetimeFigureOut">
               <a:rPr lang="en-US" dirty="0"/>
-              <a:t>2/25/2021</a:t>
+              <a:t>3/2/2021</a:t>
             </a:fld>
             <a:endParaRPr lang="en-US"/>
           </a:p>
@@ -6630,7 +6629,7 @@
           <a:p>
             <a:fld id="{C764DE79-268F-4C1A-8933-263129D2AF90}" type="datetimeFigureOut">
               <a:rPr lang="en-US" dirty="0"/>
-              <a:t>2/25/2021</a:t>
+              <a:t>3/2/2021</a:t>
             </a:fld>
             <a:endParaRPr lang="en-US"/>
           </a:p>
@@ -6994,7 +6993,7 @@
           <a:p>
             <a:fld id="{C764DE79-268F-4C1A-8933-263129D2AF90}" type="datetimeFigureOut">
               <a:rPr lang="en-US" dirty="0"/>
-              <a:t>2/25/2021</a:t>
+              <a:t>3/2/2021</a:t>
             </a:fld>
             <a:endParaRPr lang="en-US"/>
           </a:p>
@@ -7111,7 +7110,7 @@
           <a:p>
             <a:fld id="{C764DE79-268F-4C1A-8933-263129D2AF90}" type="datetimeFigureOut">
               <a:rPr lang="en-US" dirty="0"/>
-              <a:t>2/25/2021</a:t>
+              <a:t>3/2/2021</a:t>
             </a:fld>
             <a:endParaRPr lang="en-US"/>
           </a:p>
@@ -7206,7 +7205,7 @@
           <a:p>
             <a:fld id="{C764DE79-268F-4C1A-8933-263129D2AF90}" type="datetimeFigureOut">
               <a:rPr lang="en-US" dirty="0"/>
-              <a:t>2/25/2021</a:t>
+              <a:t>3/2/2021</a:t>
             </a:fld>
             <a:endParaRPr lang="en-US"/>
           </a:p>
@@ -7481,7 +7480,7 @@
           <a:p>
             <a:fld id="{C764DE79-268F-4C1A-8933-263129D2AF90}" type="datetimeFigureOut">
               <a:rPr lang="en-US" dirty="0"/>
-              <a:t>2/25/2021</a:t>
+              <a:t>3/2/2021</a:t>
             </a:fld>
             <a:endParaRPr lang="en-US"/>
           </a:p>
@@ -7733,7 +7732,7 @@
           <a:p>
             <a:fld id="{C764DE79-268F-4C1A-8933-263129D2AF90}" type="datetimeFigureOut">
               <a:rPr lang="en-US" dirty="0"/>
-              <a:t>2/25/2021</a:t>
+              <a:t>3/2/2021</a:t>
             </a:fld>
             <a:endParaRPr lang="en-US"/>
           </a:p>
@@ -7944,7 +7943,7 @@
           <a:p>
             <a:fld id="{C764DE79-268F-4C1A-8933-263129D2AF90}" type="datetimeFigureOut">
               <a:rPr lang="en-US" dirty="0"/>
-              <a:t>2/25/2021</a:t>
+              <a:t>3/2/2021</a:t>
             </a:fld>
             <a:endParaRPr lang="en-US"/>
           </a:p>
@@ -21494,8 +21493,8 @@
         </p:nvSpPr>
         <p:spPr>
           <a:xfrm>
-            <a:off x="4482" y="6443196"/>
-            <a:ext cx="2605368" cy="411164"/>
+            <a:off x="4481" y="6443196"/>
+            <a:ext cx="3028994" cy="411164"/>
           </a:xfrm>
           <a:prstGeom prst="rect">
             <a:avLst/>
@@ -21526,7 +21525,7 @@
           </a:lstStyle>
           <a:p>
             <a:r>
-              <a:rPr lang="en-US" sz="1600">
+              <a:rPr lang="en-US" sz="1600" dirty="0">
                 <a:solidFill>
                   <a:schemeClr val="accent3">
                     <a:lumMod val="75000"/>
@@ -21534,7 +21533,7 @@
                 </a:solidFill>
                 <a:cs typeface="Calibri Light"/>
               </a:rPr>
-              <a:t>Student/Teacher: Credit Balance</a:t>
+              <a:t>Student/Teacher/Staff: Credit Balance</a:t>
             </a:r>
           </a:p>
         </p:txBody>

</xml_diff>